<commit_message>
HP updated code portfolio example solution
</commit_message>
<xml_diff>
--- a/media/week_10/diagrams.pptx
+++ b/media/week_10/diagrams.pptx
@@ -6,6 +6,7 @@
   </p:sldMasterIdLst>
   <p:sldIdLst>
     <p:sldId id="256" r:id="rId2"/>
+    <p:sldId id="257" r:id="rId3"/>
   </p:sldIdLst>
   <p:sldSz cx="12192000" cy="6858000"/>
   <p:notesSz cx="6858000" cy="9144000"/>
@@ -104,6 +105,11 @@
       </a:defRPr>
     </a:lvl9pPr>
   </p:defaultTextStyle>
+  <p:extLst>
+    <p:ext uri="{EFAFB233-063F-42B5-8137-9DF3F51BA10A}">
+      <p15:sldGuideLst xmlns:p15="http://schemas.microsoft.com/office/powerpoint/2012/main"/>
+    </p:ext>
+  </p:extLst>
 </p:presentation>
 </file>
 
@@ -111,12 +117,109 @@
 <p1510:revInfo xmlns:a="http://schemas.openxmlformats.org/drawingml/2006/main" xmlns:r="http://schemas.openxmlformats.org/officeDocument/2006/relationships" xmlns:p1510="http://schemas.microsoft.com/office/powerpoint/2015/10/main">
   <p1510:revLst>
     <p1510:client id="{248D8C8A-D969-FF47-8750-E2D7FB7C4E9E}" v="159" dt="2025-11-20T11:17:22.706"/>
+    <p1510:client id="{DA2B79C2-931E-6F45-97CE-51EECBC9C8D0}" v="3" dt="2025-11-20T16:48:46.294"/>
   </p1510:revLst>
 </p1510:revInfo>
 </file>
 
 <file path=ppt/changesInfos/changesInfo1.xml><?xml version="1.0" encoding="utf-8"?>
 <pc:chgInfo xmlns:a="http://schemas.openxmlformats.org/drawingml/2006/main" xmlns:r="http://schemas.openxmlformats.org/officeDocument/2006/relationships" xmlns:ac="http://schemas.microsoft.com/office/drawing/2013/main/command" xmlns:pc="http://schemas.microsoft.com/office/powerpoint/2013/main/command">
+  <pc:docChgLst>
+    <pc:chgData name="Hemma Philamore" userId="db50e2f3-17b2-4cc0-b719-fb6254d3e9df" providerId="ADAL" clId="{B5D85944-D90A-5912-90C6-4C26E424D3D6}"/>
+    <pc:docChg chg="addSld modSld">
+      <pc:chgData name="Hemma Philamore" userId="db50e2f3-17b2-4cc0-b719-fb6254d3e9df" providerId="ADAL" clId="{B5D85944-D90A-5912-90C6-4C26E424D3D6}" dt="2025-11-20T16:48:46.294" v="6" actId="1076"/>
+      <pc:docMkLst>
+        <pc:docMk/>
+      </pc:docMkLst>
+      <pc:sldChg chg="addSp modSp new mod">
+        <pc:chgData name="Hemma Philamore" userId="db50e2f3-17b2-4cc0-b719-fb6254d3e9df" providerId="ADAL" clId="{B5D85944-D90A-5912-90C6-4C26E424D3D6}" dt="2025-11-20T16:48:46.294" v="6" actId="1076"/>
+        <pc:sldMkLst>
+          <pc:docMk/>
+          <pc:sldMk cId="3011264781" sldId="257"/>
+        </pc:sldMkLst>
+        <pc:spChg chg="mod">
+          <ac:chgData name="Hemma Philamore" userId="db50e2f3-17b2-4cc0-b719-fb6254d3e9df" providerId="ADAL" clId="{B5D85944-D90A-5912-90C6-4C26E424D3D6}" dt="2025-11-20T16:48:46.294" v="6" actId="1076"/>
+          <ac:spMkLst>
+            <pc:docMk/>
+            <pc:sldMk cId="3011264781" sldId="257"/>
+            <ac:spMk id="6" creationId="{6DFD7044-7745-9F60-CDD7-98F2F92A2D8C}"/>
+          </ac:spMkLst>
+        </pc:spChg>
+        <pc:spChg chg="mod">
+          <ac:chgData name="Hemma Philamore" userId="db50e2f3-17b2-4cc0-b719-fb6254d3e9df" providerId="ADAL" clId="{B5D85944-D90A-5912-90C6-4C26E424D3D6}" dt="2025-11-20T16:48:46.294" v="6" actId="1076"/>
+          <ac:spMkLst>
+            <pc:docMk/>
+            <pc:sldMk cId="3011264781" sldId="257"/>
+            <ac:spMk id="8" creationId="{FD2E9BE0-9A4C-40B4-625D-E130305525D1}"/>
+          </ac:spMkLst>
+        </pc:spChg>
+        <pc:spChg chg="mod">
+          <ac:chgData name="Hemma Philamore" userId="db50e2f3-17b2-4cc0-b719-fb6254d3e9df" providerId="ADAL" clId="{B5D85944-D90A-5912-90C6-4C26E424D3D6}" dt="2025-11-20T16:48:46.294" v="6" actId="1076"/>
+          <ac:spMkLst>
+            <pc:docMk/>
+            <pc:sldMk cId="3011264781" sldId="257"/>
+            <ac:spMk id="9" creationId="{462616D0-A515-5F39-1C54-7F7490BD915C}"/>
+          </ac:spMkLst>
+        </pc:spChg>
+        <pc:spChg chg="mod">
+          <ac:chgData name="Hemma Philamore" userId="db50e2f3-17b2-4cc0-b719-fb6254d3e9df" providerId="ADAL" clId="{B5D85944-D90A-5912-90C6-4C26E424D3D6}" dt="2025-11-20T16:48:46.294" v="6" actId="1076"/>
+          <ac:spMkLst>
+            <pc:docMk/>
+            <pc:sldMk cId="3011264781" sldId="257"/>
+            <ac:spMk id="11" creationId="{4FB76C4B-08B1-3EAC-A0FF-39A83A522A6A}"/>
+          </ac:spMkLst>
+        </pc:spChg>
+        <pc:spChg chg="add mod">
+          <ac:chgData name="Hemma Philamore" userId="db50e2f3-17b2-4cc0-b719-fb6254d3e9df" providerId="ADAL" clId="{B5D85944-D90A-5912-90C6-4C26E424D3D6}" dt="2025-11-20T16:48:46.294" v="6" actId="1076"/>
+          <ac:spMkLst>
+            <pc:docMk/>
+            <pc:sldMk cId="3011264781" sldId="257"/>
+            <ac:spMk id="12" creationId="{1F7429F0-B60D-A975-4D0F-D190CBC16DD5}"/>
+          </ac:spMkLst>
+        </pc:spChg>
+        <pc:grpChg chg="add mod">
+          <ac:chgData name="Hemma Philamore" userId="db50e2f3-17b2-4cc0-b719-fb6254d3e9df" providerId="ADAL" clId="{B5D85944-D90A-5912-90C6-4C26E424D3D6}" dt="2025-11-20T16:48:46.294" v="6" actId="1076"/>
+          <ac:grpSpMkLst>
+            <pc:docMk/>
+            <pc:sldMk cId="3011264781" sldId="257"/>
+            <ac:grpSpMk id="4" creationId="{55BB94D3-42DA-D7AE-3BDC-18C0221FD515}"/>
+          </ac:grpSpMkLst>
+        </pc:grpChg>
+        <pc:grpChg chg="mod">
+          <ac:chgData name="Hemma Philamore" userId="db50e2f3-17b2-4cc0-b719-fb6254d3e9df" providerId="ADAL" clId="{B5D85944-D90A-5912-90C6-4C26E424D3D6}" dt="2025-11-20T16:48:46.294" v="6" actId="1076"/>
+          <ac:grpSpMkLst>
+            <pc:docMk/>
+            <pc:sldMk cId="3011264781" sldId="257"/>
+            <ac:grpSpMk id="5" creationId="{60DA3610-2176-1129-5F8A-F5763275E98C}"/>
+          </ac:grpSpMkLst>
+        </pc:grpChg>
+        <pc:picChg chg="add mod">
+          <ac:chgData name="Hemma Philamore" userId="db50e2f3-17b2-4cc0-b719-fb6254d3e9df" providerId="ADAL" clId="{B5D85944-D90A-5912-90C6-4C26E424D3D6}" dt="2025-11-20T16:47:41.786" v="4" actId="1076"/>
+          <ac:picMkLst>
+            <pc:docMk/>
+            <pc:sldMk cId="3011264781" sldId="257"/>
+            <ac:picMk id="3" creationId="{B3D58153-75CA-7745-F646-268E96C726F6}"/>
+          </ac:picMkLst>
+        </pc:picChg>
+        <pc:picChg chg="mod">
+          <ac:chgData name="Hemma Philamore" userId="db50e2f3-17b2-4cc0-b719-fb6254d3e9df" providerId="ADAL" clId="{B5D85944-D90A-5912-90C6-4C26E424D3D6}" dt="2025-11-20T16:48:46.294" v="6" actId="1076"/>
+          <ac:picMkLst>
+            <pc:docMk/>
+            <pc:sldMk cId="3011264781" sldId="257"/>
+            <ac:picMk id="7" creationId="{47C946D0-0CD7-6C54-CB9D-9240A8BF0873}"/>
+          </ac:picMkLst>
+        </pc:picChg>
+        <pc:cxnChg chg="mod">
+          <ac:chgData name="Hemma Philamore" userId="db50e2f3-17b2-4cc0-b719-fb6254d3e9df" providerId="ADAL" clId="{B5D85944-D90A-5912-90C6-4C26E424D3D6}" dt="2025-11-20T16:48:46.294" v="6" actId="1076"/>
+          <ac:cxnSpMkLst>
+            <pc:docMk/>
+            <pc:sldMk cId="3011264781" sldId="257"/>
+            <ac:cxnSpMk id="10" creationId="{282FE7DB-D6EA-0259-7F75-B26381AEB14E}"/>
+          </ac:cxnSpMkLst>
+        </pc:cxnChg>
+      </pc:sldChg>
+    </pc:docChg>
+  </pc:docChgLst>
   <pc:docChgLst>
     <pc:chgData name="Hemma Philamore" userId="db50e2f3-17b2-4cc0-b719-fb6254d3e9df" providerId="ADAL" clId="{35C0B9A2-A60C-57EC-AD9B-630767BE11FE}"/>
     <pc:docChg chg="undo custSel modSld">
@@ -4981,8 +5084,8 @@
           </a:p>
         </p:txBody>
       </p:sp>
-      <mc:AlternateContent xmlns:mc="http://schemas.openxmlformats.org/markup-compatibility/2006">
-        <mc:Choice xmlns:a14="http://schemas.microsoft.com/office/drawing/2010/main" Requires="a14">
+      <mc:AlternateContent xmlns:mc="http://schemas.openxmlformats.org/markup-compatibility/2006" xmlns:a14="http://schemas.microsoft.com/office/drawing/2010/main">
+        <mc:Choice Requires="a14">
           <p:sp>
             <p:nvSpPr>
               <p:cNvPr id="37" name="TextBox 36">
@@ -5061,7 +5164,7 @@
             </p:txBody>
           </p:sp>
         </mc:Choice>
-        <mc:Fallback>
+        <mc:Fallback xmlns="">
           <p:sp>
             <p:nvSpPr>
               <p:cNvPr id="37" name="TextBox 36">
@@ -5106,8 +5209,8 @@
           </p:sp>
         </mc:Fallback>
       </mc:AlternateContent>
-      <mc:AlternateContent xmlns:mc="http://schemas.openxmlformats.org/markup-compatibility/2006">
-        <mc:Choice xmlns:a14="http://schemas.microsoft.com/office/drawing/2010/main" Requires="a14">
+      <mc:AlternateContent xmlns:mc="http://schemas.openxmlformats.org/markup-compatibility/2006" xmlns:a14="http://schemas.microsoft.com/office/drawing/2010/main">
+        <mc:Choice Requires="a14">
           <p:sp>
             <p:nvSpPr>
               <p:cNvPr id="38" name="TextBox 37">
@@ -5187,7 +5290,7 @@
             </p:txBody>
           </p:sp>
         </mc:Choice>
-        <mc:Fallback>
+        <mc:Fallback xmlns="">
           <p:sp>
             <p:nvSpPr>
               <p:cNvPr id="38" name="TextBox 37">
@@ -5232,8 +5335,8 @@
           </p:sp>
         </mc:Fallback>
       </mc:AlternateContent>
-      <mc:AlternateContent xmlns:mc="http://schemas.openxmlformats.org/markup-compatibility/2006">
-        <mc:Choice xmlns:a14="http://schemas.microsoft.com/office/drawing/2010/main" Requires="a14">
+      <mc:AlternateContent xmlns:mc="http://schemas.openxmlformats.org/markup-compatibility/2006" xmlns:a14="http://schemas.microsoft.com/office/drawing/2010/main">
+        <mc:Choice Requires="a14">
           <p:sp>
             <p:nvSpPr>
               <p:cNvPr id="39" name="TextBox 38">
@@ -5286,7 +5389,7 @@
             </p:txBody>
           </p:sp>
         </mc:Choice>
-        <mc:Fallback>
+        <mc:Fallback xmlns="">
           <p:sp>
             <p:nvSpPr>
               <p:cNvPr id="39" name="TextBox 38">
@@ -5376,8 +5479,8 @@
           </a:fontRef>
         </p:style>
       </p:cxnSp>
-      <mc:AlternateContent xmlns:mc="http://schemas.openxmlformats.org/markup-compatibility/2006">
-        <mc:Choice xmlns:a14="http://schemas.microsoft.com/office/drawing/2010/main" Requires="a14">
+      <mc:AlternateContent xmlns:mc="http://schemas.openxmlformats.org/markup-compatibility/2006" xmlns:a14="http://schemas.microsoft.com/office/drawing/2010/main">
+        <mc:Choice Requires="a14">
           <p:sp>
             <p:nvSpPr>
               <p:cNvPr id="54" name="TextBox 53">
@@ -5430,7 +5533,7 @@
             </p:txBody>
           </p:sp>
         </mc:Choice>
-        <mc:Fallback>
+        <mc:Fallback xmlns="">
           <p:sp>
             <p:nvSpPr>
               <p:cNvPr id="54" name="TextBox 53">
@@ -5618,8 +5721,8 @@
           </a:p>
         </p:txBody>
       </p:sp>
-      <mc:AlternateContent xmlns:mc="http://schemas.openxmlformats.org/markup-compatibility/2006">
-        <mc:Choice xmlns:a14="http://schemas.microsoft.com/office/drawing/2010/main" Requires="a14">
+      <mc:AlternateContent xmlns:mc="http://schemas.openxmlformats.org/markup-compatibility/2006" xmlns:a14="http://schemas.microsoft.com/office/drawing/2010/main">
+        <mc:Choice Requires="a14">
           <p:sp>
             <p:nvSpPr>
               <p:cNvPr id="146" name="TextBox 145">
@@ -5648,6 +5751,7 @@
               </a:bodyPr>
               <a:lstStyle/>
               <a:p>
+                <a:pPr/>
                 <a14:m>
                   <m:oMathPara xmlns:m="http://schemas.openxmlformats.org/officeDocument/2006/math">
                     <m:oMathParaPr>
@@ -5687,7 +5791,7 @@
             </p:txBody>
           </p:sp>
         </mc:Choice>
-        <mc:Fallback>
+        <mc:Fallback xmlns="">
           <p:sp>
             <p:nvSpPr>
               <p:cNvPr id="146" name="TextBox 145">
@@ -5732,8 +5836,8 @@
           </p:sp>
         </mc:Fallback>
       </mc:AlternateContent>
-      <mc:AlternateContent xmlns:mc="http://schemas.openxmlformats.org/markup-compatibility/2006">
-        <mc:Choice xmlns:a14="http://schemas.microsoft.com/office/drawing/2010/main" Requires="a14">
+      <mc:AlternateContent xmlns:mc="http://schemas.openxmlformats.org/markup-compatibility/2006" xmlns:a14="http://schemas.microsoft.com/office/drawing/2010/main">
+        <mc:Choice Requires="a14">
           <p:sp>
             <p:nvSpPr>
               <p:cNvPr id="147" name="TextBox 146">
@@ -5762,6 +5866,7 @@
               </a:bodyPr>
               <a:lstStyle/>
               <a:p>
+                <a:pPr/>
                 <a14:m>
                   <m:oMathPara xmlns:m="http://schemas.openxmlformats.org/officeDocument/2006/math">
                     <m:oMathParaPr>
@@ -5801,7 +5906,7 @@
             </p:txBody>
           </p:sp>
         </mc:Choice>
-        <mc:Fallback>
+        <mc:Fallback xmlns="">
           <p:sp>
             <p:nvSpPr>
               <p:cNvPr id="147" name="TextBox 146">
@@ -5846,8 +5951,8 @@
           </p:sp>
         </mc:Fallback>
       </mc:AlternateContent>
-      <mc:AlternateContent xmlns:mc="http://schemas.openxmlformats.org/markup-compatibility/2006">
-        <mc:Choice xmlns:a14="http://schemas.microsoft.com/office/drawing/2010/main" Requires="a14">
+      <mc:AlternateContent xmlns:mc="http://schemas.openxmlformats.org/markup-compatibility/2006" xmlns:a14="http://schemas.microsoft.com/office/drawing/2010/main">
+        <mc:Choice Requires="a14">
           <p:sp>
             <p:nvSpPr>
               <p:cNvPr id="148" name="TextBox 147">
@@ -5876,6 +5981,7 @@
               </a:bodyPr>
               <a:lstStyle/>
               <a:p>
+                <a:pPr/>
                 <a14:m>
                   <m:oMathPara xmlns:m="http://schemas.openxmlformats.org/officeDocument/2006/math">
                     <m:oMathParaPr>
@@ -5915,7 +6021,7 @@
             </p:txBody>
           </p:sp>
         </mc:Choice>
-        <mc:Fallback>
+        <mc:Fallback xmlns="">
           <p:sp>
             <p:nvSpPr>
               <p:cNvPr id="148" name="TextBox 147">
@@ -5960,8 +6066,8 @@
           </p:sp>
         </mc:Fallback>
       </mc:AlternateContent>
-      <mc:AlternateContent xmlns:mc="http://schemas.openxmlformats.org/markup-compatibility/2006">
-        <mc:Choice xmlns:a14="http://schemas.microsoft.com/office/drawing/2010/main" Requires="a14">
+      <mc:AlternateContent xmlns:mc="http://schemas.openxmlformats.org/markup-compatibility/2006" xmlns:a14="http://schemas.microsoft.com/office/drawing/2010/main">
+        <mc:Choice Requires="a14">
           <p:sp>
             <p:nvSpPr>
               <p:cNvPr id="149" name="TextBox 148">
@@ -5990,6 +6096,7 @@
               </a:bodyPr>
               <a:lstStyle/>
               <a:p>
+                <a:pPr/>
                 <a14:m>
                   <m:oMathPara xmlns:m="http://schemas.openxmlformats.org/officeDocument/2006/math">
                     <m:oMathParaPr>
@@ -6029,7 +6136,7 @@
             </p:txBody>
           </p:sp>
         </mc:Choice>
-        <mc:Fallback>
+        <mc:Fallback xmlns="">
           <p:sp>
             <p:nvSpPr>
               <p:cNvPr id="149" name="TextBox 148">
@@ -6424,8 +6531,8 @@
           </p:style>
         </p:cxnSp>
       </p:grpSp>
-      <mc:AlternateContent xmlns:mc="http://schemas.openxmlformats.org/markup-compatibility/2006">
-        <mc:Choice xmlns:a14="http://schemas.microsoft.com/office/drawing/2010/main" Requires="a14">
+      <mc:AlternateContent xmlns:mc="http://schemas.openxmlformats.org/markup-compatibility/2006" xmlns:a14="http://schemas.microsoft.com/office/drawing/2010/main">
+        <mc:Choice Requires="a14">
           <p:sp>
             <p:nvSpPr>
               <p:cNvPr id="165" name="TextBox 164">
@@ -6454,6 +6561,7 @@
               </a:bodyPr>
               <a:lstStyle/>
               <a:p>
+                <a:pPr/>
                 <a14:m>
                   <m:oMathPara xmlns:m="http://schemas.openxmlformats.org/officeDocument/2006/math">
                     <m:oMathParaPr>
@@ -6493,7 +6601,7 @@
             </p:txBody>
           </p:sp>
         </mc:Choice>
-        <mc:Fallback>
+        <mc:Fallback xmlns="">
           <p:sp>
             <p:nvSpPr>
               <p:cNvPr id="165" name="TextBox 164">
@@ -6538,8 +6646,8 @@
           </p:sp>
         </mc:Fallback>
       </mc:AlternateContent>
-      <mc:AlternateContent xmlns:mc="http://schemas.openxmlformats.org/markup-compatibility/2006">
-        <mc:Choice xmlns:a14="http://schemas.microsoft.com/office/drawing/2010/main" Requires="a14">
+      <mc:AlternateContent xmlns:mc="http://schemas.openxmlformats.org/markup-compatibility/2006" xmlns:a14="http://schemas.microsoft.com/office/drawing/2010/main">
+        <mc:Choice Requires="a14">
           <p:sp>
             <p:nvSpPr>
               <p:cNvPr id="166" name="TextBox 165">
@@ -6568,6 +6676,7 @@
               </a:bodyPr>
               <a:lstStyle/>
               <a:p>
+                <a:pPr/>
                 <a14:m>
                   <m:oMathPara xmlns:m="http://schemas.openxmlformats.org/officeDocument/2006/math">
                     <m:oMathParaPr>
@@ -6607,7 +6716,7 @@
             </p:txBody>
           </p:sp>
         </mc:Choice>
-        <mc:Fallback>
+        <mc:Fallback xmlns="">
           <p:sp>
             <p:nvSpPr>
               <p:cNvPr id="166" name="TextBox 165">
@@ -6652,8 +6761,8 @@
           </p:sp>
         </mc:Fallback>
       </mc:AlternateContent>
-      <mc:AlternateContent xmlns:mc="http://schemas.openxmlformats.org/markup-compatibility/2006">
-        <mc:Choice xmlns:a14="http://schemas.microsoft.com/office/drawing/2010/main" Requires="a14">
+      <mc:AlternateContent xmlns:mc="http://schemas.openxmlformats.org/markup-compatibility/2006" xmlns:a14="http://schemas.microsoft.com/office/drawing/2010/main">
+        <mc:Choice Requires="a14">
           <p:sp>
             <p:nvSpPr>
               <p:cNvPr id="167" name="TextBox 166">
@@ -6682,6 +6791,7 @@
               </a:bodyPr>
               <a:lstStyle/>
               <a:p>
+                <a:pPr/>
                 <a14:m>
                   <m:oMathPara xmlns:m="http://schemas.openxmlformats.org/officeDocument/2006/math">
                     <m:oMathParaPr>
@@ -6721,7 +6831,7 @@
             </p:txBody>
           </p:sp>
         </mc:Choice>
-        <mc:Fallback>
+        <mc:Fallback xmlns="">
           <p:sp>
             <p:nvSpPr>
               <p:cNvPr id="167" name="TextBox 166">
@@ -6766,8 +6876,8 @@
           </p:sp>
         </mc:Fallback>
       </mc:AlternateContent>
-      <mc:AlternateContent xmlns:mc="http://schemas.openxmlformats.org/markup-compatibility/2006">
-        <mc:Choice xmlns:a14="http://schemas.microsoft.com/office/drawing/2010/main" Requires="a14">
+      <mc:AlternateContent xmlns:mc="http://schemas.openxmlformats.org/markup-compatibility/2006" xmlns:a14="http://schemas.microsoft.com/office/drawing/2010/main">
+        <mc:Choice Requires="a14">
           <p:sp>
             <p:nvSpPr>
               <p:cNvPr id="168" name="TextBox 167">
@@ -6796,6 +6906,7 @@
               </a:bodyPr>
               <a:lstStyle/>
               <a:p>
+                <a:pPr/>
                 <a14:m>
                   <m:oMathPara xmlns:m="http://schemas.openxmlformats.org/officeDocument/2006/math">
                     <m:oMathParaPr>
@@ -6835,7 +6946,7 @@
             </p:txBody>
           </p:sp>
         </mc:Choice>
-        <mc:Fallback>
+        <mc:Fallback xmlns="">
           <p:sp>
             <p:nvSpPr>
               <p:cNvPr id="168" name="TextBox 167">
@@ -7230,8 +7341,8 @@
           </p:style>
         </p:cxnSp>
       </p:grpSp>
-      <mc:AlternateContent xmlns:mc="http://schemas.openxmlformats.org/markup-compatibility/2006">
-        <mc:Choice xmlns:a14="http://schemas.microsoft.com/office/drawing/2010/main" Requires="a14">
+      <mc:AlternateContent xmlns:mc="http://schemas.openxmlformats.org/markup-compatibility/2006" xmlns:a14="http://schemas.microsoft.com/office/drawing/2010/main">
+        <mc:Choice Requires="a14">
           <p:sp>
             <p:nvSpPr>
               <p:cNvPr id="178" name="TextBox 177">
@@ -7260,6 +7371,7 @@
               </a:bodyPr>
               <a:lstStyle/>
               <a:p>
+                <a:pPr/>
                 <a14:m>
                   <m:oMathPara xmlns:m="http://schemas.openxmlformats.org/officeDocument/2006/math">
                     <m:oMathParaPr>
@@ -7299,7 +7411,7 @@
             </p:txBody>
           </p:sp>
         </mc:Choice>
-        <mc:Fallback>
+        <mc:Fallback xmlns="">
           <p:sp>
             <p:nvSpPr>
               <p:cNvPr id="178" name="TextBox 177">
@@ -7344,8 +7456,8 @@
           </p:sp>
         </mc:Fallback>
       </mc:AlternateContent>
-      <mc:AlternateContent xmlns:mc="http://schemas.openxmlformats.org/markup-compatibility/2006">
-        <mc:Choice xmlns:a14="http://schemas.microsoft.com/office/drawing/2010/main" Requires="a14">
+      <mc:AlternateContent xmlns:mc="http://schemas.openxmlformats.org/markup-compatibility/2006" xmlns:a14="http://schemas.microsoft.com/office/drawing/2010/main">
+        <mc:Choice Requires="a14">
           <p:sp>
             <p:nvSpPr>
               <p:cNvPr id="179" name="TextBox 178">
@@ -7374,6 +7486,7 @@
               </a:bodyPr>
               <a:lstStyle/>
               <a:p>
+                <a:pPr/>
                 <a14:m>
                   <m:oMathPara xmlns:m="http://schemas.openxmlformats.org/officeDocument/2006/math">
                     <m:oMathParaPr>
@@ -7413,7 +7526,7 @@
             </p:txBody>
           </p:sp>
         </mc:Choice>
-        <mc:Fallback>
+        <mc:Fallback xmlns="">
           <p:sp>
             <p:nvSpPr>
               <p:cNvPr id="179" name="TextBox 178">
@@ -7458,8 +7571,8 @@
           </p:sp>
         </mc:Fallback>
       </mc:AlternateContent>
-      <mc:AlternateContent xmlns:mc="http://schemas.openxmlformats.org/markup-compatibility/2006">
-        <mc:Choice xmlns:a14="http://schemas.microsoft.com/office/drawing/2010/main" Requires="a14">
+      <mc:AlternateContent xmlns:mc="http://schemas.openxmlformats.org/markup-compatibility/2006" xmlns:a14="http://schemas.microsoft.com/office/drawing/2010/main">
+        <mc:Choice Requires="a14">
           <p:sp>
             <p:nvSpPr>
               <p:cNvPr id="180" name="TextBox 179">
@@ -7488,6 +7601,7 @@
               </a:bodyPr>
               <a:lstStyle/>
               <a:p>
+                <a:pPr/>
                 <a14:m>
                   <m:oMathPara xmlns:m="http://schemas.openxmlformats.org/officeDocument/2006/math">
                     <m:oMathParaPr>
@@ -7527,7 +7641,7 @@
             </p:txBody>
           </p:sp>
         </mc:Choice>
-        <mc:Fallback>
+        <mc:Fallback xmlns="">
           <p:sp>
             <p:nvSpPr>
               <p:cNvPr id="180" name="TextBox 179">
@@ -7572,8 +7686,8 @@
           </p:sp>
         </mc:Fallback>
       </mc:AlternateContent>
-      <mc:AlternateContent xmlns:mc="http://schemas.openxmlformats.org/markup-compatibility/2006">
-        <mc:Choice xmlns:a14="http://schemas.microsoft.com/office/drawing/2010/main" Requires="a14">
+      <mc:AlternateContent xmlns:mc="http://schemas.openxmlformats.org/markup-compatibility/2006" xmlns:a14="http://schemas.microsoft.com/office/drawing/2010/main">
+        <mc:Choice Requires="a14">
           <p:sp>
             <p:nvSpPr>
               <p:cNvPr id="181" name="TextBox 180">
@@ -7602,6 +7716,7 @@
               </a:bodyPr>
               <a:lstStyle/>
               <a:p>
+                <a:pPr/>
                 <a14:m>
                   <m:oMathPara xmlns:m="http://schemas.openxmlformats.org/officeDocument/2006/math">
                     <m:oMathParaPr>
@@ -7641,7 +7756,7 @@
             </p:txBody>
           </p:sp>
         </mc:Choice>
-        <mc:Fallback>
+        <mc:Fallback xmlns="">
           <p:sp>
             <p:nvSpPr>
               <p:cNvPr id="181" name="TextBox 180">
@@ -9346,8 +9461,8 @@
           </a:fontRef>
         </p:style>
       </p:cxnSp>
-      <mc:AlternateContent xmlns:mc="http://schemas.openxmlformats.org/markup-compatibility/2006">
-        <mc:Choice xmlns:a14="http://schemas.microsoft.com/office/drawing/2010/main" Requires="a14">
+      <mc:AlternateContent xmlns:mc="http://schemas.openxmlformats.org/markup-compatibility/2006" xmlns:a14="http://schemas.microsoft.com/office/drawing/2010/main">
+        <mc:Choice Requires="a14">
           <p:sp>
             <p:nvSpPr>
               <p:cNvPr id="197" name="TextBox 196">
@@ -9376,6 +9491,7 @@
               </a:bodyPr>
               <a:lstStyle/>
               <a:p>
+                <a:pPr/>
                 <a14:m>
                   <m:oMathPara xmlns:m="http://schemas.openxmlformats.org/officeDocument/2006/math">
                     <m:oMathParaPr>
@@ -9415,7 +9531,7 @@
             </p:txBody>
           </p:sp>
         </mc:Choice>
-        <mc:Fallback>
+        <mc:Fallback xmlns="">
           <p:sp>
             <p:nvSpPr>
               <p:cNvPr id="197" name="TextBox 196">
@@ -9460,8 +9576,8 @@
           </p:sp>
         </mc:Fallback>
       </mc:AlternateContent>
-      <mc:AlternateContent xmlns:mc="http://schemas.openxmlformats.org/markup-compatibility/2006">
-        <mc:Choice xmlns:a14="http://schemas.microsoft.com/office/drawing/2010/main" Requires="a14">
+      <mc:AlternateContent xmlns:mc="http://schemas.openxmlformats.org/markup-compatibility/2006" xmlns:a14="http://schemas.microsoft.com/office/drawing/2010/main">
+        <mc:Choice Requires="a14">
           <p:sp>
             <p:nvSpPr>
               <p:cNvPr id="198" name="TextBox 197">
@@ -9490,6 +9606,7 @@
               </a:bodyPr>
               <a:lstStyle/>
               <a:p>
+                <a:pPr/>
                 <a14:m>
                   <m:oMathPara xmlns:m="http://schemas.openxmlformats.org/officeDocument/2006/math">
                     <m:oMathParaPr>
@@ -9529,7 +9646,7 @@
             </p:txBody>
           </p:sp>
         </mc:Choice>
-        <mc:Fallback>
+        <mc:Fallback xmlns="">
           <p:sp>
             <p:nvSpPr>
               <p:cNvPr id="198" name="TextBox 197">
@@ -9574,8 +9691,8 @@
           </p:sp>
         </mc:Fallback>
       </mc:AlternateContent>
-      <mc:AlternateContent xmlns:mc="http://schemas.openxmlformats.org/markup-compatibility/2006">
-        <mc:Choice xmlns:a14="http://schemas.microsoft.com/office/drawing/2010/main" Requires="a14">
+      <mc:AlternateContent xmlns:mc="http://schemas.openxmlformats.org/markup-compatibility/2006" xmlns:a14="http://schemas.microsoft.com/office/drawing/2010/main">
+        <mc:Choice Requires="a14">
           <p:sp>
             <p:nvSpPr>
               <p:cNvPr id="199" name="TextBox 198">
@@ -9604,6 +9721,7 @@
               </a:bodyPr>
               <a:lstStyle/>
               <a:p>
+                <a:pPr/>
                 <a14:m>
                   <m:oMathPara xmlns:m="http://schemas.openxmlformats.org/officeDocument/2006/math">
                     <m:oMathParaPr>
@@ -9643,7 +9761,7 @@
             </p:txBody>
           </p:sp>
         </mc:Choice>
-        <mc:Fallback>
+        <mc:Fallback xmlns="">
           <p:sp>
             <p:nvSpPr>
               <p:cNvPr id="199" name="TextBox 198">
@@ -9751,8 +9869,8 @@
             </a:fontRef>
           </p:style>
         </p:cxnSp>
-        <mc:AlternateContent xmlns:mc="http://schemas.openxmlformats.org/markup-compatibility/2006">
-          <mc:Choice xmlns:a14="http://schemas.microsoft.com/office/drawing/2010/main" Requires="a14">
+        <mc:AlternateContent xmlns:mc="http://schemas.openxmlformats.org/markup-compatibility/2006" xmlns:a14="http://schemas.microsoft.com/office/drawing/2010/main">
+          <mc:Choice Requires="a14">
             <p:sp>
               <p:nvSpPr>
                 <p:cNvPr id="200" name="TextBox 199">
@@ -9781,6 +9899,7 @@
                 </a:bodyPr>
                 <a:lstStyle/>
                 <a:p>
+                  <a:pPr/>
                   <a14:m>
                     <m:oMathPara xmlns:m="http://schemas.openxmlformats.org/officeDocument/2006/math">
                       <m:oMathParaPr>
@@ -9820,7 +9939,7 @@
               </p:txBody>
             </p:sp>
           </mc:Choice>
-          <mc:Fallback>
+          <mc:Fallback xmlns="">
             <p:sp>
               <p:nvSpPr>
                 <p:cNvPr id="200" name="TextBox 199">
@@ -10180,6 +10299,555 @@
     <p:extLst>
       <p:ext uri="{BB962C8B-B14F-4D97-AF65-F5344CB8AC3E}">
         <p14:creationId xmlns:p14="http://schemas.microsoft.com/office/powerpoint/2010/main" val="2055881703"/>
+      </p:ext>
+    </p:extLst>
+  </p:cSld>
+  <p:clrMapOvr>
+    <a:masterClrMapping/>
+  </p:clrMapOvr>
+</p:sld>
+</file>
+
+<file path=ppt/slides/slide2.xml><?xml version="1.0" encoding="utf-8"?>
+<p:sld xmlns:a="http://schemas.openxmlformats.org/drawingml/2006/main" xmlns:r="http://schemas.openxmlformats.org/officeDocument/2006/relationships" xmlns:p="http://schemas.openxmlformats.org/presentationml/2006/main">
+  <p:cSld>
+    <p:spTree>
+      <p:nvGrpSpPr>
+        <p:cNvPr id="1" name=""/>
+        <p:cNvGrpSpPr/>
+        <p:nvPr/>
+      </p:nvGrpSpPr>
+      <p:grpSpPr>
+        <a:xfrm>
+          <a:off x="0" y="0"/>
+          <a:ext cx="0" cy="0"/>
+          <a:chOff x="0" y="0"/>
+          <a:chExt cx="0" cy="0"/>
+        </a:xfrm>
+      </p:grpSpPr>
+      <p:pic>
+        <p:nvPicPr>
+          <p:cNvPr id="3" name="Picture 2" descr="A blue circles and green lines&#10;&#10;AI-generated content may be incorrect.">
+            <a:extLst>
+              <a:ext uri="{FF2B5EF4-FFF2-40B4-BE49-F238E27FC236}">
+                <a16:creationId xmlns:a16="http://schemas.microsoft.com/office/drawing/2014/main" id="{B3D58153-75CA-7745-F646-268E96C726F6}"/>
+              </a:ext>
+            </a:extLst>
+          </p:cNvPr>
+          <p:cNvPicPr>
+            <a:picLocks noChangeAspect="1"/>
+          </p:cNvPicPr>
+          <p:nvPr/>
+        </p:nvPicPr>
+        <p:blipFill>
+          <a:blip r:embed="rId2"/>
+          <a:stretch>
+            <a:fillRect/>
+          </a:stretch>
+        </p:blipFill>
+        <p:spPr>
+          <a:xfrm>
+            <a:off x="1002553" y="1323415"/>
+            <a:ext cx="5588000" cy="3619500"/>
+          </a:xfrm>
+          <a:prstGeom prst="rect">
+            <a:avLst/>
+          </a:prstGeom>
+        </p:spPr>
+      </p:pic>
+      <p:grpSp>
+        <p:nvGrpSpPr>
+          <p:cNvPr id="4" name="Group 3">
+            <a:extLst>
+              <a:ext uri="{FF2B5EF4-FFF2-40B4-BE49-F238E27FC236}">
+                <a16:creationId xmlns:a16="http://schemas.microsoft.com/office/drawing/2014/main" id="{55BB94D3-42DA-D7AE-3BDC-18C0221FD515}"/>
+              </a:ext>
+            </a:extLst>
+          </p:cNvPr>
+          <p:cNvGrpSpPr/>
+          <p:nvPr/>
+        </p:nvGrpSpPr>
+        <p:grpSpPr>
+          <a:xfrm>
+            <a:off x="8349725" y="2634101"/>
+            <a:ext cx="2590263" cy="1896149"/>
+            <a:chOff x="8716516" y="2927657"/>
+            <a:chExt cx="3993372" cy="2839480"/>
+          </a:xfrm>
+        </p:grpSpPr>
+        <p:grpSp>
+          <p:nvGrpSpPr>
+            <p:cNvPr id="5" name="Group 4">
+              <a:extLst>
+                <a:ext uri="{FF2B5EF4-FFF2-40B4-BE49-F238E27FC236}">
+                  <a16:creationId xmlns:a16="http://schemas.microsoft.com/office/drawing/2014/main" id="{60DA3610-2176-1129-5F8A-F5763275E98C}"/>
+                </a:ext>
+              </a:extLst>
+            </p:cNvPr>
+            <p:cNvGrpSpPr/>
+            <p:nvPr/>
+          </p:nvGrpSpPr>
+          <p:grpSpPr>
+            <a:xfrm>
+              <a:off x="8716516" y="2927657"/>
+              <a:ext cx="3392905" cy="2839480"/>
+              <a:chOff x="8716516" y="2927657"/>
+              <a:chExt cx="3392905" cy="2839480"/>
+            </a:xfrm>
+          </p:grpSpPr>
+          <p:pic>
+            <p:nvPicPr>
+              <p:cNvPr id="7" name="Picture 4" descr="Image result for curved arrow">
+                <a:extLst>
+                  <a:ext uri="{FF2B5EF4-FFF2-40B4-BE49-F238E27FC236}">
+                    <a16:creationId xmlns:a16="http://schemas.microsoft.com/office/drawing/2014/main" id="{47C946D0-0CD7-6C54-CB9D-9240A8BF0873}"/>
+                  </a:ext>
+                </a:extLst>
+              </p:cNvPr>
+              <p:cNvPicPr>
+                <a:picLocks noChangeAspect="1" noChangeArrowheads="1"/>
+              </p:cNvPicPr>
+              <p:nvPr/>
+            </p:nvPicPr>
+            <p:blipFill>
+              <a:blip r:embed="rId3">
+                <a:extLst>
+                  <a:ext uri="{28A0092B-C50C-407E-A947-70E740481C1C}">
+                    <a14:useLocalDpi xmlns:a14="http://schemas.microsoft.com/office/drawing/2010/main" val="0"/>
+                  </a:ext>
+                </a:extLst>
+              </a:blip>
+              <a:srcRect/>
+              <a:stretch>
+                <a:fillRect/>
+              </a:stretch>
+            </p:blipFill>
+            <p:spPr bwMode="auto">
+              <a:xfrm rot="7481367">
+                <a:off x="10864445" y="3228540"/>
+                <a:ext cx="897048" cy="967649"/>
+              </a:xfrm>
+              <a:prstGeom prst="rect">
+                <a:avLst/>
+              </a:prstGeom>
+              <a:noFill/>
+              <a:extLst>
+                <a:ext uri="{909E8E84-426E-40DD-AFC4-6F175D3DCCD1}">
+                  <a14:hiddenFill xmlns:a14="http://schemas.microsoft.com/office/drawing/2010/main">
+                    <a:solidFill>
+                      <a:srgbClr val="FFFFFF"/>
+                    </a:solidFill>
+                  </a14:hiddenFill>
+                </a:ext>
+              </a:extLst>
+            </p:spPr>
+          </p:pic>
+          <p:sp>
+            <p:nvSpPr>
+              <p:cNvPr id="8" name="Oval 7">
+                <a:extLst>
+                  <a:ext uri="{FF2B5EF4-FFF2-40B4-BE49-F238E27FC236}">
+                    <a16:creationId xmlns:a16="http://schemas.microsoft.com/office/drawing/2014/main" id="{FD2E9BE0-9A4C-40B4-625D-E130305525D1}"/>
+                  </a:ext>
+                </a:extLst>
+              </p:cNvPr>
+              <p:cNvSpPr/>
+              <p:nvPr/>
+            </p:nvSpPr>
+            <p:spPr>
+              <a:xfrm>
+                <a:off x="9512969" y="2927657"/>
+                <a:ext cx="1800000" cy="1800000"/>
+              </a:xfrm>
+              <a:prstGeom prst="ellipse">
+                <a:avLst/>
+              </a:prstGeom>
+            </p:spPr>
+            <p:style>
+              <a:lnRef idx="2">
+                <a:schemeClr val="accent1">
+                  <a:shade val="50000"/>
+                </a:schemeClr>
+              </a:lnRef>
+              <a:fillRef idx="1">
+                <a:schemeClr val="accent1"/>
+              </a:fillRef>
+              <a:effectRef idx="0">
+                <a:schemeClr val="accent1"/>
+              </a:effectRef>
+              <a:fontRef idx="minor">
+                <a:schemeClr val="lt1"/>
+              </a:fontRef>
+            </p:style>
+            <p:txBody>
+              <a:bodyPr rtlCol="0" anchor="ctr"/>
+              <a:lstStyle/>
+              <a:p>
+                <a:pPr algn="ctr"/>
+                <a:endParaRPr lang="en-GB"/>
+              </a:p>
+            </p:txBody>
+          </p:sp>
+          <p:sp>
+            <p:nvSpPr>
+              <p:cNvPr id="9" name="Rectangle 8">
+                <a:extLst>
+                  <a:ext uri="{FF2B5EF4-FFF2-40B4-BE49-F238E27FC236}">
+                    <a16:creationId xmlns:a16="http://schemas.microsoft.com/office/drawing/2014/main" id="{462616D0-A515-5F39-1C54-7F7490BD915C}"/>
+                  </a:ext>
+                </a:extLst>
+              </p:cNvPr>
+              <p:cNvSpPr/>
+              <p:nvPr/>
+            </p:nvSpPr>
+            <p:spPr>
+              <a:xfrm>
+                <a:off x="8716516" y="4727657"/>
+                <a:ext cx="3392905" cy="1039480"/>
+              </a:xfrm>
+              <a:prstGeom prst="rect">
+                <a:avLst/>
+              </a:prstGeom>
+              <a:gradFill flip="none" rotWithShape="1">
+                <a:gsLst>
+                  <a:gs pos="49000">
+                    <a:schemeClr val="bg1"/>
+                  </a:gs>
+                  <a:gs pos="100000">
+                    <a:schemeClr val="accent5">
+                      <a:lumMod val="60000"/>
+                    </a:schemeClr>
+                  </a:gs>
+                </a:gsLst>
+                <a:lin ang="16200000" scaled="1"/>
+                <a:tileRect/>
+              </a:gradFill>
+              <a:ln>
+                <a:noFill/>
+              </a:ln>
+            </p:spPr>
+            <p:style>
+              <a:lnRef idx="2">
+                <a:schemeClr val="accent1">
+                  <a:shade val="50000"/>
+                </a:schemeClr>
+              </a:lnRef>
+              <a:fillRef idx="1">
+                <a:schemeClr val="accent1"/>
+              </a:fillRef>
+              <a:effectRef idx="0">
+                <a:schemeClr val="accent1"/>
+              </a:effectRef>
+              <a:fontRef idx="minor">
+                <a:schemeClr val="lt1"/>
+              </a:fontRef>
+            </p:style>
+            <p:txBody>
+              <a:bodyPr rtlCol="0" anchor="ctr"/>
+              <a:lstStyle/>
+              <a:p>
+                <a:pPr algn="ctr"/>
+                <a:endParaRPr lang="en-GB"/>
+              </a:p>
+            </p:txBody>
+          </p:sp>
+          <p:cxnSp>
+            <p:nvCxnSpPr>
+              <p:cNvPr id="10" name="Straight Arrow Connector 9">
+                <a:extLst>
+                  <a:ext uri="{FF2B5EF4-FFF2-40B4-BE49-F238E27FC236}">
+                    <a16:creationId xmlns:a16="http://schemas.microsoft.com/office/drawing/2014/main" id="{282FE7DB-D6EA-0259-7F75-B26381AEB14E}"/>
+                  </a:ext>
+                </a:extLst>
+              </p:cNvPr>
+              <p:cNvCxnSpPr/>
+              <p:nvPr/>
+            </p:nvCxnSpPr>
+            <p:spPr>
+              <a:xfrm>
+                <a:off x="9819327" y="3134492"/>
+                <a:ext cx="641703" cy="693165"/>
+              </a:xfrm>
+              <a:prstGeom prst="straightConnector1">
+                <a:avLst/>
+              </a:prstGeom>
+              <a:ln>
+                <a:solidFill>
+                  <a:schemeClr val="tx1"/>
+                </a:solidFill>
+                <a:headEnd type="triangle"/>
+                <a:tailEnd type="triangle"/>
+              </a:ln>
+            </p:spPr>
+            <p:style>
+              <a:lnRef idx="1">
+                <a:schemeClr val="accent1"/>
+              </a:lnRef>
+              <a:fillRef idx="0">
+                <a:schemeClr val="accent1"/>
+              </a:fillRef>
+              <a:effectRef idx="0">
+                <a:schemeClr val="accent1"/>
+              </a:effectRef>
+              <a:fontRef idx="minor">
+                <a:schemeClr val="tx1"/>
+              </a:fontRef>
+            </p:style>
+          </p:cxnSp>
+          <p:sp>
+            <p:nvSpPr>
+              <p:cNvPr id="11" name="TextBox 10">
+                <a:extLst>
+                  <a:ext uri="{FF2B5EF4-FFF2-40B4-BE49-F238E27FC236}">
+                    <a16:creationId xmlns:a16="http://schemas.microsoft.com/office/drawing/2014/main" id="{4FB76C4B-08B1-3EAC-A0FF-39A83A522A6A}"/>
+                  </a:ext>
+                </a:extLst>
+              </p:cNvPr>
+              <p:cNvSpPr txBox="1"/>
+              <p:nvPr/>
+            </p:nvSpPr>
+            <p:spPr>
+              <a:xfrm>
+                <a:off x="10180400" y="3129117"/>
+                <a:ext cx="527713" cy="646331"/>
+              </a:xfrm>
+              <a:prstGeom prst="rect">
+                <a:avLst/>
+              </a:prstGeom>
+              <a:noFill/>
+            </p:spPr>
+            <p:txBody>
+              <a:bodyPr wrap="square" rtlCol="0">
+                <a:spAutoFit/>
+              </a:bodyPr>
+              <a:lstStyle/>
+              <a:p>
+                <a:r>
+                  <a:rPr lang="en-GB" dirty="0"/>
+                  <a:t>r</a:t>
+                </a:r>
+              </a:p>
+              <a:p>
+                <a:endParaRPr lang="en-GB" dirty="0"/>
+              </a:p>
+            </p:txBody>
+          </p:sp>
+        </p:grpSp>
+        <mc:AlternateContent xmlns:mc="http://schemas.openxmlformats.org/markup-compatibility/2006" xmlns:a14="http://schemas.microsoft.com/office/drawing/2010/main">
+          <mc:Choice Requires="a14">
+            <p:sp>
+              <p:nvSpPr>
+                <p:cNvPr id="6" name="TextBox 5">
+                  <a:extLst>
+                    <a:ext uri="{FF2B5EF4-FFF2-40B4-BE49-F238E27FC236}">
+                      <a16:creationId xmlns:a16="http://schemas.microsoft.com/office/drawing/2014/main" id="{6DFD7044-7745-9F60-CDD7-98F2F92A2D8C}"/>
+                    </a:ext>
+                  </a:extLst>
+                </p:cNvPr>
+                <p:cNvSpPr txBox="1"/>
+                <p:nvPr/>
+              </p:nvSpPr>
+              <p:spPr>
+                <a:xfrm>
+                  <a:off x="10657805" y="3539412"/>
+                  <a:ext cx="2052083" cy="646331"/>
+                </a:xfrm>
+                <a:prstGeom prst="rect">
+                  <a:avLst/>
+                </a:prstGeom>
+                <a:noFill/>
+              </p:spPr>
+              <p:txBody>
+                <a:bodyPr wrap="square" rtlCol="0">
+                  <a:spAutoFit/>
+                </a:bodyPr>
+                <a:lstStyle/>
+                <a:p>
+                  <a:pPr/>
+                  <a14:m>
+                    <m:oMathPara xmlns:m="http://schemas.openxmlformats.org/officeDocument/2006/math">
+                      <m:oMathParaPr>
+                        <m:jc m:val="centerGroup"/>
+                      </m:oMathParaPr>
+                      <m:oMath xmlns:m="http://schemas.openxmlformats.org/officeDocument/2006/math">
+                        <m:r>
+                          <a:rPr lang="en-GB" i="1" smtClean="0">
+                            <a:latin typeface="Cambria Math" panose="02040503050406030204" pitchFamily="18" charset="0"/>
+                            <a:ea typeface="Cambria Math" panose="02040503050406030204" pitchFamily="18" charset="0"/>
+                          </a:rPr>
+                          <m:t>𝜔</m:t>
+                        </m:r>
+                      </m:oMath>
+                    </m:oMathPara>
+                  </a14:m>
+                  <a:endParaRPr lang="en-GB" b="0" dirty="0">
+                    <a:ea typeface="Cambria Math" panose="02040503050406030204" pitchFamily="18" charset="0"/>
+                  </a:endParaRPr>
+                </a:p>
+                <a:p>
+                  <a:endParaRPr lang="en-GB" dirty="0"/>
+                </a:p>
+              </p:txBody>
+            </p:sp>
+          </mc:Choice>
+          <mc:Fallback xmlns="">
+            <p:sp>
+              <p:nvSpPr>
+                <p:cNvPr id="28" name="TextBox 27"/>
+                <p:cNvSpPr txBox="1">
+                  <a:spLocks noRot="1" noChangeAspect="1" noMove="1" noResize="1" noEditPoints="1" noAdjustHandles="1" noChangeArrowheads="1" noChangeShapeType="1" noTextEdit="1"/>
+                </p:cNvSpPr>
+                <p:nvPr/>
+              </p:nvSpPr>
+              <p:spPr>
+                <a:xfrm>
+                  <a:off x="10657805" y="3539412"/>
+                  <a:ext cx="2052083" cy="646331"/>
+                </a:xfrm>
+                <a:prstGeom prst="rect">
+                  <a:avLst/>
+                </a:prstGeom>
+                <a:blipFill rotWithShape="0">
+                  <a:blip r:embed="rId4"/>
+                  <a:stretch>
+                    <a:fillRect/>
+                  </a:stretch>
+                </a:blipFill>
+              </p:spPr>
+              <p:txBody>
+                <a:bodyPr/>
+                <a:lstStyle/>
+                <a:p>
+                  <a:r>
+                    <a:rPr lang="en-GB">
+                      <a:noFill/>
+                    </a:rPr>
+                    <a:t> </a:t>
+                  </a:r>
+                </a:p>
+              </p:txBody>
+            </p:sp>
+          </mc:Fallback>
+        </mc:AlternateContent>
+      </p:grpSp>
+      <mc:AlternateContent xmlns:mc="http://schemas.openxmlformats.org/markup-compatibility/2006">
+        <mc:Choice xmlns:a14="http://schemas.microsoft.com/office/drawing/2010/main" Requires="a14">
+          <p:sp>
+            <p:nvSpPr>
+              <p:cNvPr id="12" name="Rectangle 11">
+                <a:extLst>
+                  <a:ext uri="{FF2B5EF4-FFF2-40B4-BE49-F238E27FC236}">
+                    <a16:creationId xmlns:a16="http://schemas.microsoft.com/office/drawing/2014/main" id="{1F7429F0-B60D-A975-4D0F-D190CBC16DD5}"/>
+                  </a:ext>
+                </a:extLst>
+              </p:cNvPr>
+              <p:cNvSpPr/>
+              <p:nvPr/>
+            </p:nvSpPr>
+            <p:spPr>
+              <a:xfrm>
+                <a:off x="9020219" y="2063395"/>
+                <a:ext cx="859787" cy="369332"/>
+              </a:xfrm>
+              <a:prstGeom prst="rect">
+                <a:avLst/>
+              </a:prstGeom>
+            </p:spPr>
+            <p:txBody>
+              <a:bodyPr wrap="none">
+                <a:spAutoFit/>
+              </a:bodyPr>
+              <a:lstStyle/>
+              <a:p>
+                <a:pPr/>
+                <a14:m>
+                  <m:oMathPara xmlns:m="http://schemas.openxmlformats.org/officeDocument/2006/math">
+                    <m:oMathParaPr>
+                      <m:jc m:val="centerGroup"/>
+                    </m:oMathParaPr>
+                    <m:oMath xmlns:m="http://schemas.openxmlformats.org/officeDocument/2006/math">
+                      <m:sSub>
+                        <m:sSubPr>
+                          <m:ctrlPr>
+                            <a:rPr lang="en-US" i="1">
+                              <a:latin typeface="Cambria Math" panose="02040503050406030204" pitchFamily="18" charset="0"/>
+                            </a:rPr>
+                          </m:ctrlPr>
+                        </m:sSubPr>
+                        <m:e>
+                          <m:r>
+                            <a:rPr lang="en-GB" i="1">
+                              <a:latin typeface="Cambria Math" panose="02040503050406030204" pitchFamily="18" charset="0"/>
+                            </a:rPr>
+                            <m:t>𝑣</m:t>
+                          </m:r>
+                        </m:e>
+                        <m:sub>
+                          <m:r>
+                            <a:rPr lang="en-GB" i="1">
+                              <a:latin typeface="Cambria Math" charset="0"/>
+                            </a:rPr>
+                            <m:t>𝑤h𝑒𝑒𝑙</m:t>
+                          </m:r>
+                        </m:sub>
+                      </m:sSub>
+                    </m:oMath>
+                  </m:oMathPara>
+                </a14:m>
+                <a:endParaRPr lang="en-US" dirty="0"/>
+              </a:p>
+            </p:txBody>
+          </p:sp>
+        </mc:Choice>
+        <mc:Fallback>
+          <p:sp>
+            <p:nvSpPr>
+              <p:cNvPr id="12" name="Rectangle 11">
+                <a:extLst>
+                  <a:ext uri="{FF2B5EF4-FFF2-40B4-BE49-F238E27FC236}">
+                    <a16:creationId xmlns:a16="http://schemas.microsoft.com/office/drawing/2014/main" id="{1F7429F0-B60D-A975-4D0F-D190CBC16DD5}"/>
+                  </a:ext>
+                </a:extLst>
+              </p:cNvPr>
+              <p:cNvSpPr>
+                <a:spLocks noRot="1" noChangeAspect="1" noMove="1" noResize="1" noEditPoints="1" noAdjustHandles="1" noChangeArrowheads="1" noChangeShapeType="1" noTextEdit="1"/>
+              </p:cNvSpPr>
+              <p:nvPr/>
+            </p:nvSpPr>
+            <p:spPr>
+              <a:xfrm>
+                <a:off x="9020219" y="2063395"/>
+                <a:ext cx="859787" cy="369332"/>
+              </a:xfrm>
+              <a:prstGeom prst="rect">
+                <a:avLst/>
+              </a:prstGeom>
+              <a:blipFill>
+                <a:blip r:embed="rId5"/>
+                <a:stretch>
+                  <a:fillRect/>
+                </a:stretch>
+              </a:blipFill>
+            </p:spPr>
+            <p:txBody>
+              <a:bodyPr/>
+              <a:lstStyle/>
+              <a:p>
+                <a:r>
+                  <a:rPr lang="en-US">
+                    <a:noFill/>
+                  </a:rPr>
+                  <a:t> </a:t>
+                </a:r>
+              </a:p>
+            </p:txBody>
+          </p:sp>
+        </mc:Fallback>
+      </mc:AlternateContent>
+    </p:spTree>
+    <p:extLst>
+      <p:ext uri="{BB962C8B-B14F-4D97-AF65-F5344CB8AC3E}">
+        <p14:creationId xmlns:p14="http://schemas.microsoft.com/office/powerpoint/2010/main" val="3011264781"/>
       </p:ext>
     </p:extLst>
   </p:cSld>

</xml_diff>

<commit_message>
HP updated week 10 lab exercises
</commit_message>
<xml_diff>
--- a/media/week_10/diagrams.pptx
+++ b/media/week_10/diagrams.pptx
@@ -5084,8 +5084,8 @@
           </a:p>
         </p:txBody>
       </p:sp>
-      <mc:AlternateContent xmlns:mc="http://schemas.openxmlformats.org/markup-compatibility/2006" xmlns:a14="http://schemas.microsoft.com/office/drawing/2010/main">
-        <mc:Choice Requires="a14">
+      <mc:AlternateContent xmlns:mc="http://schemas.openxmlformats.org/markup-compatibility/2006">
+        <mc:Choice xmlns:a14="http://schemas.microsoft.com/office/drawing/2010/main" Requires="a14">
           <p:sp>
             <p:nvSpPr>
               <p:cNvPr id="37" name="TextBox 36">
@@ -5157,14 +5157,14 @@
                   </m:oMath>
                 </a14:m>
                 <a:r>
-                  <a:rPr lang="en-US" sz="1100" dirty="0"/>
+                  <a:rPr lang="en-US" sz="1100"/>
                   <a:t> radians</a:t>
                 </a:r>
               </a:p>
             </p:txBody>
           </p:sp>
         </mc:Choice>
-        <mc:Fallback xmlns="">
+        <mc:Fallback>
           <p:sp>
             <p:nvSpPr>
               <p:cNvPr id="37" name="TextBox 36">
@@ -5209,8 +5209,8 @@
           </p:sp>
         </mc:Fallback>
       </mc:AlternateContent>
-      <mc:AlternateContent xmlns:mc="http://schemas.openxmlformats.org/markup-compatibility/2006" xmlns:a14="http://schemas.microsoft.com/office/drawing/2010/main">
-        <mc:Choice Requires="a14">
+      <mc:AlternateContent xmlns:mc="http://schemas.openxmlformats.org/markup-compatibility/2006">
+        <mc:Choice xmlns:a14="http://schemas.microsoft.com/office/drawing/2010/main" Requires="a14">
           <p:sp>
             <p:nvSpPr>
               <p:cNvPr id="38" name="TextBox 37">
@@ -5283,14 +5283,14 @@
                   </m:oMath>
                 </a14:m>
                 <a:r>
-                  <a:rPr lang="en-US" sz="1100" dirty="0"/>
+                  <a:rPr lang="en-US" sz="1100"/>
                   <a:t> radians</a:t>
                 </a:r>
               </a:p>
             </p:txBody>
           </p:sp>
         </mc:Choice>
-        <mc:Fallback xmlns="">
+        <mc:Fallback>
           <p:sp>
             <p:nvSpPr>
               <p:cNvPr id="38" name="TextBox 37">
@@ -5335,8 +5335,8 @@
           </p:sp>
         </mc:Fallback>
       </mc:AlternateContent>
-      <mc:AlternateContent xmlns:mc="http://schemas.openxmlformats.org/markup-compatibility/2006" xmlns:a14="http://schemas.microsoft.com/office/drawing/2010/main">
-        <mc:Choice Requires="a14">
+      <mc:AlternateContent xmlns:mc="http://schemas.openxmlformats.org/markup-compatibility/2006">
+        <mc:Choice xmlns:a14="http://schemas.microsoft.com/office/drawing/2010/main" Requires="a14">
           <p:sp>
             <p:nvSpPr>
               <p:cNvPr id="39" name="TextBox 38">
@@ -5382,14 +5382,14 @@
                   </m:oMath>
                 </a14:m>
                 <a:r>
-                  <a:rPr lang="en-US" sz="1100" dirty="0"/>
+                  <a:rPr lang="en-US" sz="1100"/>
                   <a:t>radians</a:t>
                 </a:r>
               </a:p>
             </p:txBody>
           </p:sp>
         </mc:Choice>
-        <mc:Fallback xmlns="">
+        <mc:Fallback>
           <p:sp>
             <p:nvSpPr>
               <p:cNvPr id="39" name="TextBox 38">
@@ -5479,8 +5479,8 @@
           </a:fontRef>
         </p:style>
       </p:cxnSp>
-      <mc:AlternateContent xmlns:mc="http://schemas.openxmlformats.org/markup-compatibility/2006" xmlns:a14="http://schemas.microsoft.com/office/drawing/2010/main">
-        <mc:Choice Requires="a14">
+      <mc:AlternateContent xmlns:mc="http://schemas.openxmlformats.org/markup-compatibility/2006">
+        <mc:Choice xmlns:a14="http://schemas.microsoft.com/office/drawing/2010/main" Requires="a14">
           <p:sp>
             <p:nvSpPr>
               <p:cNvPr id="54" name="TextBox 53">
@@ -5526,14 +5526,14 @@
                   </m:oMath>
                 </a14:m>
                 <a:r>
-                  <a:rPr lang="en-US" sz="900" dirty="0"/>
+                  <a:rPr lang="en-US" sz="900"/>
                   <a:t>mm</a:t>
                 </a:r>
               </a:p>
             </p:txBody>
           </p:sp>
         </mc:Choice>
-        <mc:Fallback xmlns="">
+        <mc:Fallback>
           <p:sp>
             <p:nvSpPr>
               <p:cNvPr id="54" name="TextBox 53">
@@ -5715,14 +5715,14 @@
           <a:lstStyle/>
           <a:p>
             <a:r>
-              <a:rPr lang="en-US" sz="1200" dirty="0"/>
+              <a:rPr lang="en-US" sz="1200"/>
               <a:t>B</a:t>
             </a:r>
           </a:p>
         </p:txBody>
       </p:sp>
-      <mc:AlternateContent xmlns:mc="http://schemas.openxmlformats.org/markup-compatibility/2006" xmlns:a14="http://schemas.microsoft.com/office/drawing/2010/main">
-        <mc:Choice Requires="a14">
+      <mc:AlternateContent xmlns:mc="http://schemas.openxmlformats.org/markup-compatibility/2006">
+        <mc:Choice xmlns:a14="http://schemas.microsoft.com/office/drawing/2010/main" Requires="a14">
           <p:sp>
             <p:nvSpPr>
               <p:cNvPr id="146" name="TextBox 145">
@@ -5786,12 +5786,12 @@
                     </m:oMath>
                   </m:oMathPara>
                 </a14:m>
-                <a:endParaRPr lang="en-US" dirty="0"/>
+                <a:endParaRPr lang="en-US"/>
               </a:p>
             </p:txBody>
           </p:sp>
         </mc:Choice>
-        <mc:Fallback xmlns="">
+        <mc:Fallback>
           <p:sp>
             <p:nvSpPr>
               <p:cNvPr id="146" name="TextBox 145">
@@ -5836,8 +5836,8 @@
           </p:sp>
         </mc:Fallback>
       </mc:AlternateContent>
-      <mc:AlternateContent xmlns:mc="http://schemas.openxmlformats.org/markup-compatibility/2006" xmlns:a14="http://schemas.microsoft.com/office/drawing/2010/main">
-        <mc:Choice Requires="a14">
+      <mc:AlternateContent xmlns:mc="http://schemas.openxmlformats.org/markup-compatibility/2006">
+        <mc:Choice xmlns:a14="http://schemas.microsoft.com/office/drawing/2010/main" Requires="a14">
           <p:sp>
             <p:nvSpPr>
               <p:cNvPr id="147" name="TextBox 146">
@@ -5901,12 +5901,12 @@
                     </m:oMath>
                   </m:oMathPara>
                 </a14:m>
-                <a:endParaRPr lang="en-US" dirty="0"/>
+                <a:endParaRPr lang="en-US"/>
               </a:p>
             </p:txBody>
           </p:sp>
         </mc:Choice>
-        <mc:Fallback xmlns="">
+        <mc:Fallback>
           <p:sp>
             <p:nvSpPr>
               <p:cNvPr id="147" name="TextBox 146">
@@ -5951,8 +5951,8 @@
           </p:sp>
         </mc:Fallback>
       </mc:AlternateContent>
-      <mc:AlternateContent xmlns:mc="http://schemas.openxmlformats.org/markup-compatibility/2006" xmlns:a14="http://schemas.microsoft.com/office/drawing/2010/main">
-        <mc:Choice Requires="a14">
+      <mc:AlternateContent xmlns:mc="http://schemas.openxmlformats.org/markup-compatibility/2006">
+        <mc:Choice xmlns:a14="http://schemas.microsoft.com/office/drawing/2010/main" Requires="a14">
           <p:sp>
             <p:nvSpPr>
               <p:cNvPr id="148" name="TextBox 147">
@@ -6016,12 +6016,12 @@
                     </m:oMath>
                   </m:oMathPara>
                 </a14:m>
-                <a:endParaRPr lang="en-US" dirty="0"/>
+                <a:endParaRPr lang="en-US"/>
               </a:p>
             </p:txBody>
           </p:sp>
         </mc:Choice>
-        <mc:Fallback xmlns="">
+        <mc:Fallback>
           <p:sp>
             <p:nvSpPr>
               <p:cNvPr id="148" name="TextBox 147">
@@ -6066,8 +6066,8 @@
           </p:sp>
         </mc:Fallback>
       </mc:AlternateContent>
-      <mc:AlternateContent xmlns:mc="http://schemas.openxmlformats.org/markup-compatibility/2006" xmlns:a14="http://schemas.microsoft.com/office/drawing/2010/main">
-        <mc:Choice Requires="a14">
+      <mc:AlternateContent xmlns:mc="http://schemas.openxmlformats.org/markup-compatibility/2006">
+        <mc:Choice xmlns:a14="http://schemas.microsoft.com/office/drawing/2010/main" Requires="a14">
           <p:sp>
             <p:nvSpPr>
               <p:cNvPr id="149" name="TextBox 148">
@@ -6131,12 +6131,12 @@
                     </m:oMath>
                   </m:oMathPara>
                 </a14:m>
-                <a:endParaRPr lang="en-US" dirty="0"/>
+                <a:endParaRPr lang="en-US"/>
               </a:p>
             </p:txBody>
           </p:sp>
         </mc:Choice>
-        <mc:Fallback xmlns="">
+        <mc:Fallback>
           <p:sp>
             <p:nvSpPr>
               <p:cNvPr id="149" name="TextBox 148">
@@ -6531,8 +6531,8 @@
           </p:style>
         </p:cxnSp>
       </p:grpSp>
-      <mc:AlternateContent xmlns:mc="http://schemas.openxmlformats.org/markup-compatibility/2006" xmlns:a14="http://schemas.microsoft.com/office/drawing/2010/main">
-        <mc:Choice Requires="a14">
+      <mc:AlternateContent xmlns:mc="http://schemas.openxmlformats.org/markup-compatibility/2006">
+        <mc:Choice xmlns:a14="http://schemas.microsoft.com/office/drawing/2010/main" Requires="a14">
           <p:sp>
             <p:nvSpPr>
               <p:cNvPr id="165" name="TextBox 164">
@@ -6596,12 +6596,12 @@
                     </m:oMath>
                   </m:oMathPara>
                 </a14:m>
-                <a:endParaRPr lang="en-US" dirty="0"/>
+                <a:endParaRPr lang="en-US"/>
               </a:p>
             </p:txBody>
           </p:sp>
         </mc:Choice>
-        <mc:Fallback xmlns="">
+        <mc:Fallback>
           <p:sp>
             <p:nvSpPr>
               <p:cNvPr id="165" name="TextBox 164">
@@ -6646,8 +6646,8 @@
           </p:sp>
         </mc:Fallback>
       </mc:AlternateContent>
-      <mc:AlternateContent xmlns:mc="http://schemas.openxmlformats.org/markup-compatibility/2006" xmlns:a14="http://schemas.microsoft.com/office/drawing/2010/main">
-        <mc:Choice Requires="a14">
+      <mc:AlternateContent xmlns:mc="http://schemas.openxmlformats.org/markup-compatibility/2006">
+        <mc:Choice xmlns:a14="http://schemas.microsoft.com/office/drawing/2010/main" Requires="a14">
           <p:sp>
             <p:nvSpPr>
               <p:cNvPr id="166" name="TextBox 165">
@@ -6711,12 +6711,12 @@
                     </m:oMath>
                   </m:oMathPara>
                 </a14:m>
-                <a:endParaRPr lang="en-US" dirty="0"/>
+                <a:endParaRPr lang="en-US"/>
               </a:p>
             </p:txBody>
           </p:sp>
         </mc:Choice>
-        <mc:Fallback xmlns="">
+        <mc:Fallback>
           <p:sp>
             <p:nvSpPr>
               <p:cNvPr id="166" name="TextBox 165">
@@ -6761,8 +6761,8 @@
           </p:sp>
         </mc:Fallback>
       </mc:AlternateContent>
-      <mc:AlternateContent xmlns:mc="http://schemas.openxmlformats.org/markup-compatibility/2006" xmlns:a14="http://schemas.microsoft.com/office/drawing/2010/main">
-        <mc:Choice Requires="a14">
+      <mc:AlternateContent xmlns:mc="http://schemas.openxmlformats.org/markup-compatibility/2006">
+        <mc:Choice xmlns:a14="http://schemas.microsoft.com/office/drawing/2010/main" Requires="a14">
           <p:sp>
             <p:nvSpPr>
               <p:cNvPr id="167" name="TextBox 166">
@@ -6826,12 +6826,12 @@
                     </m:oMath>
                   </m:oMathPara>
                 </a14:m>
-                <a:endParaRPr lang="en-US" dirty="0"/>
+                <a:endParaRPr lang="en-US"/>
               </a:p>
             </p:txBody>
           </p:sp>
         </mc:Choice>
-        <mc:Fallback xmlns="">
+        <mc:Fallback>
           <p:sp>
             <p:nvSpPr>
               <p:cNvPr id="167" name="TextBox 166">
@@ -6876,8 +6876,8 @@
           </p:sp>
         </mc:Fallback>
       </mc:AlternateContent>
-      <mc:AlternateContent xmlns:mc="http://schemas.openxmlformats.org/markup-compatibility/2006" xmlns:a14="http://schemas.microsoft.com/office/drawing/2010/main">
-        <mc:Choice Requires="a14">
+      <mc:AlternateContent xmlns:mc="http://schemas.openxmlformats.org/markup-compatibility/2006">
+        <mc:Choice xmlns:a14="http://schemas.microsoft.com/office/drawing/2010/main" Requires="a14">
           <p:sp>
             <p:nvSpPr>
               <p:cNvPr id="168" name="TextBox 167">
@@ -6941,12 +6941,12 @@
                     </m:oMath>
                   </m:oMathPara>
                 </a14:m>
-                <a:endParaRPr lang="en-US" dirty="0"/>
+                <a:endParaRPr lang="en-US"/>
               </a:p>
             </p:txBody>
           </p:sp>
         </mc:Choice>
-        <mc:Fallback xmlns="">
+        <mc:Fallback>
           <p:sp>
             <p:nvSpPr>
               <p:cNvPr id="168" name="TextBox 167">
@@ -7341,8 +7341,8 @@
           </p:style>
         </p:cxnSp>
       </p:grpSp>
-      <mc:AlternateContent xmlns:mc="http://schemas.openxmlformats.org/markup-compatibility/2006" xmlns:a14="http://schemas.microsoft.com/office/drawing/2010/main">
-        <mc:Choice Requires="a14">
+      <mc:AlternateContent xmlns:mc="http://schemas.openxmlformats.org/markup-compatibility/2006">
+        <mc:Choice xmlns:a14="http://schemas.microsoft.com/office/drawing/2010/main" Requires="a14">
           <p:sp>
             <p:nvSpPr>
               <p:cNvPr id="178" name="TextBox 177">
@@ -7406,12 +7406,12 @@
                     </m:oMath>
                   </m:oMathPara>
                 </a14:m>
-                <a:endParaRPr lang="en-US" dirty="0"/>
+                <a:endParaRPr lang="en-US"/>
               </a:p>
             </p:txBody>
           </p:sp>
         </mc:Choice>
-        <mc:Fallback xmlns="">
+        <mc:Fallback>
           <p:sp>
             <p:nvSpPr>
               <p:cNvPr id="178" name="TextBox 177">
@@ -7456,8 +7456,8 @@
           </p:sp>
         </mc:Fallback>
       </mc:AlternateContent>
-      <mc:AlternateContent xmlns:mc="http://schemas.openxmlformats.org/markup-compatibility/2006" xmlns:a14="http://schemas.microsoft.com/office/drawing/2010/main">
-        <mc:Choice Requires="a14">
+      <mc:AlternateContent xmlns:mc="http://schemas.openxmlformats.org/markup-compatibility/2006">
+        <mc:Choice xmlns:a14="http://schemas.microsoft.com/office/drawing/2010/main" Requires="a14">
           <p:sp>
             <p:nvSpPr>
               <p:cNvPr id="179" name="TextBox 178">
@@ -7521,12 +7521,12 @@
                     </m:oMath>
                   </m:oMathPara>
                 </a14:m>
-                <a:endParaRPr lang="en-US" dirty="0"/>
+                <a:endParaRPr lang="en-US"/>
               </a:p>
             </p:txBody>
           </p:sp>
         </mc:Choice>
-        <mc:Fallback xmlns="">
+        <mc:Fallback>
           <p:sp>
             <p:nvSpPr>
               <p:cNvPr id="179" name="TextBox 178">
@@ -7571,8 +7571,8 @@
           </p:sp>
         </mc:Fallback>
       </mc:AlternateContent>
-      <mc:AlternateContent xmlns:mc="http://schemas.openxmlformats.org/markup-compatibility/2006" xmlns:a14="http://schemas.microsoft.com/office/drawing/2010/main">
-        <mc:Choice Requires="a14">
+      <mc:AlternateContent xmlns:mc="http://schemas.openxmlformats.org/markup-compatibility/2006">
+        <mc:Choice xmlns:a14="http://schemas.microsoft.com/office/drawing/2010/main" Requires="a14">
           <p:sp>
             <p:nvSpPr>
               <p:cNvPr id="180" name="TextBox 179">
@@ -7636,12 +7636,12 @@
                     </m:oMath>
                   </m:oMathPara>
                 </a14:m>
-                <a:endParaRPr lang="en-US" dirty="0"/>
+                <a:endParaRPr lang="en-US"/>
               </a:p>
             </p:txBody>
           </p:sp>
         </mc:Choice>
-        <mc:Fallback xmlns="">
+        <mc:Fallback>
           <p:sp>
             <p:nvSpPr>
               <p:cNvPr id="180" name="TextBox 179">
@@ -7686,8 +7686,8 @@
           </p:sp>
         </mc:Fallback>
       </mc:AlternateContent>
-      <mc:AlternateContent xmlns:mc="http://schemas.openxmlformats.org/markup-compatibility/2006" xmlns:a14="http://schemas.microsoft.com/office/drawing/2010/main">
-        <mc:Choice Requires="a14">
+      <mc:AlternateContent xmlns:mc="http://schemas.openxmlformats.org/markup-compatibility/2006">
+        <mc:Choice xmlns:a14="http://schemas.microsoft.com/office/drawing/2010/main" Requires="a14">
           <p:sp>
             <p:nvSpPr>
               <p:cNvPr id="181" name="TextBox 180">
@@ -7751,12 +7751,12 @@
                     </m:oMath>
                   </m:oMathPara>
                 </a14:m>
-                <a:endParaRPr lang="en-US" dirty="0"/>
+                <a:endParaRPr lang="en-US"/>
               </a:p>
             </p:txBody>
           </p:sp>
         </mc:Choice>
-        <mc:Fallback xmlns="">
+        <mc:Fallback>
           <p:sp>
             <p:nvSpPr>
               <p:cNvPr id="181" name="TextBox 180">
@@ -8990,7 +8990,7 @@
             <a:lstStyle/>
             <a:p>
               <a:r>
-                <a:rPr lang="en-US" sz="1200" dirty="0"/>
+                <a:rPr lang="en-US" sz="1200"/>
                 <a:t>A</a:t>
               </a:r>
             </a:p>
@@ -9025,7 +9025,7 @@
             <a:lstStyle/>
             <a:p>
               <a:r>
-                <a:rPr lang="en-US" sz="1200" dirty="0"/>
+                <a:rPr lang="en-US" sz="1200"/>
                 <a:t>B</a:t>
               </a:r>
             </a:p>
@@ -9060,7 +9060,7 @@
             <a:lstStyle/>
             <a:p>
               <a:r>
-                <a:rPr lang="en-US" sz="1200" dirty="0"/>
+                <a:rPr lang="en-US" sz="1200"/>
                 <a:t>C</a:t>
               </a:r>
             </a:p>
@@ -9095,7 +9095,7 @@
             <a:lstStyle/>
             <a:p>
               <a:r>
-                <a:rPr lang="en-US" sz="1200" dirty="0"/>
+                <a:rPr lang="en-US" sz="1200"/>
                 <a:t>A</a:t>
               </a:r>
             </a:p>
@@ -9130,7 +9130,7 @@
             <a:lstStyle/>
             <a:p>
               <a:r>
-                <a:rPr lang="en-US" sz="1200" dirty="0"/>
+                <a:rPr lang="en-US" sz="1200"/>
                 <a:t>C</a:t>
               </a:r>
             </a:p>
@@ -9165,7 +9165,7 @@
             <a:lstStyle/>
             <a:p>
               <a:r>
-                <a:rPr lang="en-US" sz="1200" dirty="0"/>
+                <a:rPr lang="en-US" sz="1200"/>
                 <a:t>A</a:t>
               </a:r>
             </a:p>
@@ -9200,7 +9200,7 @@
             <a:lstStyle/>
             <a:p>
               <a:r>
-                <a:rPr lang="en-US" sz="1200" dirty="0"/>
+                <a:rPr lang="en-US" sz="1200"/>
                 <a:t>B</a:t>
               </a:r>
             </a:p>
@@ -9235,7 +9235,7 @@
             <a:lstStyle/>
             <a:p>
               <a:r>
-                <a:rPr lang="en-US" sz="1200" dirty="0"/>
+                <a:rPr lang="en-US" sz="1200"/>
                 <a:t>C</a:t>
               </a:r>
             </a:p>
@@ -9270,7 +9270,7 @@
             <a:lstStyle/>
             <a:p>
               <a:r>
-                <a:rPr lang="en-US" sz="1200" dirty="0"/>
+                <a:rPr lang="en-US" sz="1200"/>
                 <a:t>clockwise</a:t>
               </a:r>
             </a:p>
@@ -9305,7 +9305,7 @@
             <a:lstStyle/>
             <a:p>
               <a:r>
-                <a:rPr lang="en-US" sz="1200" dirty="0"/>
+                <a:rPr lang="en-US" sz="1200"/>
                 <a:t>counter-clockwise</a:t>
               </a:r>
             </a:p>
@@ -9340,7 +9340,7 @@
             <a:lstStyle/>
             <a:p>
               <a:r>
-                <a:rPr lang="en-US" sz="1200" dirty="0"/>
+                <a:rPr lang="en-US" sz="1200"/>
                 <a:t>colinear</a:t>
               </a:r>
             </a:p>
@@ -9376,7 +9376,7 @@
           <a:lstStyle/>
           <a:p>
             <a:r>
-              <a:rPr lang="en-US" sz="1200" dirty="0"/>
+              <a:rPr lang="en-US" sz="1200"/>
               <a:t>overlapping</a:t>
             </a:r>
           </a:p>
@@ -9411,7 +9411,7 @@
           <a:lstStyle/>
           <a:p>
             <a:r>
-              <a:rPr lang="en-US" sz="1200" dirty="0"/>
+              <a:rPr lang="en-US" sz="1200"/>
               <a:t>not overlapping</a:t>
             </a:r>
           </a:p>
@@ -9461,8 +9461,8 @@
           </a:fontRef>
         </p:style>
       </p:cxnSp>
-      <mc:AlternateContent xmlns:mc="http://schemas.openxmlformats.org/markup-compatibility/2006" xmlns:a14="http://schemas.microsoft.com/office/drawing/2010/main">
-        <mc:Choice Requires="a14">
+      <mc:AlternateContent xmlns:mc="http://schemas.openxmlformats.org/markup-compatibility/2006">
+        <mc:Choice xmlns:a14="http://schemas.microsoft.com/office/drawing/2010/main" Requires="a14">
           <p:sp>
             <p:nvSpPr>
               <p:cNvPr id="197" name="TextBox 196">
@@ -9526,12 +9526,12 @@
                     </m:oMath>
                   </m:oMathPara>
                 </a14:m>
-                <a:endParaRPr lang="en-US" dirty="0"/>
+                <a:endParaRPr lang="en-US"/>
               </a:p>
             </p:txBody>
           </p:sp>
         </mc:Choice>
-        <mc:Fallback xmlns="">
+        <mc:Fallback>
           <p:sp>
             <p:nvSpPr>
               <p:cNvPr id="197" name="TextBox 196">
@@ -9576,8 +9576,8 @@
           </p:sp>
         </mc:Fallback>
       </mc:AlternateContent>
-      <mc:AlternateContent xmlns:mc="http://schemas.openxmlformats.org/markup-compatibility/2006" xmlns:a14="http://schemas.microsoft.com/office/drawing/2010/main">
-        <mc:Choice Requires="a14">
+      <mc:AlternateContent xmlns:mc="http://schemas.openxmlformats.org/markup-compatibility/2006">
+        <mc:Choice xmlns:a14="http://schemas.microsoft.com/office/drawing/2010/main" Requires="a14">
           <p:sp>
             <p:nvSpPr>
               <p:cNvPr id="198" name="TextBox 197">
@@ -9641,12 +9641,12 @@
                     </m:oMath>
                   </m:oMathPara>
                 </a14:m>
-                <a:endParaRPr lang="en-US" dirty="0"/>
+                <a:endParaRPr lang="en-US"/>
               </a:p>
             </p:txBody>
           </p:sp>
         </mc:Choice>
-        <mc:Fallback xmlns="">
+        <mc:Fallback>
           <p:sp>
             <p:nvSpPr>
               <p:cNvPr id="198" name="TextBox 197">
@@ -9691,8 +9691,8 @@
           </p:sp>
         </mc:Fallback>
       </mc:AlternateContent>
-      <mc:AlternateContent xmlns:mc="http://schemas.openxmlformats.org/markup-compatibility/2006" xmlns:a14="http://schemas.microsoft.com/office/drawing/2010/main">
-        <mc:Choice Requires="a14">
+      <mc:AlternateContent xmlns:mc="http://schemas.openxmlformats.org/markup-compatibility/2006">
+        <mc:Choice xmlns:a14="http://schemas.microsoft.com/office/drawing/2010/main" Requires="a14">
           <p:sp>
             <p:nvSpPr>
               <p:cNvPr id="199" name="TextBox 198">
@@ -9756,12 +9756,12 @@
                     </m:oMath>
                   </m:oMathPara>
                 </a14:m>
-                <a:endParaRPr lang="en-US" dirty="0"/>
+                <a:endParaRPr lang="en-US"/>
               </a:p>
             </p:txBody>
           </p:sp>
         </mc:Choice>
-        <mc:Fallback xmlns="">
+        <mc:Fallback>
           <p:sp>
             <p:nvSpPr>
               <p:cNvPr id="199" name="TextBox 198">
@@ -9869,8 +9869,8 @@
             </a:fontRef>
           </p:style>
         </p:cxnSp>
-        <mc:AlternateContent xmlns:mc="http://schemas.openxmlformats.org/markup-compatibility/2006" xmlns:a14="http://schemas.microsoft.com/office/drawing/2010/main">
-          <mc:Choice Requires="a14">
+        <mc:AlternateContent xmlns:mc="http://schemas.openxmlformats.org/markup-compatibility/2006">
+          <mc:Choice xmlns:a14="http://schemas.microsoft.com/office/drawing/2010/main" Requires="a14">
             <p:sp>
               <p:nvSpPr>
                 <p:cNvPr id="200" name="TextBox 199">
@@ -9934,12 +9934,12 @@
                       </m:oMath>
                     </m:oMathPara>
                   </a14:m>
-                  <a:endParaRPr lang="en-US" dirty="0"/>
+                  <a:endParaRPr lang="en-US"/>
                 </a:p>
               </p:txBody>
             </p:sp>
           </mc:Choice>
-          <mc:Fallback xmlns="">
+          <mc:Fallback>
             <p:sp>
               <p:nvSpPr>
                 <p:cNvPr id="200" name="TextBox 199">
@@ -10254,7 +10254,7 @@
           <a:lstStyle/>
           <a:p>
             <a:r>
-              <a:rPr lang="en-US" sz="1200" dirty="0"/>
+              <a:rPr lang="en-US" sz="1200"/>
               <a:t>intersecting</a:t>
             </a:r>
           </a:p>
@@ -10289,7 +10289,7 @@
           <a:lstStyle/>
           <a:p>
             <a:r>
-              <a:rPr lang="en-US" sz="1200" dirty="0"/>
+              <a:rPr lang="en-US" sz="1200"/>
               <a:t>not intersecting</a:t>
             </a:r>
           </a:p>
@@ -10623,18 +10623,18 @@
               <a:lstStyle/>
               <a:p>
                 <a:r>
-                  <a:rPr lang="en-GB" dirty="0"/>
+                  <a:rPr lang="en-GB"/>
                   <a:t>r</a:t>
                 </a:r>
               </a:p>
               <a:p>
-                <a:endParaRPr lang="en-GB" dirty="0"/>
+                <a:endParaRPr lang="en-GB"/>
               </a:p>
             </p:txBody>
           </p:sp>
         </p:grpSp>
-        <mc:AlternateContent xmlns:mc="http://schemas.openxmlformats.org/markup-compatibility/2006" xmlns:a14="http://schemas.microsoft.com/office/drawing/2010/main">
-          <mc:Choice Requires="a14">
+        <mc:AlternateContent xmlns:mc="http://schemas.openxmlformats.org/markup-compatibility/2006">
+          <mc:Choice xmlns:a14="http://schemas.microsoft.com/office/drawing/2010/main" Requires="a14">
             <p:sp>
               <p:nvSpPr>
                 <p:cNvPr id="6" name="TextBox 5">
@@ -10680,20 +10680,26 @@
                       </m:oMath>
                     </m:oMathPara>
                   </a14:m>
-                  <a:endParaRPr lang="en-GB" b="0" dirty="0">
+                  <a:endParaRPr lang="en-GB" b="0">
                     <a:ea typeface="Cambria Math" panose="02040503050406030204" pitchFamily="18" charset="0"/>
                   </a:endParaRPr>
                 </a:p>
                 <a:p>
-                  <a:endParaRPr lang="en-GB" dirty="0"/>
+                  <a:endParaRPr lang="en-GB"/>
                 </a:p>
               </p:txBody>
             </p:sp>
           </mc:Choice>
-          <mc:Fallback xmlns="">
+          <mc:Fallback>
             <p:sp>
               <p:nvSpPr>
-                <p:cNvPr id="28" name="TextBox 27"/>
+                <p:cNvPr id="6" name="TextBox 5">
+                  <a:extLst>
+                    <a:ext uri="{FF2B5EF4-FFF2-40B4-BE49-F238E27FC236}">
+                      <a16:creationId xmlns:a16="http://schemas.microsoft.com/office/drawing/2014/main" id="{6DFD7044-7745-9F60-CDD7-98F2F92A2D8C}"/>
+                    </a:ext>
+                  </a:extLst>
+                </p:cNvPr>
                 <p:cNvSpPr txBox="1">
                   <a:spLocks noRot="1" noChangeAspect="1" noMove="1" noResize="1" noEditPoints="1" noAdjustHandles="1" noChangeArrowheads="1" noChangeShapeType="1" noTextEdit="1"/>
                 </p:cNvSpPr>
@@ -10707,7 +10713,7 @@
                 <a:prstGeom prst="rect">
                   <a:avLst/>
                 </a:prstGeom>
-                <a:blipFill rotWithShape="0">
+                <a:blipFill>
                   <a:blip r:embed="rId4"/>
                   <a:stretch>
                     <a:fillRect/>
@@ -10719,7 +10725,7 @@
                 <a:lstStyle/>
                 <a:p>
                   <a:r>
-                    <a:rPr lang="en-GB">
+                    <a:rPr lang="en-US">
                       <a:noFill/>
                     </a:rPr>
                     <a:t> </a:t>
@@ -10794,7 +10800,7 @@
                     </m:oMath>
                   </m:oMathPara>
                 </a14:m>
-                <a:endParaRPr lang="en-US" dirty="0"/>
+                <a:endParaRPr lang="en-US"/>
               </a:p>
             </p:txBody>
           </p:sp>

</xml_diff>

<commit_message>
HP clarified variable definitions in detect_obstacles docstring
</commit_message>
<xml_diff>
--- a/media/week_10/diagrams.pptx
+++ b/media/week_10/diagrams.pptx
@@ -117,8 +117,7 @@
 <file path=ppt/revisionInfo.xml><?xml version="1.0" encoding="utf-8"?>
 <p1510:revInfo xmlns:a="http://schemas.openxmlformats.org/drawingml/2006/main" xmlns:r="http://schemas.openxmlformats.org/officeDocument/2006/relationships" xmlns:p1510="http://schemas.microsoft.com/office/powerpoint/2015/10/main">
   <p1510:revLst>
-    <p1510:client id="{248D8C8A-D969-FF47-8750-E2D7FB7C4E9E}" v="164" dt="2025-11-21T11:36:54.126"/>
-    <p1510:client id="{DA2B79C2-931E-6F45-97CE-51EECBC9C8D0}" v="3" dt="2025-11-20T16:48:46.294"/>
+    <p1510:client id="{DA2B79C2-931E-6F45-97CE-51EECBC9C8D0}" v="43" dt="2025-11-25T22:44:02.682"/>
   </p1510:revLst>
 </p1510:revInfo>
 </file>
@@ -128,10 +127,25 @@
   <pc:docChgLst>
     <pc:chgData name="Hemma Philamore" userId="db50e2f3-17b2-4cc0-b719-fb6254d3e9df" providerId="ADAL" clId="{B5D85944-D90A-5912-90C6-4C26E424D3D6}"/>
     <pc:docChg chg="addSld modSld">
-      <pc:chgData name="Hemma Philamore" userId="db50e2f3-17b2-4cc0-b719-fb6254d3e9df" providerId="ADAL" clId="{B5D85944-D90A-5912-90C6-4C26E424D3D6}" dt="2025-11-20T16:48:46.294" v="6" actId="1076"/>
+      <pc:chgData name="Hemma Philamore" userId="db50e2f3-17b2-4cc0-b719-fb6254d3e9df" providerId="ADAL" clId="{B5D85944-D90A-5912-90C6-4C26E424D3D6}" dt="2025-11-25T22:44:09.476" v="48" actId="1076"/>
       <pc:docMkLst>
         <pc:docMk/>
       </pc:docMkLst>
+      <pc:sldChg chg="modSp mod">
+        <pc:chgData name="Hemma Philamore" userId="db50e2f3-17b2-4cc0-b719-fb6254d3e9df" providerId="ADAL" clId="{B5D85944-D90A-5912-90C6-4C26E424D3D6}" dt="2025-11-25T22:44:09.476" v="48" actId="1076"/>
+        <pc:sldMkLst>
+          <pc:docMk/>
+          <pc:sldMk cId="2055881703" sldId="256"/>
+        </pc:sldMkLst>
+        <pc:spChg chg="mod">
+          <ac:chgData name="Hemma Philamore" userId="db50e2f3-17b2-4cc0-b719-fb6254d3e9df" providerId="ADAL" clId="{B5D85944-D90A-5912-90C6-4C26E424D3D6}" dt="2025-11-25T22:44:09.476" v="48" actId="1076"/>
+          <ac:spMkLst>
+            <pc:docMk/>
+            <pc:sldMk cId="2055881703" sldId="256"/>
+            <ac:spMk id="54" creationId="{796BBBEF-DDD2-260A-6642-AAF99653D558}"/>
+          </ac:spMkLst>
+        </pc:spChg>
+      </pc:sldChg>
       <pc:sldChg chg="addSp modSp new mod">
         <pc:chgData name="Hemma Philamore" userId="db50e2f3-17b2-4cc0-b719-fb6254d3e9df" providerId="ADAL" clId="{B5D85944-D90A-5912-90C6-4C26E424D3D6}" dt="2025-11-20T16:48:46.294" v="6" actId="1076"/>
         <pc:sldMkLst>
@@ -234,60 +248,12 @@
           <pc:docMk/>
           <pc:sldMk cId="2055881703" sldId="256"/>
         </pc:sldMkLst>
-        <pc:spChg chg="del">
-          <ac:chgData name="Hemma Philamore" userId="db50e2f3-17b2-4cc0-b719-fb6254d3e9df" providerId="ADAL" clId="{35C0B9A2-A60C-57EC-AD9B-630767BE11FE}" dt="2025-11-20T10:26:04.869" v="0" actId="478"/>
-          <ac:spMkLst>
-            <pc:docMk/>
-            <pc:sldMk cId="2055881703" sldId="256"/>
-            <ac:spMk id="5" creationId="{F8629915-D6D6-B1D7-CEFA-E538E4097312}"/>
-          </ac:spMkLst>
-        </pc:spChg>
-        <pc:spChg chg="add del">
-          <ac:chgData name="Hemma Philamore" userId="db50e2f3-17b2-4cc0-b719-fb6254d3e9df" providerId="ADAL" clId="{35C0B9A2-A60C-57EC-AD9B-630767BE11FE}" dt="2025-11-20T10:27:04.363" v="2" actId="478"/>
-          <ac:spMkLst>
-            <pc:docMk/>
-            <pc:sldMk cId="2055881703" sldId="256"/>
-            <ac:spMk id="7" creationId="{BADCA2C8-5DF9-63F1-CC28-EDCE4F6AE01C}"/>
-          </ac:spMkLst>
-        </pc:spChg>
         <pc:spChg chg="add mod">
           <ac:chgData name="Hemma Philamore" userId="db50e2f3-17b2-4cc0-b719-fb6254d3e9df" providerId="ADAL" clId="{35C0B9A2-A60C-57EC-AD9B-630767BE11FE}" dt="2025-11-20T11:15:26.553" v="734" actId="1076"/>
           <ac:spMkLst>
             <pc:docMk/>
             <pc:sldMk cId="2055881703" sldId="256"/>
             <ac:spMk id="10" creationId="{60E0CE97-DD2D-18CC-926E-6ADE97B57EC4}"/>
-          </ac:spMkLst>
-        </pc:spChg>
-        <pc:spChg chg="add del mod">
-          <ac:chgData name="Hemma Philamore" userId="db50e2f3-17b2-4cc0-b719-fb6254d3e9df" providerId="ADAL" clId="{35C0B9A2-A60C-57EC-AD9B-630767BE11FE}" dt="2025-11-20T10:35:15.461" v="88" actId="478"/>
-          <ac:spMkLst>
-            <pc:docMk/>
-            <pc:sldMk cId="2055881703" sldId="256"/>
-            <ac:spMk id="19" creationId="{ED7B6730-1CF2-937D-1A37-E2C449C10159}"/>
-          </ac:spMkLst>
-        </pc:spChg>
-        <pc:spChg chg="add del mod">
-          <ac:chgData name="Hemma Philamore" userId="db50e2f3-17b2-4cc0-b719-fb6254d3e9df" providerId="ADAL" clId="{35C0B9A2-A60C-57EC-AD9B-630767BE11FE}" dt="2025-11-20T10:40:14.519" v="139" actId="478"/>
-          <ac:spMkLst>
-            <pc:docMk/>
-            <pc:sldMk cId="2055881703" sldId="256"/>
-            <ac:spMk id="32" creationId="{A56F32D9-CEE9-06EA-BF9E-5E0E6FC24560}"/>
-          </ac:spMkLst>
-        </pc:spChg>
-        <pc:spChg chg="add del mod">
-          <ac:chgData name="Hemma Philamore" userId="db50e2f3-17b2-4cc0-b719-fb6254d3e9df" providerId="ADAL" clId="{35C0B9A2-A60C-57EC-AD9B-630767BE11FE}" dt="2025-11-20T10:37:53.542" v="118" actId="478"/>
-          <ac:spMkLst>
-            <pc:docMk/>
-            <pc:sldMk cId="2055881703" sldId="256"/>
-            <ac:spMk id="33" creationId="{9F1F3278-4FE4-80F5-97B1-811A551642A7}"/>
-          </ac:spMkLst>
-        </pc:spChg>
-        <pc:spChg chg="add del mod">
-          <ac:chgData name="Hemma Philamore" userId="db50e2f3-17b2-4cc0-b719-fb6254d3e9df" providerId="ADAL" clId="{35C0B9A2-A60C-57EC-AD9B-630767BE11FE}" dt="2025-11-20T10:40:13.372" v="138" actId="478"/>
-          <ac:spMkLst>
-            <pc:docMk/>
-            <pc:sldMk cId="2055881703" sldId="256"/>
-            <ac:spMk id="34" creationId="{F26B2745-6F0A-4A60-F9F4-C8DA3214BA25}"/>
           </ac:spMkLst>
         </pc:spChg>
         <pc:spChg chg="add mod">
@@ -338,54 +304,6 @@
             <ac:spMk id="54" creationId="{796BBBEF-DDD2-260A-6642-AAF99653D558}"/>
           </ac:spMkLst>
         </pc:spChg>
-        <pc:spChg chg="add del mod">
-          <ac:chgData name="Hemma Philamore" userId="db50e2f3-17b2-4cc0-b719-fb6254d3e9df" providerId="ADAL" clId="{35C0B9A2-A60C-57EC-AD9B-630767BE11FE}" dt="2025-11-20T10:49:50.120" v="446" actId="478"/>
-          <ac:spMkLst>
-            <pc:docMk/>
-            <pc:sldMk cId="2055881703" sldId="256"/>
-            <ac:spMk id="59" creationId="{7B29DEB3-6BC0-295F-F79F-AF8FBADBFFAB}"/>
-          </ac:spMkLst>
-        </pc:spChg>
-        <pc:spChg chg="add del mod">
-          <ac:chgData name="Hemma Philamore" userId="db50e2f3-17b2-4cc0-b719-fb6254d3e9df" providerId="ADAL" clId="{35C0B9A2-A60C-57EC-AD9B-630767BE11FE}" dt="2025-11-20T10:49:49.416" v="445" actId="478"/>
-          <ac:spMkLst>
-            <pc:docMk/>
-            <pc:sldMk cId="2055881703" sldId="256"/>
-            <ac:spMk id="60" creationId="{214D6DF2-6F54-FF7B-999F-A819EE36B124}"/>
-          </ac:spMkLst>
-        </pc:spChg>
-        <pc:spChg chg="add del mod">
-          <ac:chgData name="Hemma Philamore" userId="db50e2f3-17b2-4cc0-b719-fb6254d3e9df" providerId="ADAL" clId="{35C0B9A2-A60C-57EC-AD9B-630767BE11FE}" dt="2025-11-20T10:49:51.719" v="447" actId="478"/>
-          <ac:spMkLst>
-            <pc:docMk/>
-            <pc:sldMk cId="2055881703" sldId="256"/>
-            <ac:spMk id="61" creationId="{A3F822CF-0641-5B18-CAC7-5F4A8EEE6F0A}"/>
-          </ac:spMkLst>
-        </pc:spChg>
-        <pc:spChg chg="add del mod">
-          <ac:chgData name="Hemma Philamore" userId="db50e2f3-17b2-4cc0-b719-fb6254d3e9df" providerId="ADAL" clId="{35C0B9A2-A60C-57EC-AD9B-630767BE11FE}" dt="2025-11-20T10:50:17.122" v="455" actId="478"/>
-          <ac:spMkLst>
-            <pc:docMk/>
-            <pc:sldMk cId="2055881703" sldId="256"/>
-            <ac:spMk id="62" creationId="{8CDB7EC2-7383-9640-E965-EF8F9C1A993B}"/>
-          </ac:spMkLst>
-        </pc:spChg>
-        <pc:spChg chg="add del mod">
-          <ac:chgData name="Hemma Philamore" userId="db50e2f3-17b2-4cc0-b719-fb6254d3e9df" providerId="ADAL" clId="{35C0B9A2-A60C-57EC-AD9B-630767BE11FE}" dt="2025-11-20T10:50:12.362" v="451" actId="478"/>
-          <ac:spMkLst>
-            <pc:docMk/>
-            <pc:sldMk cId="2055881703" sldId="256"/>
-            <ac:spMk id="63" creationId="{B20C2DD7-AF40-70F6-F089-44C867C98942}"/>
-          </ac:spMkLst>
-        </pc:spChg>
-        <pc:spChg chg="add del mod">
-          <ac:chgData name="Hemma Philamore" userId="db50e2f3-17b2-4cc0-b719-fb6254d3e9df" providerId="ADAL" clId="{35C0B9A2-A60C-57EC-AD9B-630767BE11FE}" dt="2025-11-20T10:50:14.346" v="453" actId="478"/>
-          <ac:spMkLst>
-            <pc:docMk/>
-            <pc:sldMk cId="2055881703" sldId="256"/>
-            <ac:spMk id="65" creationId="{D3994704-9A75-6DF3-4121-992953C1AB1E}"/>
-          </ac:spMkLst>
-        </pc:spChg>
         <pc:spChg chg="add mod topLvl">
           <ac:chgData name="Hemma Philamore" userId="db50e2f3-17b2-4cc0-b719-fb6254d3e9df" providerId="ADAL" clId="{35C0B9A2-A60C-57EC-AD9B-630767BE11FE}" dt="2025-11-20T10:55:22.304" v="528" actId="164"/>
           <ac:spMkLst>
@@ -402,84 +320,12 @@
             <ac:spMk id="82" creationId="{755524AC-2D41-9852-186E-7B8DD8F65B97}"/>
           </ac:spMkLst>
         </pc:spChg>
-        <pc:spChg chg="add del mod topLvl">
-          <ac:chgData name="Hemma Philamore" userId="db50e2f3-17b2-4cc0-b719-fb6254d3e9df" providerId="ADAL" clId="{35C0B9A2-A60C-57EC-AD9B-630767BE11FE}" dt="2025-11-20T10:53:19.551" v="492" actId="478"/>
-          <ac:spMkLst>
-            <pc:docMk/>
-            <pc:sldMk cId="2055881703" sldId="256"/>
-            <ac:spMk id="83" creationId="{1546B056-62D2-64AD-258E-AD4237EF2920}"/>
-          </ac:spMkLst>
-        </pc:spChg>
         <pc:spChg chg="add mod topLvl">
           <ac:chgData name="Hemma Philamore" userId="db50e2f3-17b2-4cc0-b719-fb6254d3e9df" providerId="ADAL" clId="{35C0B9A2-A60C-57EC-AD9B-630767BE11FE}" dt="2025-11-20T10:55:22.304" v="528" actId="164"/>
           <ac:spMkLst>
             <pc:docMk/>
             <pc:sldMk cId="2055881703" sldId="256"/>
             <ac:spMk id="84" creationId="{5B6DD94F-1C69-5F0D-6BE3-AABE90845ED3}"/>
-          </ac:spMkLst>
-        </pc:spChg>
-        <pc:spChg chg="mod">
-          <ac:chgData name="Hemma Philamore" userId="db50e2f3-17b2-4cc0-b719-fb6254d3e9df" providerId="ADAL" clId="{35C0B9A2-A60C-57EC-AD9B-630767BE11FE}" dt="2025-11-20T10:51:52.878" v="474"/>
-          <ac:spMkLst>
-            <pc:docMk/>
-            <pc:sldMk cId="2055881703" sldId="256"/>
-            <ac:spMk id="88" creationId="{8CFEF838-639E-477E-0312-FA50C6E4C494}"/>
-          </ac:spMkLst>
-        </pc:spChg>
-        <pc:spChg chg="mod">
-          <ac:chgData name="Hemma Philamore" userId="db50e2f3-17b2-4cc0-b719-fb6254d3e9df" providerId="ADAL" clId="{35C0B9A2-A60C-57EC-AD9B-630767BE11FE}" dt="2025-11-20T10:51:52.878" v="474"/>
-          <ac:spMkLst>
-            <pc:docMk/>
-            <pc:sldMk cId="2055881703" sldId="256"/>
-            <ac:spMk id="89" creationId="{AE78285C-C1B2-3583-AA2F-481754D8D46C}"/>
-          </ac:spMkLst>
-        </pc:spChg>
-        <pc:spChg chg="mod">
-          <ac:chgData name="Hemma Philamore" userId="db50e2f3-17b2-4cc0-b719-fb6254d3e9df" providerId="ADAL" clId="{35C0B9A2-A60C-57EC-AD9B-630767BE11FE}" dt="2025-11-20T10:51:52.878" v="474"/>
-          <ac:spMkLst>
-            <pc:docMk/>
-            <pc:sldMk cId="2055881703" sldId="256"/>
-            <ac:spMk id="90" creationId="{3D93C3D0-3F4F-25A3-BA81-6380BA22FCEA}"/>
-          </ac:spMkLst>
-        </pc:spChg>
-        <pc:spChg chg="mod">
-          <ac:chgData name="Hemma Philamore" userId="db50e2f3-17b2-4cc0-b719-fb6254d3e9df" providerId="ADAL" clId="{35C0B9A2-A60C-57EC-AD9B-630767BE11FE}" dt="2025-11-20T10:51:52.878" v="474"/>
-          <ac:spMkLst>
-            <pc:docMk/>
-            <pc:sldMk cId="2055881703" sldId="256"/>
-            <ac:spMk id="91" creationId="{B3DF2B72-1C1C-03A4-C3F8-F2428E39D3C3}"/>
-          </ac:spMkLst>
-        </pc:spChg>
-        <pc:spChg chg="mod">
-          <ac:chgData name="Hemma Philamore" userId="db50e2f3-17b2-4cc0-b719-fb6254d3e9df" providerId="ADAL" clId="{35C0B9A2-A60C-57EC-AD9B-630767BE11FE}" dt="2025-11-20T10:51:56.513" v="476"/>
-          <ac:spMkLst>
-            <pc:docMk/>
-            <pc:sldMk cId="2055881703" sldId="256"/>
-            <ac:spMk id="96" creationId="{1F80B664-7C59-47F3-B801-603E04B68F82}"/>
-          </ac:spMkLst>
-        </pc:spChg>
-        <pc:spChg chg="mod">
-          <ac:chgData name="Hemma Philamore" userId="db50e2f3-17b2-4cc0-b719-fb6254d3e9df" providerId="ADAL" clId="{35C0B9A2-A60C-57EC-AD9B-630767BE11FE}" dt="2025-11-20T10:51:56.513" v="476"/>
-          <ac:spMkLst>
-            <pc:docMk/>
-            <pc:sldMk cId="2055881703" sldId="256"/>
-            <ac:spMk id="97" creationId="{0C9355C3-A9D3-DE89-09CA-96B3E29F699C}"/>
-          </ac:spMkLst>
-        </pc:spChg>
-        <pc:spChg chg="mod">
-          <ac:chgData name="Hemma Philamore" userId="db50e2f3-17b2-4cc0-b719-fb6254d3e9df" providerId="ADAL" clId="{35C0B9A2-A60C-57EC-AD9B-630767BE11FE}" dt="2025-11-20T10:51:56.513" v="476"/>
-          <ac:spMkLst>
-            <pc:docMk/>
-            <pc:sldMk cId="2055881703" sldId="256"/>
-            <ac:spMk id="98" creationId="{C6C4BA6A-3B7A-B9F3-FF9D-838453F9554C}"/>
-          </ac:spMkLst>
-        </pc:spChg>
-        <pc:spChg chg="mod">
-          <ac:chgData name="Hemma Philamore" userId="db50e2f3-17b2-4cc0-b719-fb6254d3e9df" providerId="ADAL" clId="{35C0B9A2-A60C-57EC-AD9B-630767BE11FE}" dt="2025-11-20T10:51:56.513" v="476"/>
-          <ac:spMkLst>
-            <pc:docMk/>
-            <pc:sldMk cId="2055881703" sldId="256"/>
-            <ac:spMk id="99" creationId="{CF2DFED7-8EE0-3461-BD32-DB45CDBC762C}"/>
           </ac:spMkLst>
         </pc:spChg>
         <pc:spChg chg="add mod">
@@ -496,14 +342,6 @@
             <pc:docMk/>
             <pc:sldMk cId="2055881703" sldId="256"/>
             <ac:spMk id="106" creationId="{5A82E9F3-14D7-1A03-66CB-2293CA26106B}"/>
-          </ac:spMkLst>
-        </pc:spChg>
-        <pc:spChg chg="add del mod">
-          <ac:chgData name="Hemma Philamore" userId="db50e2f3-17b2-4cc0-b719-fb6254d3e9df" providerId="ADAL" clId="{35C0B9A2-A60C-57EC-AD9B-630767BE11FE}" dt="2025-11-20T10:54:46.247" v="517" actId="478"/>
-          <ac:spMkLst>
-            <pc:docMk/>
-            <pc:sldMk cId="2055881703" sldId="256"/>
-            <ac:spMk id="107" creationId="{3FA29D11-8964-5D5A-9D38-712F9DD33802}"/>
           </ac:spMkLst>
         </pc:spChg>
         <pc:spChg chg="add mod">
@@ -640,14 +478,6 @@
             <pc:docMk/>
             <pc:sldMk cId="2055881703" sldId="256"/>
             <ac:spMk id="149" creationId="{18B7952A-65FE-3155-F900-858FFFE37391}"/>
-          </ac:spMkLst>
-        </pc:spChg>
-        <pc:spChg chg="add del mod">
-          <ac:chgData name="Hemma Philamore" userId="db50e2f3-17b2-4cc0-b719-fb6254d3e9df" providerId="ADAL" clId="{35C0B9A2-A60C-57EC-AD9B-630767BE11FE}" dt="2025-11-20T11:02:18.962" v="649" actId="478"/>
-          <ac:spMkLst>
-            <pc:docMk/>
-            <pc:sldMk cId="2055881703" sldId="256"/>
-            <ac:spMk id="157" creationId="{97C76C4D-8030-ED8D-EB39-B85D69263710}"/>
           </ac:spMkLst>
         </pc:spChg>
         <pc:spChg chg="add mod">
@@ -938,86 +768,6 @@
             <ac:grpSpMk id="68" creationId="{EEA1CA30-B8FB-FE68-CEE3-E7126C2431BD}"/>
           </ac:grpSpMkLst>
         </pc:grpChg>
-        <pc:grpChg chg="add del mod">
-          <ac:chgData name="Hemma Philamore" userId="db50e2f3-17b2-4cc0-b719-fb6254d3e9df" providerId="ADAL" clId="{35C0B9A2-A60C-57EC-AD9B-630767BE11FE}" dt="2025-11-20T10:58:21.410" v="587" actId="478"/>
-          <ac:grpSpMkLst>
-            <pc:docMk/>
-            <pc:sldMk cId="2055881703" sldId="256"/>
-            <ac:grpSpMk id="69" creationId="{286E84BA-A5E6-613E-BD0D-03237C6EF9A7}"/>
-          </ac:grpSpMkLst>
-        </pc:grpChg>
-        <pc:grpChg chg="add del mod">
-          <ac:chgData name="Hemma Philamore" userId="db50e2f3-17b2-4cc0-b719-fb6254d3e9df" providerId="ADAL" clId="{35C0B9A2-A60C-57EC-AD9B-630767BE11FE}" dt="2025-11-20T10:58:20.746" v="586" actId="478"/>
-          <ac:grpSpMkLst>
-            <pc:docMk/>
-            <pc:sldMk cId="2055881703" sldId="256"/>
-            <ac:grpSpMk id="72" creationId="{4A481B30-4E74-8CC6-C04A-E79707CC7FD8}"/>
-          </ac:grpSpMkLst>
-        </pc:grpChg>
-        <pc:grpChg chg="add del mod">
-          <ac:chgData name="Hemma Philamore" userId="db50e2f3-17b2-4cc0-b719-fb6254d3e9df" providerId="ADAL" clId="{35C0B9A2-A60C-57EC-AD9B-630767BE11FE}" dt="2025-11-20T10:58:20.085" v="585" actId="478"/>
-          <ac:grpSpMkLst>
-            <pc:docMk/>
-            <pc:sldMk cId="2055881703" sldId="256"/>
-            <ac:grpSpMk id="75" creationId="{FBD83005-F293-05C5-FE6F-0CDCE92F8155}"/>
-          </ac:grpSpMkLst>
-        </pc:grpChg>
-        <pc:grpChg chg="add del mod topLvl">
-          <ac:chgData name="Hemma Philamore" userId="db50e2f3-17b2-4cc0-b719-fb6254d3e9df" providerId="ADAL" clId="{35C0B9A2-A60C-57EC-AD9B-630767BE11FE}" dt="2025-11-20T10:53:30.730" v="494" actId="165"/>
-          <ac:grpSpMkLst>
-            <pc:docMk/>
-            <pc:sldMk cId="2055881703" sldId="256"/>
-            <ac:grpSpMk id="78" creationId="{FAC83208-ED5B-FAE7-F87D-8B3181C445D7}"/>
-          </ac:grpSpMkLst>
-        </pc:grpChg>
-        <pc:grpChg chg="add del mod">
-          <ac:chgData name="Hemma Philamore" userId="db50e2f3-17b2-4cc0-b719-fb6254d3e9df" providerId="ADAL" clId="{35C0B9A2-A60C-57EC-AD9B-630767BE11FE}" dt="2025-11-20T10:52:07.209" v="478" actId="165"/>
-          <ac:grpSpMkLst>
-            <pc:docMk/>
-            <pc:sldMk cId="2055881703" sldId="256"/>
-            <ac:grpSpMk id="85" creationId="{5E46178F-8ED9-52FF-3BF2-01C9CE60A2C0}"/>
-          </ac:grpSpMkLst>
-        </pc:grpChg>
-        <pc:grpChg chg="add del mod">
-          <ac:chgData name="Hemma Philamore" userId="db50e2f3-17b2-4cc0-b719-fb6254d3e9df" providerId="ADAL" clId="{35C0B9A2-A60C-57EC-AD9B-630767BE11FE}" dt="2025-11-20T10:53:00.763" v="488" actId="478"/>
-          <ac:grpSpMkLst>
-            <pc:docMk/>
-            <pc:sldMk cId="2055881703" sldId="256"/>
-            <ac:grpSpMk id="86" creationId="{1A19B633-8089-8BAF-8DFD-E88F06FC9CE1}"/>
-          </ac:grpSpMkLst>
-        </pc:grpChg>
-        <pc:grpChg chg="mod">
-          <ac:chgData name="Hemma Philamore" userId="db50e2f3-17b2-4cc0-b719-fb6254d3e9df" providerId="ADAL" clId="{35C0B9A2-A60C-57EC-AD9B-630767BE11FE}" dt="2025-11-20T10:51:52.878" v="474"/>
-          <ac:grpSpMkLst>
-            <pc:docMk/>
-            <pc:sldMk cId="2055881703" sldId="256"/>
-            <ac:grpSpMk id="87" creationId="{F5F74216-9E26-B9FB-0994-658FC4B22973}"/>
-          </ac:grpSpMkLst>
-        </pc:grpChg>
-        <pc:grpChg chg="add del mod">
-          <ac:chgData name="Hemma Philamore" userId="db50e2f3-17b2-4cc0-b719-fb6254d3e9df" providerId="ADAL" clId="{35C0B9A2-A60C-57EC-AD9B-630767BE11FE}" dt="2025-11-20T10:53:01.997" v="489" actId="478"/>
-          <ac:grpSpMkLst>
-            <pc:docMk/>
-            <pc:sldMk cId="2055881703" sldId="256"/>
-            <ac:grpSpMk id="94" creationId="{690FEAAF-B471-2F8A-D99C-3165CD93A3B9}"/>
-          </ac:grpSpMkLst>
-        </pc:grpChg>
-        <pc:grpChg chg="mod">
-          <ac:chgData name="Hemma Philamore" userId="db50e2f3-17b2-4cc0-b719-fb6254d3e9df" providerId="ADAL" clId="{35C0B9A2-A60C-57EC-AD9B-630767BE11FE}" dt="2025-11-20T10:51:56.513" v="476"/>
-          <ac:grpSpMkLst>
-            <pc:docMk/>
-            <pc:sldMk cId="2055881703" sldId="256"/>
-            <ac:grpSpMk id="95" creationId="{57C0CEF4-2358-BAF0-0D7E-72FC7B81BB2C}"/>
-          </ac:grpSpMkLst>
-        </pc:grpChg>
-        <pc:grpChg chg="add del mod">
-          <ac:chgData name="Hemma Philamore" userId="db50e2f3-17b2-4cc0-b719-fb6254d3e9df" providerId="ADAL" clId="{35C0B9A2-A60C-57EC-AD9B-630767BE11FE}" dt="2025-11-20T10:54:44.407" v="515" actId="478"/>
-          <ac:grpSpMkLst>
-            <pc:docMk/>
-            <pc:sldMk cId="2055881703" sldId="256"/>
-            <ac:grpSpMk id="102" creationId="{ECAD2C37-9BF9-7EF4-C860-77E79437D0D2}"/>
-          </ac:grpSpMkLst>
-        </pc:grpChg>
         <pc:grpChg chg="add mod">
           <ac:chgData name="Hemma Philamore" userId="db50e2f3-17b2-4cc0-b719-fb6254d3e9df" providerId="ADAL" clId="{35C0B9A2-A60C-57EC-AD9B-630767BE11FE}" dt="2025-11-20T10:55:33.903" v="532" actId="1076"/>
           <ac:grpSpMkLst>
@@ -1058,14 +808,6 @@
             <ac:grpSpMk id="191" creationId="{D0DB04B9-3774-E353-ED89-26BC7CB0789D}"/>
           </ac:grpSpMkLst>
         </pc:grpChg>
-        <pc:grpChg chg="add del mod">
-          <ac:chgData name="Hemma Philamore" userId="db50e2f3-17b2-4cc0-b719-fb6254d3e9df" providerId="ADAL" clId="{35C0B9A2-A60C-57EC-AD9B-630767BE11FE}" dt="2025-11-20T11:16:40.250" v="769" actId="165"/>
-          <ac:grpSpMkLst>
-            <pc:docMk/>
-            <pc:sldMk cId="2055881703" sldId="256"/>
-            <ac:grpSpMk id="194" creationId="{08414F98-E93D-6B1D-227C-BB56A9372591}"/>
-          </ac:grpSpMkLst>
-        </pc:grpChg>
         <pc:grpChg chg="add mod">
           <ac:chgData name="Hemma Philamore" userId="db50e2f3-17b2-4cc0-b719-fb6254d3e9df" providerId="ADAL" clId="{35C0B9A2-A60C-57EC-AD9B-630767BE11FE}" dt="2025-11-20T11:17:02.099" v="777" actId="1076"/>
           <ac:grpSpMkLst>
@@ -1090,54 +832,6 @@
             <ac:picMk id="11" creationId="{7108C697-452B-18F4-0A68-07969A8A41FE}"/>
           </ac:picMkLst>
         </pc:picChg>
-        <pc:picChg chg="add del mod">
-          <ac:chgData name="Hemma Philamore" userId="db50e2f3-17b2-4cc0-b719-fb6254d3e9df" providerId="ADAL" clId="{35C0B9A2-A60C-57EC-AD9B-630767BE11FE}" dt="2025-11-20T10:50:09.866" v="450" actId="478"/>
-          <ac:picMkLst>
-            <pc:docMk/>
-            <pc:sldMk cId="2055881703" sldId="256"/>
-            <ac:picMk id="55" creationId="{413CCF69-B9B8-C3FA-200C-D95B7756D02B}"/>
-          </ac:picMkLst>
-        </pc:picChg>
-        <pc:cxnChg chg="add del mod">
-          <ac:chgData name="Hemma Philamore" userId="db50e2f3-17b2-4cc0-b719-fb6254d3e9df" providerId="ADAL" clId="{35C0B9A2-A60C-57EC-AD9B-630767BE11FE}" dt="2025-11-20T10:32:26.080" v="42" actId="478"/>
-          <ac:cxnSpMkLst>
-            <pc:docMk/>
-            <pc:sldMk cId="2055881703" sldId="256"/>
-            <ac:cxnSpMk id="13" creationId="{D7B36D1E-88A7-1052-C3DA-CA876832D45F}"/>
-          </ac:cxnSpMkLst>
-        </pc:cxnChg>
-        <pc:cxnChg chg="add del mod">
-          <ac:chgData name="Hemma Philamore" userId="db50e2f3-17b2-4cc0-b719-fb6254d3e9df" providerId="ADAL" clId="{35C0B9A2-A60C-57EC-AD9B-630767BE11FE}" dt="2025-11-20T10:32:27.756" v="44" actId="478"/>
-          <ac:cxnSpMkLst>
-            <pc:docMk/>
-            <pc:sldMk cId="2055881703" sldId="256"/>
-            <ac:cxnSpMk id="14" creationId="{7F2EB04A-A2A2-2C56-4E1B-209E62310FC2}"/>
-          </ac:cxnSpMkLst>
-        </pc:cxnChg>
-        <pc:cxnChg chg="add del mod">
-          <ac:chgData name="Hemma Philamore" userId="db50e2f3-17b2-4cc0-b719-fb6254d3e9df" providerId="ADAL" clId="{35C0B9A2-A60C-57EC-AD9B-630767BE11FE}" dt="2025-11-20T10:32:27.292" v="43" actId="478"/>
-          <ac:cxnSpMkLst>
-            <pc:docMk/>
-            <pc:sldMk cId="2055881703" sldId="256"/>
-            <ac:cxnSpMk id="16" creationId="{54D5B968-0515-EF49-B44A-A4257084ECC6}"/>
-          </ac:cxnSpMkLst>
-        </pc:cxnChg>
-        <pc:cxnChg chg="add del mod">
-          <ac:chgData name="Hemma Philamore" userId="db50e2f3-17b2-4cc0-b719-fb6254d3e9df" providerId="ADAL" clId="{35C0B9A2-A60C-57EC-AD9B-630767BE11FE}" dt="2025-11-20T10:34:13.541" v="71" actId="11529"/>
-          <ac:cxnSpMkLst>
-            <pc:docMk/>
-            <pc:sldMk cId="2055881703" sldId="256"/>
-            <ac:cxnSpMk id="21" creationId="{89A109B6-264C-60DE-D49A-BDEA50CEBE4F}"/>
-          </ac:cxnSpMkLst>
-        </pc:cxnChg>
-        <pc:cxnChg chg="add del mod">
-          <ac:chgData name="Hemma Philamore" userId="db50e2f3-17b2-4cc0-b719-fb6254d3e9df" providerId="ADAL" clId="{35C0B9A2-A60C-57EC-AD9B-630767BE11FE}" dt="2025-11-20T10:34:13.157" v="70" actId="11529"/>
-          <ac:cxnSpMkLst>
-            <pc:docMk/>
-            <pc:sldMk cId="2055881703" sldId="256"/>
-            <ac:cxnSpMk id="23" creationId="{999AB47E-2DFE-086B-77A8-029749C5052C}"/>
-          </ac:cxnSpMkLst>
-        </pc:cxnChg>
         <pc:cxnChg chg="add mod">
           <ac:chgData name="Hemma Philamore" userId="db50e2f3-17b2-4cc0-b719-fb6254d3e9df" providerId="ADAL" clId="{35C0B9A2-A60C-57EC-AD9B-630767BE11FE}" dt="2025-11-20T11:15:26.553" v="734" actId="1076"/>
           <ac:cxnSpMkLst>
@@ -1162,22 +856,6 @@
             <ac:cxnSpMk id="29" creationId="{CB206A3C-028A-6A69-9951-0FB7A3B526DB}"/>
           </ac:cxnSpMkLst>
         </pc:cxnChg>
-        <pc:cxnChg chg="add del mod">
-          <ac:chgData name="Hemma Philamore" userId="db50e2f3-17b2-4cc0-b719-fb6254d3e9df" providerId="ADAL" clId="{35C0B9A2-A60C-57EC-AD9B-630767BE11FE}" dt="2025-11-20T10:46:57.730" v="380" actId="478"/>
-          <ac:cxnSpMkLst>
-            <pc:docMk/>
-            <pc:sldMk cId="2055881703" sldId="256"/>
-            <ac:cxnSpMk id="41" creationId="{EB801AB0-4215-78D6-37C9-F159A67B1AFC}"/>
-          </ac:cxnSpMkLst>
-        </pc:cxnChg>
-        <pc:cxnChg chg="add del mod">
-          <ac:chgData name="Hemma Philamore" userId="db50e2f3-17b2-4cc0-b719-fb6254d3e9df" providerId="ADAL" clId="{35C0B9A2-A60C-57EC-AD9B-630767BE11FE}" dt="2025-11-20T10:46:59.472" v="381" actId="478"/>
-          <ac:cxnSpMkLst>
-            <pc:docMk/>
-            <pc:sldMk cId="2055881703" sldId="256"/>
-            <ac:cxnSpMk id="44" creationId="{577EF17E-8A13-6DC9-6FC5-BF9E766B2D66}"/>
-          </ac:cxnSpMkLst>
-        </pc:cxnChg>
         <pc:cxnChg chg="add mod">
           <ac:chgData name="Hemma Philamore" userId="db50e2f3-17b2-4cc0-b719-fb6254d3e9df" providerId="ADAL" clId="{35C0B9A2-A60C-57EC-AD9B-630767BE11FE}" dt="2025-11-20T10:48:13.639" v="406" actId="692"/>
           <ac:cxnSpMkLst>
@@ -1194,30 +872,6 @@
             <ac:cxnSpMk id="56" creationId="{366D8118-2718-AAA8-38A7-83275575D318}"/>
           </ac:cxnSpMkLst>
         </pc:cxnChg>
-        <pc:cxnChg chg="add del mod">
-          <ac:chgData name="Hemma Philamore" userId="db50e2f3-17b2-4cc0-b719-fb6254d3e9df" providerId="ADAL" clId="{35C0B9A2-A60C-57EC-AD9B-630767BE11FE}" dt="2025-11-20T10:49:48.348" v="444" actId="478"/>
-          <ac:cxnSpMkLst>
-            <pc:docMk/>
-            <pc:sldMk cId="2055881703" sldId="256"/>
-            <ac:cxnSpMk id="57" creationId="{D30B195A-439B-956F-54BF-9C2087DF5A26}"/>
-          </ac:cxnSpMkLst>
-        </pc:cxnChg>
-        <pc:cxnChg chg="add del mod">
-          <ac:chgData name="Hemma Philamore" userId="db50e2f3-17b2-4cc0-b719-fb6254d3e9df" providerId="ADAL" clId="{35C0B9A2-A60C-57EC-AD9B-630767BE11FE}" dt="2025-11-20T10:49:47.319" v="443" actId="478"/>
-          <ac:cxnSpMkLst>
-            <pc:docMk/>
-            <pc:sldMk cId="2055881703" sldId="256"/>
-            <ac:cxnSpMk id="58" creationId="{24627312-FBF2-A73B-ED3C-7FA68DB17433}"/>
-          </ac:cxnSpMkLst>
-        </pc:cxnChg>
-        <pc:cxnChg chg="del">
-          <ac:chgData name="Hemma Philamore" userId="db50e2f3-17b2-4cc0-b719-fb6254d3e9df" providerId="ADAL" clId="{35C0B9A2-A60C-57EC-AD9B-630767BE11FE}" dt="2025-11-20T10:50:15.481" v="454" actId="478"/>
-          <ac:cxnSpMkLst>
-            <pc:docMk/>
-            <pc:sldMk cId="2055881703" sldId="256"/>
-            <ac:cxnSpMk id="64" creationId="{4ABBD524-FE8B-1AEA-F423-625A6B82B344}"/>
-          </ac:cxnSpMkLst>
-        </pc:cxnChg>
         <pc:cxnChg chg="add mod">
           <ac:chgData name="Hemma Philamore" userId="db50e2f3-17b2-4cc0-b719-fb6254d3e9df" providerId="ADAL" clId="{35C0B9A2-A60C-57EC-AD9B-630767BE11FE}" dt="2025-11-20T10:50:40.617" v="456" actId="164"/>
           <ac:cxnSpMkLst>
@@ -1226,116 +880,12 @@
             <ac:cxnSpMk id="67" creationId="{00C822D5-2BC3-CD28-1168-BB36C2CAABCA}"/>
           </ac:cxnSpMkLst>
         </pc:cxnChg>
-        <pc:cxnChg chg="mod">
-          <ac:chgData name="Hemma Philamore" userId="db50e2f3-17b2-4cc0-b719-fb6254d3e9df" providerId="ADAL" clId="{35C0B9A2-A60C-57EC-AD9B-630767BE11FE}" dt="2025-11-20T10:50:57.959" v="457"/>
-          <ac:cxnSpMkLst>
-            <pc:docMk/>
-            <pc:sldMk cId="2055881703" sldId="256"/>
-            <ac:cxnSpMk id="70" creationId="{8E2CB805-3F6F-787A-5236-85EC132578A8}"/>
-          </ac:cxnSpMkLst>
-        </pc:cxnChg>
-        <pc:cxnChg chg="mod">
-          <ac:chgData name="Hemma Philamore" userId="db50e2f3-17b2-4cc0-b719-fb6254d3e9df" providerId="ADAL" clId="{35C0B9A2-A60C-57EC-AD9B-630767BE11FE}" dt="2025-11-20T10:50:57.959" v="457"/>
-          <ac:cxnSpMkLst>
-            <pc:docMk/>
-            <pc:sldMk cId="2055881703" sldId="256"/>
-            <ac:cxnSpMk id="71" creationId="{9E5B849C-7677-3560-137B-67C54A363687}"/>
-          </ac:cxnSpMkLst>
-        </pc:cxnChg>
-        <pc:cxnChg chg="mod">
-          <ac:chgData name="Hemma Philamore" userId="db50e2f3-17b2-4cc0-b719-fb6254d3e9df" providerId="ADAL" clId="{35C0B9A2-A60C-57EC-AD9B-630767BE11FE}" dt="2025-11-20T10:50:58.365" v="458"/>
-          <ac:cxnSpMkLst>
-            <pc:docMk/>
-            <pc:sldMk cId="2055881703" sldId="256"/>
-            <ac:cxnSpMk id="73" creationId="{5E23EF09-1DAA-5DB8-703B-8A045FDC8AFF}"/>
-          </ac:cxnSpMkLst>
-        </pc:cxnChg>
-        <pc:cxnChg chg="mod">
-          <ac:chgData name="Hemma Philamore" userId="db50e2f3-17b2-4cc0-b719-fb6254d3e9df" providerId="ADAL" clId="{35C0B9A2-A60C-57EC-AD9B-630767BE11FE}" dt="2025-11-20T10:50:58.365" v="458"/>
-          <ac:cxnSpMkLst>
-            <pc:docMk/>
-            <pc:sldMk cId="2055881703" sldId="256"/>
-            <ac:cxnSpMk id="74" creationId="{3CA48C36-D65A-7482-49C0-C8E7EB0F80B9}"/>
-          </ac:cxnSpMkLst>
-        </pc:cxnChg>
-        <pc:cxnChg chg="mod">
-          <ac:chgData name="Hemma Philamore" userId="db50e2f3-17b2-4cc0-b719-fb6254d3e9df" providerId="ADAL" clId="{35C0B9A2-A60C-57EC-AD9B-630767BE11FE}" dt="2025-11-20T10:50:58.798" v="459"/>
-          <ac:cxnSpMkLst>
-            <pc:docMk/>
-            <pc:sldMk cId="2055881703" sldId="256"/>
-            <ac:cxnSpMk id="76" creationId="{5529DA44-F22C-6A98-E5A2-FA99B81CDA02}"/>
-          </ac:cxnSpMkLst>
-        </pc:cxnChg>
-        <pc:cxnChg chg="mod">
-          <ac:chgData name="Hemma Philamore" userId="db50e2f3-17b2-4cc0-b719-fb6254d3e9df" providerId="ADAL" clId="{35C0B9A2-A60C-57EC-AD9B-630767BE11FE}" dt="2025-11-20T10:50:58.798" v="459"/>
-          <ac:cxnSpMkLst>
-            <pc:docMk/>
-            <pc:sldMk cId="2055881703" sldId="256"/>
-            <ac:cxnSpMk id="77" creationId="{1114AD4F-40A6-7F1B-0FFA-B4571FD033A3}"/>
-          </ac:cxnSpMkLst>
-        </pc:cxnChg>
         <pc:cxnChg chg="mod topLvl">
           <ac:chgData name="Hemma Philamore" userId="db50e2f3-17b2-4cc0-b719-fb6254d3e9df" providerId="ADAL" clId="{35C0B9A2-A60C-57EC-AD9B-630767BE11FE}" dt="2025-11-20T10:55:22.304" v="528" actId="164"/>
           <ac:cxnSpMkLst>
             <pc:docMk/>
             <pc:sldMk cId="2055881703" sldId="256"/>
             <ac:cxnSpMk id="79" creationId="{B9B60649-FEB6-60E8-713C-4CF2679B967C}"/>
-          </ac:cxnSpMkLst>
-        </pc:cxnChg>
-        <pc:cxnChg chg="del mod topLvl">
-          <ac:chgData name="Hemma Philamore" userId="db50e2f3-17b2-4cc0-b719-fb6254d3e9df" providerId="ADAL" clId="{35C0B9A2-A60C-57EC-AD9B-630767BE11FE}" dt="2025-11-20T10:54:18.405" v="506" actId="478"/>
-          <ac:cxnSpMkLst>
-            <pc:docMk/>
-            <pc:sldMk cId="2055881703" sldId="256"/>
-            <ac:cxnSpMk id="80" creationId="{2E2F0708-331A-FE52-1F41-B2D4692FC0B4}"/>
-          </ac:cxnSpMkLst>
-        </pc:cxnChg>
-        <pc:cxnChg chg="mod">
-          <ac:chgData name="Hemma Philamore" userId="db50e2f3-17b2-4cc0-b719-fb6254d3e9df" providerId="ADAL" clId="{35C0B9A2-A60C-57EC-AD9B-630767BE11FE}" dt="2025-11-20T10:51:52.878" v="474"/>
-          <ac:cxnSpMkLst>
-            <pc:docMk/>
-            <pc:sldMk cId="2055881703" sldId="256"/>
-            <ac:cxnSpMk id="92" creationId="{08956005-0D8B-582C-F23A-35E7BFC4ED55}"/>
-          </ac:cxnSpMkLst>
-        </pc:cxnChg>
-        <pc:cxnChg chg="mod">
-          <ac:chgData name="Hemma Philamore" userId="db50e2f3-17b2-4cc0-b719-fb6254d3e9df" providerId="ADAL" clId="{35C0B9A2-A60C-57EC-AD9B-630767BE11FE}" dt="2025-11-20T10:51:52.878" v="474"/>
-          <ac:cxnSpMkLst>
-            <pc:docMk/>
-            <pc:sldMk cId="2055881703" sldId="256"/>
-            <ac:cxnSpMk id="93" creationId="{7AE81C34-BF92-9E33-6103-3FE7E6278ACF}"/>
-          </ac:cxnSpMkLst>
-        </pc:cxnChg>
-        <pc:cxnChg chg="mod">
-          <ac:chgData name="Hemma Philamore" userId="db50e2f3-17b2-4cc0-b719-fb6254d3e9df" providerId="ADAL" clId="{35C0B9A2-A60C-57EC-AD9B-630767BE11FE}" dt="2025-11-20T10:51:56.513" v="476"/>
-          <ac:cxnSpMkLst>
-            <pc:docMk/>
-            <pc:sldMk cId="2055881703" sldId="256"/>
-            <ac:cxnSpMk id="100" creationId="{505B6C6F-E9CB-A131-6619-D2FA562F0BF2}"/>
-          </ac:cxnSpMkLst>
-        </pc:cxnChg>
-        <pc:cxnChg chg="mod">
-          <ac:chgData name="Hemma Philamore" userId="db50e2f3-17b2-4cc0-b719-fb6254d3e9df" providerId="ADAL" clId="{35C0B9A2-A60C-57EC-AD9B-630767BE11FE}" dt="2025-11-20T10:51:56.513" v="476"/>
-          <ac:cxnSpMkLst>
-            <pc:docMk/>
-            <pc:sldMk cId="2055881703" sldId="256"/>
-            <ac:cxnSpMk id="101" creationId="{7E7D0B9F-4B8F-692B-F78F-19D3331EE335}"/>
-          </ac:cxnSpMkLst>
-        </pc:cxnChg>
-        <pc:cxnChg chg="del mod topLvl">
-          <ac:chgData name="Hemma Philamore" userId="db50e2f3-17b2-4cc0-b719-fb6254d3e9df" providerId="ADAL" clId="{35C0B9A2-A60C-57EC-AD9B-630767BE11FE}" dt="2025-11-20T10:54:44.407" v="515" actId="478"/>
-          <ac:cxnSpMkLst>
-            <pc:docMk/>
-            <pc:sldMk cId="2055881703" sldId="256"/>
-            <ac:cxnSpMk id="103" creationId="{29A6C44A-32A7-3A11-55C4-091C14FAB6B6}"/>
-          </ac:cxnSpMkLst>
-        </pc:cxnChg>
-        <pc:cxnChg chg="del mod topLvl">
-          <ac:chgData name="Hemma Philamore" userId="db50e2f3-17b2-4cc0-b719-fb6254d3e9df" providerId="ADAL" clId="{35C0B9A2-A60C-57EC-AD9B-630767BE11FE}" dt="2025-11-20T10:54:45.094" v="516" actId="478"/>
-          <ac:cxnSpMkLst>
-            <pc:docMk/>
-            <pc:sldMk cId="2055881703" sldId="256"/>
-            <ac:cxnSpMk id="104" creationId="{52BBA10A-21FA-CFD4-7A2F-71E09310B0E2}"/>
           </ac:cxnSpMkLst>
         </pc:cxnChg>
         <pc:cxnChg chg="add mod">
@@ -1392,30 +942,6 @@
             <pc:docMk/>
             <pc:sldMk cId="2055881703" sldId="256"/>
             <ac:cxnSpMk id="136" creationId="{A69A49EA-3D86-56C9-C3E0-048AD3BB55B9}"/>
-          </ac:cxnSpMkLst>
-        </pc:cxnChg>
-        <pc:cxnChg chg="add del mod">
-          <ac:chgData name="Hemma Philamore" userId="db50e2f3-17b2-4cc0-b719-fb6254d3e9df" providerId="ADAL" clId="{35C0B9A2-A60C-57EC-AD9B-630767BE11FE}" dt="2025-11-20T11:01:22.910" v="635" actId="478"/>
-          <ac:cxnSpMkLst>
-            <pc:docMk/>
-            <pc:sldMk cId="2055881703" sldId="256"/>
-            <ac:cxnSpMk id="151" creationId="{9E1AA743-DCB2-7424-BD80-E4070790B738}"/>
-          </ac:cxnSpMkLst>
-        </pc:cxnChg>
-        <pc:cxnChg chg="add del mod">
-          <ac:chgData name="Hemma Philamore" userId="db50e2f3-17b2-4cc0-b719-fb6254d3e9df" providerId="ADAL" clId="{35C0B9A2-A60C-57EC-AD9B-630767BE11FE}" dt="2025-11-20T11:01:23.598" v="636" actId="478"/>
-          <ac:cxnSpMkLst>
-            <pc:docMk/>
-            <pc:sldMk cId="2055881703" sldId="256"/>
-            <ac:cxnSpMk id="153" creationId="{7E729C39-DFD5-EB77-2D02-0088F6AC8E6E}"/>
-          </ac:cxnSpMkLst>
-        </pc:cxnChg>
-        <pc:cxnChg chg="add del mod">
-          <ac:chgData name="Hemma Philamore" userId="db50e2f3-17b2-4cc0-b719-fb6254d3e9df" providerId="ADAL" clId="{35C0B9A2-A60C-57EC-AD9B-630767BE11FE}" dt="2025-11-20T11:01:24.326" v="637" actId="478"/>
-          <ac:cxnSpMkLst>
-            <pc:docMk/>
-            <pc:sldMk cId="2055881703" sldId="256"/>
-            <ac:cxnSpMk id="155" creationId="{0AE5C6F3-F126-BCA9-524A-9D65C98338D7}"/>
           </ac:cxnSpMkLst>
         </pc:cxnChg>
         <pc:cxnChg chg="mod">
@@ -1660,7 +1186,7 @@
           <a:p>
             <a:fld id="{24C539BA-54A7-0D48-93B9-3DB7468E8C1A}" type="datetimeFigureOut">
               <a:rPr lang="en-US" smtClean="0"/>
-              <a:t>11/20/25</a:t>
+              <a:t>11/25/25</a:t>
             </a:fld>
             <a:endParaRPr lang="en-US"/>
           </a:p>
@@ -1860,7 +1386,7 @@
           <a:p>
             <a:fld id="{24C539BA-54A7-0D48-93B9-3DB7468E8C1A}" type="datetimeFigureOut">
               <a:rPr lang="en-US" smtClean="0"/>
-              <a:t>11/20/25</a:t>
+              <a:t>11/25/25</a:t>
             </a:fld>
             <a:endParaRPr lang="en-US"/>
           </a:p>
@@ -2070,7 +1596,7 @@
           <a:p>
             <a:fld id="{24C539BA-54A7-0D48-93B9-3DB7468E8C1A}" type="datetimeFigureOut">
               <a:rPr lang="en-US" smtClean="0"/>
-              <a:t>11/20/25</a:t>
+              <a:t>11/25/25</a:t>
             </a:fld>
             <a:endParaRPr lang="en-US"/>
           </a:p>
@@ -2270,7 +1796,7 @@
           <a:p>
             <a:fld id="{24C539BA-54A7-0D48-93B9-3DB7468E8C1A}" type="datetimeFigureOut">
               <a:rPr lang="en-US" smtClean="0"/>
-              <a:t>11/20/25</a:t>
+              <a:t>11/25/25</a:t>
             </a:fld>
             <a:endParaRPr lang="en-US"/>
           </a:p>
@@ -2546,7 +2072,7 @@
           <a:p>
             <a:fld id="{24C539BA-54A7-0D48-93B9-3DB7468E8C1A}" type="datetimeFigureOut">
               <a:rPr lang="en-US" smtClean="0"/>
-              <a:t>11/20/25</a:t>
+              <a:t>11/25/25</a:t>
             </a:fld>
             <a:endParaRPr lang="en-US"/>
           </a:p>
@@ -2814,7 +2340,7 @@
           <a:p>
             <a:fld id="{24C539BA-54A7-0D48-93B9-3DB7468E8C1A}" type="datetimeFigureOut">
               <a:rPr lang="en-US" smtClean="0"/>
-              <a:t>11/20/25</a:t>
+              <a:t>11/25/25</a:t>
             </a:fld>
             <a:endParaRPr lang="en-US"/>
           </a:p>
@@ -3229,7 +2755,7 @@
           <a:p>
             <a:fld id="{24C539BA-54A7-0D48-93B9-3DB7468E8C1A}" type="datetimeFigureOut">
               <a:rPr lang="en-US" smtClean="0"/>
-              <a:t>11/20/25</a:t>
+              <a:t>11/25/25</a:t>
             </a:fld>
             <a:endParaRPr lang="en-US"/>
           </a:p>
@@ -3371,7 +2897,7 @@
           <a:p>
             <a:fld id="{24C539BA-54A7-0D48-93B9-3DB7468E8C1A}" type="datetimeFigureOut">
               <a:rPr lang="en-US" smtClean="0"/>
-              <a:t>11/20/25</a:t>
+              <a:t>11/25/25</a:t>
             </a:fld>
             <a:endParaRPr lang="en-US"/>
           </a:p>
@@ -3484,7 +3010,7 @@
           <a:p>
             <a:fld id="{24C539BA-54A7-0D48-93B9-3DB7468E8C1A}" type="datetimeFigureOut">
               <a:rPr lang="en-US" smtClean="0"/>
-              <a:t>11/20/25</a:t>
+              <a:t>11/25/25</a:t>
             </a:fld>
             <a:endParaRPr lang="en-US"/>
           </a:p>
@@ -3797,7 +3323,7 @@
           <a:p>
             <a:fld id="{24C539BA-54A7-0D48-93B9-3DB7468E8C1A}" type="datetimeFigureOut">
               <a:rPr lang="en-US" smtClean="0"/>
-              <a:t>11/20/25</a:t>
+              <a:t>11/25/25</a:t>
             </a:fld>
             <a:endParaRPr lang="en-US"/>
           </a:p>
@@ -4086,7 +3612,7 @@
           <a:p>
             <a:fld id="{24C539BA-54A7-0D48-93B9-3DB7468E8C1A}" type="datetimeFigureOut">
               <a:rPr lang="en-US" smtClean="0"/>
-              <a:t>11/20/25</a:t>
+              <a:t>11/25/25</a:t>
             </a:fld>
             <a:endParaRPr lang="en-US"/>
           </a:p>
@@ -4329,7 +3855,7 @@
           <a:p>
             <a:fld id="{24C539BA-54A7-0D48-93B9-3DB7468E8C1A}" type="datetimeFigureOut">
               <a:rPr lang="en-US" smtClean="0"/>
-              <a:t>11/20/25</a:t>
+              <a:t>11/25/25</a:t>
             </a:fld>
             <a:endParaRPr lang="en-US"/>
           </a:p>
@@ -5132,8 +4658,8 @@
           </a:p>
         </p:txBody>
       </p:sp>
-      <mc:AlternateContent xmlns:mc="http://schemas.openxmlformats.org/markup-compatibility/2006">
-        <mc:Choice xmlns:a14="http://schemas.microsoft.com/office/drawing/2010/main" Requires="a14">
+      <mc:AlternateContent xmlns:mc="http://schemas.openxmlformats.org/markup-compatibility/2006" xmlns:a14="http://schemas.microsoft.com/office/drawing/2010/main">
+        <mc:Choice Requires="a14">
           <p:sp>
             <p:nvSpPr>
               <p:cNvPr id="37" name="TextBox 36">
@@ -5212,7 +4738,7 @@
             </p:txBody>
           </p:sp>
         </mc:Choice>
-        <mc:Fallback>
+        <mc:Fallback xmlns="">
           <p:sp>
             <p:nvSpPr>
               <p:cNvPr id="37" name="TextBox 36">
@@ -5257,8 +4783,8 @@
           </p:sp>
         </mc:Fallback>
       </mc:AlternateContent>
-      <mc:AlternateContent xmlns:mc="http://schemas.openxmlformats.org/markup-compatibility/2006">
-        <mc:Choice xmlns:a14="http://schemas.microsoft.com/office/drawing/2010/main" Requires="a14">
+      <mc:AlternateContent xmlns:mc="http://schemas.openxmlformats.org/markup-compatibility/2006" xmlns:a14="http://schemas.microsoft.com/office/drawing/2010/main">
+        <mc:Choice Requires="a14">
           <p:sp>
             <p:nvSpPr>
               <p:cNvPr id="38" name="TextBox 37">
@@ -5338,7 +4864,7 @@
             </p:txBody>
           </p:sp>
         </mc:Choice>
-        <mc:Fallback>
+        <mc:Fallback xmlns="">
           <p:sp>
             <p:nvSpPr>
               <p:cNvPr id="38" name="TextBox 37">
@@ -5383,8 +4909,8 @@
           </p:sp>
         </mc:Fallback>
       </mc:AlternateContent>
-      <mc:AlternateContent xmlns:mc="http://schemas.openxmlformats.org/markup-compatibility/2006">
-        <mc:Choice xmlns:a14="http://schemas.microsoft.com/office/drawing/2010/main" Requires="a14">
+      <mc:AlternateContent xmlns:mc="http://schemas.openxmlformats.org/markup-compatibility/2006" xmlns:a14="http://schemas.microsoft.com/office/drawing/2010/main">
+        <mc:Choice Requires="a14">
           <p:sp>
             <p:nvSpPr>
               <p:cNvPr id="39" name="TextBox 38">
@@ -5437,7 +4963,7 @@
             </p:txBody>
           </p:sp>
         </mc:Choice>
-        <mc:Fallback>
+        <mc:Fallback xmlns="">
           <p:sp>
             <p:nvSpPr>
               <p:cNvPr id="39" name="TextBox 38">
@@ -5543,8 +5069,8 @@
             </p:nvSpPr>
             <p:spPr>
               <a:xfrm rot="1709088">
-                <a:off x="7902943" y="1373958"/>
-                <a:ext cx="535275" cy="138499"/>
+                <a:off x="7804184" y="1397399"/>
+                <a:ext cx="713402" cy="276999"/>
               </a:xfrm>
               <a:prstGeom prst="rect">
                 <a:avLst/>
@@ -5556,6 +5082,12 @@
                 <a:spAutoFit/>
               </a:bodyPr>
               <a:lstStyle/>
+              <a:p>
+                <a:r>
+                  <a:rPr lang="en-GB" sz="900" dirty="0"/>
+                  <a:t>Sensor range</a:t>
+                </a:r>
+              </a:p>
               <a:p>
                 <a14:m>
                   <m:oMath xmlns:m="http://schemas.openxmlformats.org/officeDocument/2006/math">
@@ -5598,8 +5130,8 @@
             </p:nvSpPr>
             <p:spPr>
               <a:xfrm rot="1709088">
-                <a:off x="7902943" y="1373958"/>
-                <a:ext cx="535275" cy="138499"/>
+                <a:off x="7804184" y="1397399"/>
+                <a:ext cx="713402" cy="276999"/>
               </a:xfrm>
               <a:prstGeom prst="rect">
                 <a:avLst/>
@@ -5607,7 +5139,7 @@
               <a:blipFill>
                 <a:blip r:embed="rId6"/>
                 <a:stretch>
-                  <a:fillRect l="-6977" t="-3226" b="-6452"/>
+                  <a:fillRect l="-4918" t="-10638" r="-3279"/>
                 </a:stretch>
               </a:blipFill>
             </p:spPr>
@@ -5769,8 +5301,8 @@
           </a:p>
         </p:txBody>
       </p:sp>
-      <mc:AlternateContent xmlns:mc="http://schemas.openxmlformats.org/markup-compatibility/2006">
-        <mc:Choice xmlns:a14="http://schemas.microsoft.com/office/drawing/2010/main" Requires="a14">
+      <mc:AlternateContent xmlns:mc="http://schemas.openxmlformats.org/markup-compatibility/2006" xmlns:a14="http://schemas.microsoft.com/office/drawing/2010/main">
+        <mc:Choice Requires="a14">
           <p:sp>
             <p:nvSpPr>
               <p:cNvPr id="146" name="TextBox 145">
@@ -5799,6 +5331,7 @@
               </a:bodyPr>
               <a:lstStyle/>
               <a:p>
+                <a:pPr/>
                 <a14:m>
                   <m:oMathPara xmlns:m="http://schemas.openxmlformats.org/officeDocument/2006/math">
                     <m:oMathParaPr>
@@ -5838,7 +5371,7 @@
             </p:txBody>
           </p:sp>
         </mc:Choice>
-        <mc:Fallback>
+        <mc:Fallback xmlns="">
           <p:sp>
             <p:nvSpPr>
               <p:cNvPr id="146" name="TextBox 145">
@@ -5883,8 +5416,8 @@
           </p:sp>
         </mc:Fallback>
       </mc:AlternateContent>
-      <mc:AlternateContent xmlns:mc="http://schemas.openxmlformats.org/markup-compatibility/2006">
-        <mc:Choice xmlns:a14="http://schemas.microsoft.com/office/drawing/2010/main" Requires="a14">
+      <mc:AlternateContent xmlns:mc="http://schemas.openxmlformats.org/markup-compatibility/2006" xmlns:a14="http://schemas.microsoft.com/office/drawing/2010/main">
+        <mc:Choice Requires="a14">
           <p:sp>
             <p:nvSpPr>
               <p:cNvPr id="147" name="TextBox 146">
@@ -5913,6 +5446,7 @@
               </a:bodyPr>
               <a:lstStyle/>
               <a:p>
+                <a:pPr/>
                 <a14:m>
                   <m:oMathPara xmlns:m="http://schemas.openxmlformats.org/officeDocument/2006/math">
                     <m:oMathParaPr>
@@ -5952,7 +5486,7 @@
             </p:txBody>
           </p:sp>
         </mc:Choice>
-        <mc:Fallback>
+        <mc:Fallback xmlns="">
           <p:sp>
             <p:nvSpPr>
               <p:cNvPr id="147" name="TextBox 146">
@@ -5997,8 +5531,8 @@
           </p:sp>
         </mc:Fallback>
       </mc:AlternateContent>
-      <mc:AlternateContent xmlns:mc="http://schemas.openxmlformats.org/markup-compatibility/2006">
-        <mc:Choice xmlns:a14="http://schemas.microsoft.com/office/drawing/2010/main" Requires="a14">
+      <mc:AlternateContent xmlns:mc="http://schemas.openxmlformats.org/markup-compatibility/2006" xmlns:a14="http://schemas.microsoft.com/office/drawing/2010/main">
+        <mc:Choice Requires="a14">
           <p:sp>
             <p:nvSpPr>
               <p:cNvPr id="148" name="TextBox 147">
@@ -6027,6 +5561,7 @@
               </a:bodyPr>
               <a:lstStyle/>
               <a:p>
+                <a:pPr/>
                 <a14:m>
                   <m:oMathPara xmlns:m="http://schemas.openxmlformats.org/officeDocument/2006/math">
                     <m:oMathParaPr>
@@ -6066,7 +5601,7 @@
             </p:txBody>
           </p:sp>
         </mc:Choice>
-        <mc:Fallback>
+        <mc:Fallback xmlns="">
           <p:sp>
             <p:nvSpPr>
               <p:cNvPr id="148" name="TextBox 147">
@@ -6111,8 +5646,8 @@
           </p:sp>
         </mc:Fallback>
       </mc:AlternateContent>
-      <mc:AlternateContent xmlns:mc="http://schemas.openxmlformats.org/markup-compatibility/2006">
-        <mc:Choice xmlns:a14="http://schemas.microsoft.com/office/drawing/2010/main" Requires="a14">
+      <mc:AlternateContent xmlns:mc="http://schemas.openxmlformats.org/markup-compatibility/2006" xmlns:a14="http://schemas.microsoft.com/office/drawing/2010/main">
+        <mc:Choice Requires="a14">
           <p:sp>
             <p:nvSpPr>
               <p:cNvPr id="149" name="TextBox 148">
@@ -6141,6 +5676,7 @@
               </a:bodyPr>
               <a:lstStyle/>
               <a:p>
+                <a:pPr/>
                 <a14:m>
                   <m:oMathPara xmlns:m="http://schemas.openxmlformats.org/officeDocument/2006/math">
                     <m:oMathParaPr>
@@ -6180,7 +5716,7 @@
             </p:txBody>
           </p:sp>
         </mc:Choice>
-        <mc:Fallback>
+        <mc:Fallback xmlns="">
           <p:sp>
             <p:nvSpPr>
               <p:cNvPr id="149" name="TextBox 148">
@@ -6575,8 +6111,8 @@
           </p:style>
         </p:cxnSp>
       </p:grpSp>
-      <mc:AlternateContent xmlns:mc="http://schemas.openxmlformats.org/markup-compatibility/2006">
-        <mc:Choice xmlns:a14="http://schemas.microsoft.com/office/drawing/2010/main" Requires="a14">
+      <mc:AlternateContent xmlns:mc="http://schemas.openxmlformats.org/markup-compatibility/2006" xmlns:a14="http://schemas.microsoft.com/office/drawing/2010/main">
+        <mc:Choice Requires="a14">
           <p:sp>
             <p:nvSpPr>
               <p:cNvPr id="165" name="TextBox 164">
@@ -6605,6 +6141,7 @@
               </a:bodyPr>
               <a:lstStyle/>
               <a:p>
+                <a:pPr/>
                 <a14:m>
                   <m:oMathPara xmlns:m="http://schemas.openxmlformats.org/officeDocument/2006/math">
                     <m:oMathParaPr>
@@ -6644,7 +6181,7 @@
             </p:txBody>
           </p:sp>
         </mc:Choice>
-        <mc:Fallback>
+        <mc:Fallback xmlns="">
           <p:sp>
             <p:nvSpPr>
               <p:cNvPr id="165" name="TextBox 164">
@@ -6689,8 +6226,8 @@
           </p:sp>
         </mc:Fallback>
       </mc:AlternateContent>
-      <mc:AlternateContent xmlns:mc="http://schemas.openxmlformats.org/markup-compatibility/2006">
-        <mc:Choice xmlns:a14="http://schemas.microsoft.com/office/drawing/2010/main" Requires="a14">
+      <mc:AlternateContent xmlns:mc="http://schemas.openxmlformats.org/markup-compatibility/2006" xmlns:a14="http://schemas.microsoft.com/office/drawing/2010/main">
+        <mc:Choice Requires="a14">
           <p:sp>
             <p:nvSpPr>
               <p:cNvPr id="166" name="TextBox 165">
@@ -6719,6 +6256,7 @@
               </a:bodyPr>
               <a:lstStyle/>
               <a:p>
+                <a:pPr/>
                 <a14:m>
                   <m:oMathPara xmlns:m="http://schemas.openxmlformats.org/officeDocument/2006/math">
                     <m:oMathParaPr>
@@ -6758,7 +6296,7 @@
             </p:txBody>
           </p:sp>
         </mc:Choice>
-        <mc:Fallback>
+        <mc:Fallback xmlns="">
           <p:sp>
             <p:nvSpPr>
               <p:cNvPr id="166" name="TextBox 165">
@@ -6803,8 +6341,8 @@
           </p:sp>
         </mc:Fallback>
       </mc:AlternateContent>
-      <mc:AlternateContent xmlns:mc="http://schemas.openxmlformats.org/markup-compatibility/2006">
-        <mc:Choice xmlns:a14="http://schemas.microsoft.com/office/drawing/2010/main" Requires="a14">
+      <mc:AlternateContent xmlns:mc="http://schemas.openxmlformats.org/markup-compatibility/2006" xmlns:a14="http://schemas.microsoft.com/office/drawing/2010/main">
+        <mc:Choice Requires="a14">
           <p:sp>
             <p:nvSpPr>
               <p:cNvPr id="167" name="TextBox 166">
@@ -6833,6 +6371,7 @@
               </a:bodyPr>
               <a:lstStyle/>
               <a:p>
+                <a:pPr/>
                 <a14:m>
                   <m:oMathPara xmlns:m="http://schemas.openxmlformats.org/officeDocument/2006/math">
                     <m:oMathParaPr>
@@ -6872,7 +6411,7 @@
             </p:txBody>
           </p:sp>
         </mc:Choice>
-        <mc:Fallback>
+        <mc:Fallback xmlns="">
           <p:sp>
             <p:nvSpPr>
               <p:cNvPr id="167" name="TextBox 166">
@@ -6917,8 +6456,8 @@
           </p:sp>
         </mc:Fallback>
       </mc:AlternateContent>
-      <mc:AlternateContent xmlns:mc="http://schemas.openxmlformats.org/markup-compatibility/2006">
-        <mc:Choice xmlns:a14="http://schemas.microsoft.com/office/drawing/2010/main" Requires="a14">
+      <mc:AlternateContent xmlns:mc="http://schemas.openxmlformats.org/markup-compatibility/2006" xmlns:a14="http://schemas.microsoft.com/office/drawing/2010/main">
+        <mc:Choice Requires="a14">
           <p:sp>
             <p:nvSpPr>
               <p:cNvPr id="168" name="TextBox 167">
@@ -6947,6 +6486,7 @@
               </a:bodyPr>
               <a:lstStyle/>
               <a:p>
+                <a:pPr/>
                 <a14:m>
                   <m:oMathPara xmlns:m="http://schemas.openxmlformats.org/officeDocument/2006/math">
                     <m:oMathParaPr>
@@ -6986,7 +6526,7 @@
             </p:txBody>
           </p:sp>
         </mc:Choice>
-        <mc:Fallback>
+        <mc:Fallback xmlns="">
           <p:sp>
             <p:nvSpPr>
               <p:cNvPr id="168" name="TextBox 167">
@@ -7381,8 +6921,8 @@
           </p:style>
         </p:cxnSp>
       </p:grpSp>
-      <mc:AlternateContent xmlns:mc="http://schemas.openxmlformats.org/markup-compatibility/2006">
-        <mc:Choice xmlns:a14="http://schemas.microsoft.com/office/drawing/2010/main" Requires="a14">
+      <mc:AlternateContent xmlns:mc="http://schemas.openxmlformats.org/markup-compatibility/2006" xmlns:a14="http://schemas.microsoft.com/office/drawing/2010/main">
+        <mc:Choice Requires="a14">
           <p:sp>
             <p:nvSpPr>
               <p:cNvPr id="178" name="TextBox 177">
@@ -7411,6 +6951,7 @@
               </a:bodyPr>
               <a:lstStyle/>
               <a:p>
+                <a:pPr/>
                 <a14:m>
                   <m:oMathPara xmlns:m="http://schemas.openxmlformats.org/officeDocument/2006/math">
                     <m:oMathParaPr>
@@ -7450,7 +6991,7 @@
             </p:txBody>
           </p:sp>
         </mc:Choice>
-        <mc:Fallback>
+        <mc:Fallback xmlns="">
           <p:sp>
             <p:nvSpPr>
               <p:cNvPr id="178" name="TextBox 177">
@@ -7495,8 +7036,8 @@
           </p:sp>
         </mc:Fallback>
       </mc:AlternateContent>
-      <mc:AlternateContent xmlns:mc="http://schemas.openxmlformats.org/markup-compatibility/2006">
-        <mc:Choice xmlns:a14="http://schemas.microsoft.com/office/drawing/2010/main" Requires="a14">
+      <mc:AlternateContent xmlns:mc="http://schemas.openxmlformats.org/markup-compatibility/2006" xmlns:a14="http://schemas.microsoft.com/office/drawing/2010/main">
+        <mc:Choice Requires="a14">
           <p:sp>
             <p:nvSpPr>
               <p:cNvPr id="179" name="TextBox 178">
@@ -7525,6 +7066,7 @@
               </a:bodyPr>
               <a:lstStyle/>
               <a:p>
+                <a:pPr/>
                 <a14:m>
                   <m:oMathPara xmlns:m="http://schemas.openxmlformats.org/officeDocument/2006/math">
                     <m:oMathParaPr>
@@ -7564,7 +7106,7 @@
             </p:txBody>
           </p:sp>
         </mc:Choice>
-        <mc:Fallback>
+        <mc:Fallback xmlns="">
           <p:sp>
             <p:nvSpPr>
               <p:cNvPr id="179" name="TextBox 178">
@@ -7609,8 +7151,8 @@
           </p:sp>
         </mc:Fallback>
       </mc:AlternateContent>
-      <mc:AlternateContent xmlns:mc="http://schemas.openxmlformats.org/markup-compatibility/2006">
-        <mc:Choice xmlns:a14="http://schemas.microsoft.com/office/drawing/2010/main" Requires="a14">
+      <mc:AlternateContent xmlns:mc="http://schemas.openxmlformats.org/markup-compatibility/2006" xmlns:a14="http://schemas.microsoft.com/office/drawing/2010/main">
+        <mc:Choice Requires="a14">
           <p:sp>
             <p:nvSpPr>
               <p:cNvPr id="180" name="TextBox 179">
@@ -7639,6 +7181,7 @@
               </a:bodyPr>
               <a:lstStyle/>
               <a:p>
+                <a:pPr/>
                 <a14:m>
                   <m:oMathPara xmlns:m="http://schemas.openxmlformats.org/officeDocument/2006/math">
                     <m:oMathParaPr>
@@ -7678,7 +7221,7 @@
             </p:txBody>
           </p:sp>
         </mc:Choice>
-        <mc:Fallback>
+        <mc:Fallback xmlns="">
           <p:sp>
             <p:nvSpPr>
               <p:cNvPr id="180" name="TextBox 179">
@@ -7723,8 +7266,8 @@
           </p:sp>
         </mc:Fallback>
       </mc:AlternateContent>
-      <mc:AlternateContent xmlns:mc="http://schemas.openxmlformats.org/markup-compatibility/2006">
-        <mc:Choice xmlns:a14="http://schemas.microsoft.com/office/drawing/2010/main" Requires="a14">
+      <mc:AlternateContent xmlns:mc="http://schemas.openxmlformats.org/markup-compatibility/2006" xmlns:a14="http://schemas.microsoft.com/office/drawing/2010/main">
+        <mc:Choice Requires="a14">
           <p:sp>
             <p:nvSpPr>
               <p:cNvPr id="181" name="TextBox 180">
@@ -7753,6 +7296,7 @@
               </a:bodyPr>
               <a:lstStyle/>
               <a:p>
+                <a:pPr/>
                 <a14:m>
                   <m:oMathPara xmlns:m="http://schemas.openxmlformats.org/officeDocument/2006/math">
                     <m:oMathParaPr>
@@ -7792,7 +7336,7 @@
             </p:txBody>
           </p:sp>
         </mc:Choice>
-        <mc:Fallback>
+        <mc:Fallback xmlns="">
           <p:sp>
             <p:nvSpPr>
               <p:cNvPr id="181" name="TextBox 180">
@@ -9497,8 +9041,8 @@
           </a:fontRef>
         </p:style>
       </p:cxnSp>
-      <mc:AlternateContent xmlns:mc="http://schemas.openxmlformats.org/markup-compatibility/2006">
-        <mc:Choice xmlns:a14="http://schemas.microsoft.com/office/drawing/2010/main" Requires="a14">
+      <mc:AlternateContent xmlns:mc="http://schemas.openxmlformats.org/markup-compatibility/2006" xmlns:a14="http://schemas.microsoft.com/office/drawing/2010/main">
+        <mc:Choice Requires="a14">
           <p:sp>
             <p:nvSpPr>
               <p:cNvPr id="197" name="TextBox 196">
@@ -9527,6 +9071,7 @@
               </a:bodyPr>
               <a:lstStyle/>
               <a:p>
+                <a:pPr/>
                 <a14:m>
                   <m:oMathPara xmlns:m="http://schemas.openxmlformats.org/officeDocument/2006/math">
                     <m:oMathParaPr>
@@ -9566,7 +9111,7 @@
             </p:txBody>
           </p:sp>
         </mc:Choice>
-        <mc:Fallback>
+        <mc:Fallback xmlns="">
           <p:sp>
             <p:nvSpPr>
               <p:cNvPr id="197" name="TextBox 196">
@@ -9611,8 +9156,8 @@
           </p:sp>
         </mc:Fallback>
       </mc:AlternateContent>
-      <mc:AlternateContent xmlns:mc="http://schemas.openxmlformats.org/markup-compatibility/2006">
-        <mc:Choice xmlns:a14="http://schemas.microsoft.com/office/drawing/2010/main" Requires="a14">
+      <mc:AlternateContent xmlns:mc="http://schemas.openxmlformats.org/markup-compatibility/2006" xmlns:a14="http://schemas.microsoft.com/office/drawing/2010/main">
+        <mc:Choice Requires="a14">
           <p:sp>
             <p:nvSpPr>
               <p:cNvPr id="198" name="TextBox 197">
@@ -9641,6 +9186,7 @@
               </a:bodyPr>
               <a:lstStyle/>
               <a:p>
+                <a:pPr/>
                 <a14:m>
                   <m:oMathPara xmlns:m="http://schemas.openxmlformats.org/officeDocument/2006/math">
                     <m:oMathParaPr>
@@ -9680,7 +9226,7 @@
             </p:txBody>
           </p:sp>
         </mc:Choice>
-        <mc:Fallback>
+        <mc:Fallback xmlns="">
           <p:sp>
             <p:nvSpPr>
               <p:cNvPr id="198" name="TextBox 197">
@@ -9725,8 +9271,8 @@
           </p:sp>
         </mc:Fallback>
       </mc:AlternateContent>
-      <mc:AlternateContent xmlns:mc="http://schemas.openxmlformats.org/markup-compatibility/2006">
-        <mc:Choice xmlns:a14="http://schemas.microsoft.com/office/drawing/2010/main" Requires="a14">
+      <mc:AlternateContent xmlns:mc="http://schemas.openxmlformats.org/markup-compatibility/2006" xmlns:a14="http://schemas.microsoft.com/office/drawing/2010/main">
+        <mc:Choice Requires="a14">
           <p:sp>
             <p:nvSpPr>
               <p:cNvPr id="199" name="TextBox 198">
@@ -9755,6 +9301,7 @@
               </a:bodyPr>
               <a:lstStyle/>
               <a:p>
+                <a:pPr/>
                 <a14:m>
                   <m:oMathPara xmlns:m="http://schemas.openxmlformats.org/officeDocument/2006/math">
                     <m:oMathParaPr>
@@ -9794,7 +9341,7 @@
             </p:txBody>
           </p:sp>
         </mc:Choice>
-        <mc:Fallback>
+        <mc:Fallback xmlns="">
           <p:sp>
             <p:nvSpPr>
               <p:cNvPr id="199" name="TextBox 198">
@@ -9902,8 +9449,8 @@
             </a:fontRef>
           </p:style>
         </p:cxnSp>
-        <mc:AlternateContent xmlns:mc="http://schemas.openxmlformats.org/markup-compatibility/2006">
-          <mc:Choice xmlns:a14="http://schemas.microsoft.com/office/drawing/2010/main" Requires="a14">
+        <mc:AlternateContent xmlns:mc="http://schemas.openxmlformats.org/markup-compatibility/2006" xmlns:a14="http://schemas.microsoft.com/office/drawing/2010/main">
+          <mc:Choice Requires="a14">
             <p:sp>
               <p:nvSpPr>
                 <p:cNvPr id="200" name="TextBox 199">
@@ -9932,6 +9479,7 @@
                 </a:bodyPr>
                 <a:lstStyle/>
                 <a:p>
+                  <a:pPr/>
                   <a14:m>
                     <m:oMathPara xmlns:m="http://schemas.openxmlformats.org/officeDocument/2006/math">
                       <m:oMathParaPr>
@@ -9971,7 +9519,7 @@
               </p:txBody>
             </p:sp>
           </mc:Choice>
-          <mc:Fallback>
+          <mc:Fallback xmlns="">
             <p:sp>
               <p:nvSpPr>
                 <p:cNvPr id="200" name="TextBox 199">
@@ -10665,8 +10213,8 @@
             </p:txBody>
           </p:sp>
         </p:grpSp>
-        <mc:AlternateContent xmlns:mc="http://schemas.openxmlformats.org/markup-compatibility/2006">
-          <mc:Choice xmlns:a14="http://schemas.microsoft.com/office/drawing/2010/main" Requires="a14">
+        <mc:AlternateContent xmlns:mc="http://schemas.openxmlformats.org/markup-compatibility/2006" xmlns:a14="http://schemas.microsoft.com/office/drawing/2010/main">
+          <mc:Choice Requires="a14">
             <p:sp>
               <p:nvSpPr>
                 <p:cNvPr id="6" name="TextBox 5">
@@ -10722,7 +10270,7 @@
               </p:txBody>
             </p:sp>
           </mc:Choice>
-          <mc:Fallback>
+          <mc:Fallback xmlns="">
             <p:sp>
               <p:nvSpPr>
                 <p:cNvPr id="6" name="TextBox 5">
@@ -10768,8 +10316,8 @@
           </mc:Fallback>
         </mc:AlternateContent>
       </p:grpSp>
-      <mc:AlternateContent xmlns:mc="http://schemas.openxmlformats.org/markup-compatibility/2006">
-        <mc:Choice xmlns:a14="http://schemas.microsoft.com/office/drawing/2010/main" Requires="a14">
+      <mc:AlternateContent xmlns:mc="http://schemas.openxmlformats.org/markup-compatibility/2006" xmlns:a14="http://schemas.microsoft.com/office/drawing/2010/main">
+        <mc:Choice Requires="a14">
           <p:sp>
             <p:nvSpPr>
               <p:cNvPr id="12" name="Rectangle 11">
@@ -10837,7 +10385,7 @@
             </p:txBody>
           </p:sp>
         </mc:Choice>
-        <mc:Fallback>
+        <mc:Fallback xmlns="">
           <p:sp>
             <p:nvSpPr>
               <p:cNvPr id="12" name="Rectangle 11">

</xml_diff>

<commit_message>
HP updated week 11 exercsies@
</commit_message>
<xml_diff>
--- a/media/week_10/diagrams.pptx
+++ b/media/week_10/diagrams.pptx
@@ -117,7 +117,8 @@
 <file path=ppt/revisionInfo.xml><?xml version="1.0" encoding="utf-8"?>
 <p1510:revInfo xmlns:a="http://schemas.openxmlformats.org/drawingml/2006/main" xmlns:r="http://schemas.openxmlformats.org/officeDocument/2006/relationships" xmlns:p1510="http://schemas.microsoft.com/office/powerpoint/2015/10/main">
   <p1510:revLst>
-    <p1510:client id="{DA2B79C2-931E-6F45-97CE-51EECBC9C8D0}" v="43" dt="2025-11-25T22:44:02.682"/>
+    <p1510:client id="{248D8C8A-D969-FF47-8750-E2D7FB7C4E9E}" v="164" dt="2025-11-21T11:36:54.126"/>
+    <p1510:client id="{DA2B79C2-931E-6F45-97CE-51EECBC9C8D0}" v="3" dt="2025-11-20T16:48:46.294"/>
   </p1510:revLst>
 </p1510:revInfo>
 </file>
@@ -127,25 +128,10 @@
   <pc:docChgLst>
     <pc:chgData name="Hemma Philamore" userId="db50e2f3-17b2-4cc0-b719-fb6254d3e9df" providerId="ADAL" clId="{B5D85944-D90A-5912-90C6-4C26E424D3D6}"/>
     <pc:docChg chg="addSld modSld">
-      <pc:chgData name="Hemma Philamore" userId="db50e2f3-17b2-4cc0-b719-fb6254d3e9df" providerId="ADAL" clId="{B5D85944-D90A-5912-90C6-4C26E424D3D6}" dt="2025-11-25T22:44:09.476" v="48" actId="1076"/>
+      <pc:chgData name="Hemma Philamore" userId="db50e2f3-17b2-4cc0-b719-fb6254d3e9df" providerId="ADAL" clId="{B5D85944-D90A-5912-90C6-4C26E424D3D6}" dt="2025-11-20T16:48:46.294" v="6" actId="1076"/>
       <pc:docMkLst>
         <pc:docMk/>
       </pc:docMkLst>
-      <pc:sldChg chg="modSp mod">
-        <pc:chgData name="Hemma Philamore" userId="db50e2f3-17b2-4cc0-b719-fb6254d3e9df" providerId="ADAL" clId="{B5D85944-D90A-5912-90C6-4C26E424D3D6}" dt="2025-11-25T22:44:09.476" v="48" actId="1076"/>
-        <pc:sldMkLst>
-          <pc:docMk/>
-          <pc:sldMk cId="2055881703" sldId="256"/>
-        </pc:sldMkLst>
-        <pc:spChg chg="mod">
-          <ac:chgData name="Hemma Philamore" userId="db50e2f3-17b2-4cc0-b719-fb6254d3e9df" providerId="ADAL" clId="{B5D85944-D90A-5912-90C6-4C26E424D3D6}" dt="2025-11-25T22:44:09.476" v="48" actId="1076"/>
-          <ac:spMkLst>
-            <pc:docMk/>
-            <pc:sldMk cId="2055881703" sldId="256"/>
-            <ac:spMk id="54" creationId="{796BBBEF-DDD2-260A-6642-AAF99653D558}"/>
-          </ac:spMkLst>
-        </pc:spChg>
-      </pc:sldChg>
       <pc:sldChg chg="addSp modSp new mod">
         <pc:chgData name="Hemma Philamore" userId="db50e2f3-17b2-4cc0-b719-fb6254d3e9df" providerId="ADAL" clId="{B5D85944-D90A-5912-90C6-4C26E424D3D6}" dt="2025-11-20T16:48:46.294" v="6" actId="1076"/>
         <pc:sldMkLst>
@@ -248,12 +234,60 @@
           <pc:docMk/>
           <pc:sldMk cId="2055881703" sldId="256"/>
         </pc:sldMkLst>
+        <pc:spChg chg="del">
+          <ac:chgData name="Hemma Philamore" userId="db50e2f3-17b2-4cc0-b719-fb6254d3e9df" providerId="ADAL" clId="{35C0B9A2-A60C-57EC-AD9B-630767BE11FE}" dt="2025-11-20T10:26:04.869" v="0" actId="478"/>
+          <ac:spMkLst>
+            <pc:docMk/>
+            <pc:sldMk cId="2055881703" sldId="256"/>
+            <ac:spMk id="5" creationId="{F8629915-D6D6-B1D7-CEFA-E538E4097312}"/>
+          </ac:spMkLst>
+        </pc:spChg>
+        <pc:spChg chg="add del">
+          <ac:chgData name="Hemma Philamore" userId="db50e2f3-17b2-4cc0-b719-fb6254d3e9df" providerId="ADAL" clId="{35C0B9A2-A60C-57EC-AD9B-630767BE11FE}" dt="2025-11-20T10:27:04.363" v="2" actId="478"/>
+          <ac:spMkLst>
+            <pc:docMk/>
+            <pc:sldMk cId="2055881703" sldId="256"/>
+            <ac:spMk id="7" creationId="{BADCA2C8-5DF9-63F1-CC28-EDCE4F6AE01C}"/>
+          </ac:spMkLst>
+        </pc:spChg>
         <pc:spChg chg="add mod">
           <ac:chgData name="Hemma Philamore" userId="db50e2f3-17b2-4cc0-b719-fb6254d3e9df" providerId="ADAL" clId="{35C0B9A2-A60C-57EC-AD9B-630767BE11FE}" dt="2025-11-20T11:15:26.553" v="734" actId="1076"/>
           <ac:spMkLst>
             <pc:docMk/>
             <pc:sldMk cId="2055881703" sldId="256"/>
             <ac:spMk id="10" creationId="{60E0CE97-DD2D-18CC-926E-6ADE97B57EC4}"/>
+          </ac:spMkLst>
+        </pc:spChg>
+        <pc:spChg chg="add del mod">
+          <ac:chgData name="Hemma Philamore" userId="db50e2f3-17b2-4cc0-b719-fb6254d3e9df" providerId="ADAL" clId="{35C0B9A2-A60C-57EC-AD9B-630767BE11FE}" dt="2025-11-20T10:35:15.461" v="88" actId="478"/>
+          <ac:spMkLst>
+            <pc:docMk/>
+            <pc:sldMk cId="2055881703" sldId="256"/>
+            <ac:spMk id="19" creationId="{ED7B6730-1CF2-937D-1A37-E2C449C10159}"/>
+          </ac:spMkLst>
+        </pc:spChg>
+        <pc:spChg chg="add del mod">
+          <ac:chgData name="Hemma Philamore" userId="db50e2f3-17b2-4cc0-b719-fb6254d3e9df" providerId="ADAL" clId="{35C0B9A2-A60C-57EC-AD9B-630767BE11FE}" dt="2025-11-20T10:40:14.519" v="139" actId="478"/>
+          <ac:spMkLst>
+            <pc:docMk/>
+            <pc:sldMk cId="2055881703" sldId="256"/>
+            <ac:spMk id="32" creationId="{A56F32D9-CEE9-06EA-BF9E-5E0E6FC24560}"/>
+          </ac:spMkLst>
+        </pc:spChg>
+        <pc:spChg chg="add del mod">
+          <ac:chgData name="Hemma Philamore" userId="db50e2f3-17b2-4cc0-b719-fb6254d3e9df" providerId="ADAL" clId="{35C0B9A2-A60C-57EC-AD9B-630767BE11FE}" dt="2025-11-20T10:37:53.542" v="118" actId="478"/>
+          <ac:spMkLst>
+            <pc:docMk/>
+            <pc:sldMk cId="2055881703" sldId="256"/>
+            <ac:spMk id="33" creationId="{9F1F3278-4FE4-80F5-97B1-811A551642A7}"/>
+          </ac:spMkLst>
+        </pc:spChg>
+        <pc:spChg chg="add del mod">
+          <ac:chgData name="Hemma Philamore" userId="db50e2f3-17b2-4cc0-b719-fb6254d3e9df" providerId="ADAL" clId="{35C0B9A2-A60C-57EC-AD9B-630767BE11FE}" dt="2025-11-20T10:40:13.372" v="138" actId="478"/>
+          <ac:spMkLst>
+            <pc:docMk/>
+            <pc:sldMk cId="2055881703" sldId="256"/>
+            <ac:spMk id="34" creationId="{F26B2745-6F0A-4A60-F9F4-C8DA3214BA25}"/>
           </ac:spMkLst>
         </pc:spChg>
         <pc:spChg chg="add mod">
@@ -304,6 +338,54 @@
             <ac:spMk id="54" creationId="{796BBBEF-DDD2-260A-6642-AAF99653D558}"/>
           </ac:spMkLst>
         </pc:spChg>
+        <pc:spChg chg="add del mod">
+          <ac:chgData name="Hemma Philamore" userId="db50e2f3-17b2-4cc0-b719-fb6254d3e9df" providerId="ADAL" clId="{35C0B9A2-A60C-57EC-AD9B-630767BE11FE}" dt="2025-11-20T10:49:50.120" v="446" actId="478"/>
+          <ac:spMkLst>
+            <pc:docMk/>
+            <pc:sldMk cId="2055881703" sldId="256"/>
+            <ac:spMk id="59" creationId="{7B29DEB3-6BC0-295F-F79F-AF8FBADBFFAB}"/>
+          </ac:spMkLst>
+        </pc:spChg>
+        <pc:spChg chg="add del mod">
+          <ac:chgData name="Hemma Philamore" userId="db50e2f3-17b2-4cc0-b719-fb6254d3e9df" providerId="ADAL" clId="{35C0B9A2-A60C-57EC-AD9B-630767BE11FE}" dt="2025-11-20T10:49:49.416" v="445" actId="478"/>
+          <ac:spMkLst>
+            <pc:docMk/>
+            <pc:sldMk cId="2055881703" sldId="256"/>
+            <ac:spMk id="60" creationId="{214D6DF2-6F54-FF7B-999F-A819EE36B124}"/>
+          </ac:spMkLst>
+        </pc:spChg>
+        <pc:spChg chg="add del mod">
+          <ac:chgData name="Hemma Philamore" userId="db50e2f3-17b2-4cc0-b719-fb6254d3e9df" providerId="ADAL" clId="{35C0B9A2-A60C-57EC-AD9B-630767BE11FE}" dt="2025-11-20T10:49:51.719" v="447" actId="478"/>
+          <ac:spMkLst>
+            <pc:docMk/>
+            <pc:sldMk cId="2055881703" sldId="256"/>
+            <ac:spMk id="61" creationId="{A3F822CF-0641-5B18-CAC7-5F4A8EEE6F0A}"/>
+          </ac:spMkLst>
+        </pc:spChg>
+        <pc:spChg chg="add del mod">
+          <ac:chgData name="Hemma Philamore" userId="db50e2f3-17b2-4cc0-b719-fb6254d3e9df" providerId="ADAL" clId="{35C0B9A2-A60C-57EC-AD9B-630767BE11FE}" dt="2025-11-20T10:50:17.122" v="455" actId="478"/>
+          <ac:spMkLst>
+            <pc:docMk/>
+            <pc:sldMk cId="2055881703" sldId="256"/>
+            <ac:spMk id="62" creationId="{8CDB7EC2-7383-9640-E965-EF8F9C1A993B}"/>
+          </ac:spMkLst>
+        </pc:spChg>
+        <pc:spChg chg="add del mod">
+          <ac:chgData name="Hemma Philamore" userId="db50e2f3-17b2-4cc0-b719-fb6254d3e9df" providerId="ADAL" clId="{35C0B9A2-A60C-57EC-AD9B-630767BE11FE}" dt="2025-11-20T10:50:12.362" v="451" actId="478"/>
+          <ac:spMkLst>
+            <pc:docMk/>
+            <pc:sldMk cId="2055881703" sldId="256"/>
+            <ac:spMk id="63" creationId="{B20C2DD7-AF40-70F6-F089-44C867C98942}"/>
+          </ac:spMkLst>
+        </pc:spChg>
+        <pc:spChg chg="add del mod">
+          <ac:chgData name="Hemma Philamore" userId="db50e2f3-17b2-4cc0-b719-fb6254d3e9df" providerId="ADAL" clId="{35C0B9A2-A60C-57EC-AD9B-630767BE11FE}" dt="2025-11-20T10:50:14.346" v="453" actId="478"/>
+          <ac:spMkLst>
+            <pc:docMk/>
+            <pc:sldMk cId="2055881703" sldId="256"/>
+            <ac:spMk id="65" creationId="{D3994704-9A75-6DF3-4121-992953C1AB1E}"/>
+          </ac:spMkLst>
+        </pc:spChg>
         <pc:spChg chg="add mod topLvl">
           <ac:chgData name="Hemma Philamore" userId="db50e2f3-17b2-4cc0-b719-fb6254d3e9df" providerId="ADAL" clId="{35C0B9A2-A60C-57EC-AD9B-630767BE11FE}" dt="2025-11-20T10:55:22.304" v="528" actId="164"/>
           <ac:spMkLst>
@@ -320,12 +402,84 @@
             <ac:spMk id="82" creationId="{755524AC-2D41-9852-186E-7B8DD8F65B97}"/>
           </ac:spMkLst>
         </pc:spChg>
+        <pc:spChg chg="add del mod topLvl">
+          <ac:chgData name="Hemma Philamore" userId="db50e2f3-17b2-4cc0-b719-fb6254d3e9df" providerId="ADAL" clId="{35C0B9A2-A60C-57EC-AD9B-630767BE11FE}" dt="2025-11-20T10:53:19.551" v="492" actId="478"/>
+          <ac:spMkLst>
+            <pc:docMk/>
+            <pc:sldMk cId="2055881703" sldId="256"/>
+            <ac:spMk id="83" creationId="{1546B056-62D2-64AD-258E-AD4237EF2920}"/>
+          </ac:spMkLst>
+        </pc:spChg>
         <pc:spChg chg="add mod topLvl">
           <ac:chgData name="Hemma Philamore" userId="db50e2f3-17b2-4cc0-b719-fb6254d3e9df" providerId="ADAL" clId="{35C0B9A2-A60C-57EC-AD9B-630767BE11FE}" dt="2025-11-20T10:55:22.304" v="528" actId="164"/>
           <ac:spMkLst>
             <pc:docMk/>
             <pc:sldMk cId="2055881703" sldId="256"/>
             <ac:spMk id="84" creationId="{5B6DD94F-1C69-5F0D-6BE3-AABE90845ED3}"/>
+          </ac:spMkLst>
+        </pc:spChg>
+        <pc:spChg chg="mod">
+          <ac:chgData name="Hemma Philamore" userId="db50e2f3-17b2-4cc0-b719-fb6254d3e9df" providerId="ADAL" clId="{35C0B9A2-A60C-57EC-AD9B-630767BE11FE}" dt="2025-11-20T10:51:52.878" v="474"/>
+          <ac:spMkLst>
+            <pc:docMk/>
+            <pc:sldMk cId="2055881703" sldId="256"/>
+            <ac:spMk id="88" creationId="{8CFEF838-639E-477E-0312-FA50C6E4C494}"/>
+          </ac:spMkLst>
+        </pc:spChg>
+        <pc:spChg chg="mod">
+          <ac:chgData name="Hemma Philamore" userId="db50e2f3-17b2-4cc0-b719-fb6254d3e9df" providerId="ADAL" clId="{35C0B9A2-A60C-57EC-AD9B-630767BE11FE}" dt="2025-11-20T10:51:52.878" v="474"/>
+          <ac:spMkLst>
+            <pc:docMk/>
+            <pc:sldMk cId="2055881703" sldId="256"/>
+            <ac:spMk id="89" creationId="{AE78285C-C1B2-3583-AA2F-481754D8D46C}"/>
+          </ac:spMkLst>
+        </pc:spChg>
+        <pc:spChg chg="mod">
+          <ac:chgData name="Hemma Philamore" userId="db50e2f3-17b2-4cc0-b719-fb6254d3e9df" providerId="ADAL" clId="{35C0B9A2-A60C-57EC-AD9B-630767BE11FE}" dt="2025-11-20T10:51:52.878" v="474"/>
+          <ac:spMkLst>
+            <pc:docMk/>
+            <pc:sldMk cId="2055881703" sldId="256"/>
+            <ac:spMk id="90" creationId="{3D93C3D0-3F4F-25A3-BA81-6380BA22FCEA}"/>
+          </ac:spMkLst>
+        </pc:spChg>
+        <pc:spChg chg="mod">
+          <ac:chgData name="Hemma Philamore" userId="db50e2f3-17b2-4cc0-b719-fb6254d3e9df" providerId="ADAL" clId="{35C0B9A2-A60C-57EC-AD9B-630767BE11FE}" dt="2025-11-20T10:51:52.878" v="474"/>
+          <ac:spMkLst>
+            <pc:docMk/>
+            <pc:sldMk cId="2055881703" sldId="256"/>
+            <ac:spMk id="91" creationId="{B3DF2B72-1C1C-03A4-C3F8-F2428E39D3C3}"/>
+          </ac:spMkLst>
+        </pc:spChg>
+        <pc:spChg chg="mod">
+          <ac:chgData name="Hemma Philamore" userId="db50e2f3-17b2-4cc0-b719-fb6254d3e9df" providerId="ADAL" clId="{35C0B9A2-A60C-57EC-AD9B-630767BE11FE}" dt="2025-11-20T10:51:56.513" v="476"/>
+          <ac:spMkLst>
+            <pc:docMk/>
+            <pc:sldMk cId="2055881703" sldId="256"/>
+            <ac:spMk id="96" creationId="{1F80B664-7C59-47F3-B801-603E04B68F82}"/>
+          </ac:spMkLst>
+        </pc:spChg>
+        <pc:spChg chg="mod">
+          <ac:chgData name="Hemma Philamore" userId="db50e2f3-17b2-4cc0-b719-fb6254d3e9df" providerId="ADAL" clId="{35C0B9A2-A60C-57EC-AD9B-630767BE11FE}" dt="2025-11-20T10:51:56.513" v="476"/>
+          <ac:spMkLst>
+            <pc:docMk/>
+            <pc:sldMk cId="2055881703" sldId="256"/>
+            <ac:spMk id="97" creationId="{0C9355C3-A9D3-DE89-09CA-96B3E29F699C}"/>
+          </ac:spMkLst>
+        </pc:spChg>
+        <pc:spChg chg="mod">
+          <ac:chgData name="Hemma Philamore" userId="db50e2f3-17b2-4cc0-b719-fb6254d3e9df" providerId="ADAL" clId="{35C0B9A2-A60C-57EC-AD9B-630767BE11FE}" dt="2025-11-20T10:51:56.513" v="476"/>
+          <ac:spMkLst>
+            <pc:docMk/>
+            <pc:sldMk cId="2055881703" sldId="256"/>
+            <ac:spMk id="98" creationId="{C6C4BA6A-3B7A-B9F3-FF9D-838453F9554C}"/>
+          </ac:spMkLst>
+        </pc:spChg>
+        <pc:spChg chg="mod">
+          <ac:chgData name="Hemma Philamore" userId="db50e2f3-17b2-4cc0-b719-fb6254d3e9df" providerId="ADAL" clId="{35C0B9A2-A60C-57EC-AD9B-630767BE11FE}" dt="2025-11-20T10:51:56.513" v="476"/>
+          <ac:spMkLst>
+            <pc:docMk/>
+            <pc:sldMk cId="2055881703" sldId="256"/>
+            <ac:spMk id="99" creationId="{CF2DFED7-8EE0-3461-BD32-DB45CDBC762C}"/>
           </ac:spMkLst>
         </pc:spChg>
         <pc:spChg chg="add mod">
@@ -344,6 +498,14 @@
             <ac:spMk id="106" creationId="{5A82E9F3-14D7-1A03-66CB-2293CA26106B}"/>
           </ac:spMkLst>
         </pc:spChg>
+        <pc:spChg chg="add del mod">
+          <ac:chgData name="Hemma Philamore" userId="db50e2f3-17b2-4cc0-b719-fb6254d3e9df" providerId="ADAL" clId="{35C0B9A2-A60C-57EC-AD9B-630767BE11FE}" dt="2025-11-20T10:54:46.247" v="517" actId="478"/>
+          <ac:spMkLst>
+            <pc:docMk/>
+            <pc:sldMk cId="2055881703" sldId="256"/>
+            <ac:spMk id="107" creationId="{3FA29D11-8964-5D5A-9D38-712F9DD33802}"/>
+          </ac:spMkLst>
+        </pc:spChg>
         <pc:spChg chg="add mod">
           <ac:chgData name="Hemma Philamore" userId="db50e2f3-17b2-4cc0-b719-fb6254d3e9df" providerId="ADAL" clId="{35C0B9A2-A60C-57EC-AD9B-630767BE11FE}" dt="2025-11-20T10:55:27.716" v="530" actId="164"/>
           <ac:spMkLst>
@@ -480,6 +642,14 @@
             <ac:spMk id="149" creationId="{18B7952A-65FE-3155-F900-858FFFE37391}"/>
           </ac:spMkLst>
         </pc:spChg>
+        <pc:spChg chg="add del mod">
+          <ac:chgData name="Hemma Philamore" userId="db50e2f3-17b2-4cc0-b719-fb6254d3e9df" providerId="ADAL" clId="{35C0B9A2-A60C-57EC-AD9B-630767BE11FE}" dt="2025-11-20T11:02:18.962" v="649" actId="478"/>
+          <ac:spMkLst>
+            <pc:docMk/>
+            <pc:sldMk cId="2055881703" sldId="256"/>
+            <ac:spMk id="157" creationId="{97C76C4D-8030-ED8D-EB39-B85D69263710}"/>
+          </ac:spMkLst>
+        </pc:spChg>
         <pc:spChg chg="add mod">
           <ac:chgData name="Hemma Philamore" userId="db50e2f3-17b2-4cc0-b719-fb6254d3e9df" providerId="ADAL" clId="{35C0B9A2-A60C-57EC-AD9B-630767BE11FE}" dt="2025-11-20T11:16:27.970" v="766" actId="1076"/>
           <ac:spMkLst>
@@ -768,6 +938,86 @@
             <ac:grpSpMk id="68" creationId="{EEA1CA30-B8FB-FE68-CEE3-E7126C2431BD}"/>
           </ac:grpSpMkLst>
         </pc:grpChg>
+        <pc:grpChg chg="add del mod">
+          <ac:chgData name="Hemma Philamore" userId="db50e2f3-17b2-4cc0-b719-fb6254d3e9df" providerId="ADAL" clId="{35C0B9A2-A60C-57EC-AD9B-630767BE11FE}" dt="2025-11-20T10:58:21.410" v="587" actId="478"/>
+          <ac:grpSpMkLst>
+            <pc:docMk/>
+            <pc:sldMk cId="2055881703" sldId="256"/>
+            <ac:grpSpMk id="69" creationId="{286E84BA-A5E6-613E-BD0D-03237C6EF9A7}"/>
+          </ac:grpSpMkLst>
+        </pc:grpChg>
+        <pc:grpChg chg="add del mod">
+          <ac:chgData name="Hemma Philamore" userId="db50e2f3-17b2-4cc0-b719-fb6254d3e9df" providerId="ADAL" clId="{35C0B9A2-A60C-57EC-AD9B-630767BE11FE}" dt="2025-11-20T10:58:20.746" v="586" actId="478"/>
+          <ac:grpSpMkLst>
+            <pc:docMk/>
+            <pc:sldMk cId="2055881703" sldId="256"/>
+            <ac:grpSpMk id="72" creationId="{4A481B30-4E74-8CC6-C04A-E79707CC7FD8}"/>
+          </ac:grpSpMkLst>
+        </pc:grpChg>
+        <pc:grpChg chg="add del mod">
+          <ac:chgData name="Hemma Philamore" userId="db50e2f3-17b2-4cc0-b719-fb6254d3e9df" providerId="ADAL" clId="{35C0B9A2-A60C-57EC-AD9B-630767BE11FE}" dt="2025-11-20T10:58:20.085" v="585" actId="478"/>
+          <ac:grpSpMkLst>
+            <pc:docMk/>
+            <pc:sldMk cId="2055881703" sldId="256"/>
+            <ac:grpSpMk id="75" creationId="{FBD83005-F293-05C5-FE6F-0CDCE92F8155}"/>
+          </ac:grpSpMkLst>
+        </pc:grpChg>
+        <pc:grpChg chg="add del mod topLvl">
+          <ac:chgData name="Hemma Philamore" userId="db50e2f3-17b2-4cc0-b719-fb6254d3e9df" providerId="ADAL" clId="{35C0B9A2-A60C-57EC-AD9B-630767BE11FE}" dt="2025-11-20T10:53:30.730" v="494" actId="165"/>
+          <ac:grpSpMkLst>
+            <pc:docMk/>
+            <pc:sldMk cId="2055881703" sldId="256"/>
+            <ac:grpSpMk id="78" creationId="{FAC83208-ED5B-FAE7-F87D-8B3181C445D7}"/>
+          </ac:grpSpMkLst>
+        </pc:grpChg>
+        <pc:grpChg chg="add del mod">
+          <ac:chgData name="Hemma Philamore" userId="db50e2f3-17b2-4cc0-b719-fb6254d3e9df" providerId="ADAL" clId="{35C0B9A2-A60C-57EC-AD9B-630767BE11FE}" dt="2025-11-20T10:52:07.209" v="478" actId="165"/>
+          <ac:grpSpMkLst>
+            <pc:docMk/>
+            <pc:sldMk cId="2055881703" sldId="256"/>
+            <ac:grpSpMk id="85" creationId="{5E46178F-8ED9-52FF-3BF2-01C9CE60A2C0}"/>
+          </ac:grpSpMkLst>
+        </pc:grpChg>
+        <pc:grpChg chg="add del mod">
+          <ac:chgData name="Hemma Philamore" userId="db50e2f3-17b2-4cc0-b719-fb6254d3e9df" providerId="ADAL" clId="{35C0B9A2-A60C-57EC-AD9B-630767BE11FE}" dt="2025-11-20T10:53:00.763" v="488" actId="478"/>
+          <ac:grpSpMkLst>
+            <pc:docMk/>
+            <pc:sldMk cId="2055881703" sldId="256"/>
+            <ac:grpSpMk id="86" creationId="{1A19B633-8089-8BAF-8DFD-E88F06FC9CE1}"/>
+          </ac:grpSpMkLst>
+        </pc:grpChg>
+        <pc:grpChg chg="mod">
+          <ac:chgData name="Hemma Philamore" userId="db50e2f3-17b2-4cc0-b719-fb6254d3e9df" providerId="ADAL" clId="{35C0B9A2-A60C-57EC-AD9B-630767BE11FE}" dt="2025-11-20T10:51:52.878" v="474"/>
+          <ac:grpSpMkLst>
+            <pc:docMk/>
+            <pc:sldMk cId="2055881703" sldId="256"/>
+            <ac:grpSpMk id="87" creationId="{F5F74216-9E26-B9FB-0994-658FC4B22973}"/>
+          </ac:grpSpMkLst>
+        </pc:grpChg>
+        <pc:grpChg chg="add del mod">
+          <ac:chgData name="Hemma Philamore" userId="db50e2f3-17b2-4cc0-b719-fb6254d3e9df" providerId="ADAL" clId="{35C0B9A2-A60C-57EC-AD9B-630767BE11FE}" dt="2025-11-20T10:53:01.997" v="489" actId="478"/>
+          <ac:grpSpMkLst>
+            <pc:docMk/>
+            <pc:sldMk cId="2055881703" sldId="256"/>
+            <ac:grpSpMk id="94" creationId="{690FEAAF-B471-2F8A-D99C-3165CD93A3B9}"/>
+          </ac:grpSpMkLst>
+        </pc:grpChg>
+        <pc:grpChg chg="mod">
+          <ac:chgData name="Hemma Philamore" userId="db50e2f3-17b2-4cc0-b719-fb6254d3e9df" providerId="ADAL" clId="{35C0B9A2-A60C-57EC-AD9B-630767BE11FE}" dt="2025-11-20T10:51:56.513" v="476"/>
+          <ac:grpSpMkLst>
+            <pc:docMk/>
+            <pc:sldMk cId="2055881703" sldId="256"/>
+            <ac:grpSpMk id="95" creationId="{57C0CEF4-2358-BAF0-0D7E-72FC7B81BB2C}"/>
+          </ac:grpSpMkLst>
+        </pc:grpChg>
+        <pc:grpChg chg="add del mod">
+          <ac:chgData name="Hemma Philamore" userId="db50e2f3-17b2-4cc0-b719-fb6254d3e9df" providerId="ADAL" clId="{35C0B9A2-A60C-57EC-AD9B-630767BE11FE}" dt="2025-11-20T10:54:44.407" v="515" actId="478"/>
+          <ac:grpSpMkLst>
+            <pc:docMk/>
+            <pc:sldMk cId="2055881703" sldId="256"/>
+            <ac:grpSpMk id="102" creationId="{ECAD2C37-9BF9-7EF4-C860-77E79437D0D2}"/>
+          </ac:grpSpMkLst>
+        </pc:grpChg>
         <pc:grpChg chg="add mod">
           <ac:chgData name="Hemma Philamore" userId="db50e2f3-17b2-4cc0-b719-fb6254d3e9df" providerId="ADAL" clId="{35C0B9A2-A60C-57EC-AD9B-630767BE11FE}" dt="2025-11-20T10:55:33.903" v="532" actId="1076"/>
           <ac:grpSpMkLst>
@@ -808,6 +1058,14 @@
             <ac:grpSpMk id="191" creationId="{D0DB04B9-3774-E353-ED89-26BC7CB0789D}"/>
           </ac:grpSpMkLst>
         </pc:grpChg>
+        <pc:grpChg chg="add del mod">
+          <ac:chgData name="Hemma Philamore" userId="db50e2f3-17b2-4cc0-b719-fb6254d3e9df" providerId="ADAL" clId="{35C0B9A2-A60C-57EC-AD9B-630767BE11FE}" dt="2025-11-20T11:16:40.250" v="769" actId="165"/>
+          <ac:grpSpMkLst>
+            <pc:docMk/>
+            <pc:sldMk cId="2055881703" sldId="256"/>
+            <ac:grpSpMk id="194" creationId="{08414F98-E93D-6B1D-227C-BB56A9372591}"/>
+          </ac:grpSpMkLst>
+        </pc:grpChg>
         <pc:grpChg chg="add mod">
           <ac:chgData name="Hemma Philamore" userId="db50e2f3-17b2-4cc0-b719-fb6254d3e9df" providerId="ADAL" clId="{35C0B9A2-A60C-57EC-AD9B-630767BE11FE}" dt="2025-11-20T11:17:02.099" v="777" actId="1076"/>
           <ac:grpSpMkLst>
@@ -832,6 +1090,54 @@
             <ac:picMk id="11" creationId="{7108C697-452B-18F4-0A68-07969A8A41FE}"/>
           </ac:picMkLst>
         </pc:picChg>
+        <pc:picChg chg="add del mod">
+          <ac:chgData name="Hemma Philamore" userId="db50e2f3-17b2-4cc0-b719-fb6254d3e9df" providerId="ADAL" clId="{35C0B9A2-A60C-57EC-AD9B-630767BE11FE}" dt="2025-11-20T10:50:09.866" v="450" actId="478"/>
+          <ac:picMkLst>
+            <pc:docMk/>
+            <pc:sldMk cId="2055881703" sldId="256"/>
+            <ac:picMk id="55" creationId="{413CCF69-B9B8-C3FA-200C-D95B7756D02B}"/>
+          </ac:picMkLst>
+        </pc:picChg>
+        <pc:cxnChg chg="add del mod">
+          <ac:chgData name="Hemma Philamore" userId="db50e2f3-17b2-4cc0-b719-fb6254d3e9df" providerId="ADAL" clId="{35C0B9A2-A60C-57EC-AD9B-630767BE11FE}" dt="2025-11-20T10:32:26.080" v="42" actId="478"/>
+          <ac:cxnSpMkLst>
+            <pc:docMk/>
+            <pc:sldMk cId="2055881703" sldId="256"/>
+            <ac:cxnSpMk id="13" creationId="{D7B36D1E-88A7-1052-C3DA-CA876832D45F}"/>
+          </ac:cxnSpMkLst>
+        </pc:cxnChg>
+        <pc:cxnChg chg="add del mod">
+          <ac:chgData name="Hemma Philamore" userId="db50e2f3-17b2-4cc0-b719-fb6254d3e9df" providerId="ADAL" clId="{35C0B9A2-A60C-57EC-AD9B-630767BE11FE}" dt="2025-11-20T10:32:27.756" v="44" actId="478"/>
+          <ac:cxnSpMkLst>
+            <pc:docMk/>
+            <pc:sldMk cId="2055881703" sldId="256"/>
+            <ac:cxnSpMk id="14" creationId="{7F2EB04A-A2A2-2C56-4E1B-209E62310FC2}"/>
+          </ac:cxnSpMkLst>
+        </pc:cxnChg>
+        <pc:cxnChg chg="add del mod">
+          <ac:chgData name="Hemma Philamore" userId="db50e2f3-17b2-4cc0-b719-fb6254d3e9df" providerId="ADAL" clId="{35C0B9A2-A60C-57EC-AD9B-630767BE11FE}" dt="2025-11-20T10:32:27.292" v="43" actId="478"/>
+          <ac:cxnSpMkLst>
+            <pc:docMk/>
+            <pc:sldMk cId="2055881703" sldId="256"/>
+            <ac:cxnSpMk id="16" creationId="{54D5B968-0515-EF49-B44A-A4257084ECC6}"/>
+          </ac:cxnSpMkLst>
+        </pc:cxnChg>
+        <pc:cxnChg chg="add del mod">
+          <ac:chgData name="Hemma Philamore" userId="db50e2f3-17b2-4cc0-b719-fb6254d3e9df" providerId="ADAL" clId="{35C0B9A2-A60C-57EC-AD9B-630767BE11FE}" dt="2025-11-20T10:34:13.541" v="71" actId="11529"/>
+          <ac:cxnSpMkLst>
+            <pc:docMk/>
+            <pc:sldMk cId="2055881703" sldId="256"/>
+            <ac:cxnSpMk id="21" creationId="{89A109B6-264C-60DE-D49A-BDEA50CEBE4F}"/>
+          </ac:cxnSpMkLst>
+        </pc:cxnChg>
+        <pc:cxnChg chg="add del mod">
+          <ac:chgData name="Hemma Philamore" userId="db50e2f3-17b2-4cc0-b719-fb6254d3e9df" providerId="ADAL" clId="{35C0B9A2-A60C-57EC-AD9B-630767BE11FE}" dt="2025-11-20T10:34:13.157" v="70" actId="11529"/>
+          <ac:cxnSpMkLst>
+            <pc:docMk/>
+            <pc:sldMk cId="2055881703" sldId="256"/>
+            <ac:cxnSpMk id="23" creationId="{999AB47E-2DFE-086B-77A8-029749C5052C}"/>
+          </ac:cxnSpMkLst>
+        </pc:cxnChg>
         <pc:cxnChg chg="add mod">
           <ac:chgData name="Hemma Philamore" userId="db50e2f3-17b2-4cc0-b719-fb6254d3e9df" providerId="ADAL" clId="{35C0B9A2-A60C-57EC-AD9B-630767BE11FE}" dt="2025-11-20T11:15:26.553" v="734" actId="1076"/>
           <ac:cxnSpMkLst>
@@ -856,6 +1162,22 @@
             <ac:cxnSpMk id="29" creationId="{CB206A3C-028A-6A69-9951-0FB7A3B526DB}"/>
           </ac:cxnSpMkLst>
         </pc:cxnChg>
+        <pc:cxnChg chg="add del mod">
+          <ac:chgData name="Hemma Philamore" userId="db50e2f3-17b2-4cc0-b719-fb6254d3e9df" providerId="ADAL" clId="{35C0B9A2-A60C-57EC-AD9B-630767BE11FE}" dt="2025-11-20T10:46:57.730" v="380" actId="478"/>
+          <ac:cxnSpMkLst>
+            <pc:docMk/>
+            <pc:sldMk cId="2055881703" sldId="256"/>
+            <ac:cxnSpMk id="41" creationId="{EB801AB0-4215-78D6-37C9-F159A67B1AFC}"/>
+          </ac:cxnSpMkLst>
+        </pc:cxnChg>
+        <pc:cxnChg chg="add del mod">
+          <ac:chgData name="Hemma Philamore" userId="db50e2f3-17b2-4cc0-b719-fb6254d3e9df" providerId="ADAL" clId="{35C0B9A2-A60C-57EC-AD9B-630767BE11FE}" dt="2025-11-20T10:46:59.472" v="381" actId="478"/>
+          <ac:cxnSpMkLst>
+            <pc:docMk/>
+            <pc:sldMk cId="2055881703" sldId="256"/>
+            <ac:cxnSpMk id="44" creationId="{577EF17E-8A13-6DC9-6FC5-BF9E766B2D66}"/>
+          </ac:cxnSpMkLst>
+        </pc:cxnChg>
         <pc:cxnChg chg="add mod">
           <ac:chgData name="Hemma Philamore" userId="db50e2f3-17b2-4cc0-b719-fb6254d3e9df" providerId="ADAL" clId="{35C0B9A2-A60C-57EC-AD9B-630767BE11FE}" dt="2025-11-20T10:48:13.639" v="406" actId="692"/>
           <ac:cxnSpMkLst>
@@ -872,12 +1194,84 @@
             <ac:cxnSpMk id="56" creationId="{366D8118-2718-AAA8-38A7-83275575D318}"/>
           </ac:cxnSpMkLst>
         </pc:cxnChg>
+        <pc:cxnChg chg="add del mod">
+          <ac:chgData name="Hemma Philamore" userId="db50e2f3-17b2-4cc0-b719-fb6254d3e9df" providerId="ADAL" clId="{35C0B9A2-A60C-57EC-AD9B-630767BE11FE}" dt="2025-11-20T10:49:48.348" v="444" actId="478"/>
+          <ac:cxnSpMkLst>
+            <pc:docMk/>
+            <pc:sldMk cId="2055881703" sldId="256"/>
+            <ac:cxnSpMk id="57" creationId="{D30B195A-439B-956F-54BF-9C2087DF5A26}"/>
+          </ac:cxnSpMkLst>
+        </pc:cxnChg>
+        <pc:cxnChg chg="add del mod">
+          <ac:chgData name="Hemma Philamore" userId="db50e2f3-17b2-4cc0-b719-fb6254d3e9df" providerId="ADAL" clId="{35C0B9A2-A60C-57EC-AD9B-630767BE11FE}" dt="2025-11-20T10:49:47.319" v="443" actId="478"/>
+          <ac:cxnSpMkLst>
+            <pc:docMk/>
+            <pc:sldMk cId="2055881703" sldId="256"/>
+            <ac:cxnSpMk id="58" creationId="{24627312-FBF2-A73B-ED3C-7FA68DB17433}"/>
+          </ac:cxnSpMkLst>
+        </pc:cxnChg>
+        <pc:cxnChg chg="del">
+          <ac:chgData name="Hemma Philamore" userId="db50e2f3-17b2-4cc0-b719-fb6254d3e9df" providerId="ADAL" clId="{35C0B9A2-A60C-57EC-AD9B-630767BE11FE}" dt="2025-11-20T10:50:15.481" v="454" actId="478"/>
+          <ac:cxnSpMkLst>
+            <pc:docMk/>
+            <pc:sldMk cId="2055881703" sldId="256"/>
+            <ac:cxnSpMk id="64" creationId="{4ABBD524-FE8B-1AEA-F423-625A6B82B344}"/>
+          </ac:cxnSpMkLst>
+        </pc:cxnChg>
         <pc:cxnChg chg="add mod">
           <ac:chgData name="Hemma Philamore" userId="db50e2f3-17b2-4cc0-b719-fb6254d3e9df" providerId="ADAL" clId="{35C0B9A2-A60C-57EC-AD9B-630767BE11FE}" dt="2025-11-20T10:50:40.617" v="456" actId="164"/>
           <ac:cxnSpMkLst>
             <pc:docMk/>
             <pc:sldMk cId="2055881703" sldId="256"/>
             <ac:cxnSpMk id="67" creationId="{00C822D5-2BC3-CD28-1168-BB36C2CAABCA}"/>
+          </ac:cxnSpMkLst>
+        </pc:cxnChg>
+        <pc:cxnChg chg="mod">
+          <ac:chgData name="Hemma Philamore" userId="db50e2f3-17b2-4cc0-b719-fb6254d3e9df" providerId="ADAL" clId="{35C0B9A2-A60C-57EC-AD9B-630767BE11FE}" dt="2025-11-20T10:50:57.959" v="457"/>
+          <ac:cxnSpMkLst>
+            <pc:docMk/>
+            <pc:sldMk cId="2055881703" sldId="256"/>
+            <ac:cxnSpMk id="70" creationId="{8E2CB805-3F6F-787A-5236-85EC132578A8}"/>
+          </ac:cxnSpMkLst>
+        </pc:cxnChg>
+        <pc:cxnChg chg="mod">
+          <ac:chgData name="Hemma Philamore" userId="db50e2f3-17b2-4cc0-b719-fb6254d3e9df" providerId="ADAL" clId="{35C0B9A2-A60C-57EC-AD9B-630767BE11FE}" dt="2025-11-20T10:50:57.959" v="457"/>
+          <ac:cxnSpMkLst>
+            <pc:docMk/>
+            <pc:sldMk cId="2055881703" sldId="256"/>
+            <ac:cxnSpMk id="71" creationId="{9E5B849C-7677-3560-137B-67C54A363687}"/>
+          </ac:cxnSpMkLst>
+        </pc:cxnChg>
+        <pc:cxnChg chg="mod">
+          <ac:chgData name="Hemma Philamore" userId="db50e2f3-17b2-4cc0-b719-fb6254d3e9df" providerId="ADAL" clId="{35C0B9A2-A60C-57EC-AD9B-630767BE11FE}" dt="2025-11-20T10:50:58.365" v="458"/>
+          <ac:cxnSpMkLst>
+            <pc:docMk/>
+            <pc:sldMk cId="2055881703" sldId="256"/>
+            <ac:cxnSpMk id="73" creationId="{5E23EF09-1DAA-5DB8-703B-8A045FDC8AFF}"/>
+          </ac:cxnSpMkLst>
+        </pc:cxnChg>
+        <pc:cxnChg chg="mod">
+          <ac:chgData name="Hemma Philamore" userId="db50e2f3-17b2-4cc0-b719-fb6254d3e9df" providerId="ADAL" clId="{35C0B9A2-A60C-57EC-AD9B-630767BE11FE}" dt="2025-11-20T10:50:58.365" v="458"/>
+          <ac:cxnSpMkLst>
+            <pc:docMk/>
+            <pc:sldMk cId="2055881703" sldId="256"/>
+            <ac:cxnSpMk id="74" creationId="{3CA48C36-D65A-7482-49C0-C8E7EB0F80B9}"/>
+          </ac:cxnSpMkLst>
+        </pc:cxnChg>
+        <pc:cxnChg chg="mod">
+          <ac:chgData name="Hemma Philamore" userId="db50e2f3-17b2-4cc0-b719-fb6254d3e9df" providerId="ADAL" clId="{35C0B9A2-A60C-57EC-AD9B-630767BE11FE}" dt="2025-11-20T10:50:58.798" v="459"/>
+          <ac:cxnSpMkLst>
+            <pc:docMk/>
+            <pc:sldMk cId="2055881703" sldId="256"/>
+            <ac:cxnSpMk id="76" creationId="{5529DA44-F22C-6A98-E5A2-FA99B81CDA02}"/>
+          </ac:cxnSpMkLst>
+        </pc:cxnChg>
+        <pc:cxnChg chg="mod">
+          <ac:chgData name="Hemma Philamore" userId="db50e2f3-17b2-4cc0-b719-fb6254d3e9df" providerId="ADAL" clId="{35C0B9A2-A60C-57EC-AD9B-630767BE11FE}" dt="2025-11-20T10:50:58.798" v="459"/>
+          <ac:cxnSpMkLst>
+            <pc:docMk/>
+            <pc:sldMk cId="2055881703" sldId="256"/>
+            <ac:cxnSpMk id="77" creationId="{1114AD4F-40A6-7F1B-0FFA-B4571FD033A3}"/>
           </ac:cxnSpMkLst>
         </pc:cxnChg>
         <pc:cxnChg chg="mod topLvl">
@@ -886,6 +1280,62 @@
             <pc:docMk/>
             <pc:sldMk cId="2055881703" sldId="256"/>
             <ac:cxnSpMk id="79" creationId="{B9B60649-FEB6-60E8-713C-4CF2679B967C}"/>
+          </ac:cxnSpMkLst>
+        </pc:cxnChg>
+        <pc:cxnChg chg="del mod topLvl">
+          <ac:chgData name="Hemma Philamore" userId="db50e2f3-17b2-4cc0-b719-fb6254d3e9df" providerId="ADAL" clId="{35C0B9A2-A60C-57EC-AD9B-630767BE11FE}" dt="2025-11-20T10:54:18.405" v="506" actId="478"/>
+          <ac:cxnSpMkLst>
+            <pc:docMk/>
+            <pc:sldMk cId="2055881703" sldId="256"/>
+            <ac:cxnSpMk id="80" creationId="{2E2F0708-331A-FE52-1F41-B2D4692FC0B4}"/>
+          </ac:cxnSpMkLst>
+        </pc:cxnChg>
+        <pc:cxnChg chg="mod">
+          <ac:chgData name="Hemma Philamore" userId="db50e2f3-17b2-4cc0-b719-fb6254d3e9df" providerId="ADAL" clId="{35C0B9A2-A60C-57EC-AD9B-630767BE11FE}" dt="2025-11-20T10:51:52.878" v="474"/>
+          <ac:cxnSpMkLst>
+            <pc:docMk/>
+            <pc:sldMk cId="2055881703" sldId="256"/>
+            <ac:cxnSpMk id="92" creationId="{08956005-0D8B-582C-F23A-35E7BFC4ED55}"/>
+          </ac:cxnSpMkLst>
+        </pc:cxnChg>
+        <pc:cxnChg chg="mod">
+          <ac:chgData name="Hemma Philamore" userId="db50e2f3-17b2-4cc0-b719-fb6254d3e9df" providerId="ADAL" clId="{35C0B9A2-A60C-57EC-AD9B-630767BE11FE}" dt="2025-11-20T10:51:52.878" v="474"/>
+          <ac:cxnSpMkLst>
+            <pc:docMk/>
+            <pc:sldMk cId="2055881703" sldId="256"/>
+            <ac:cxnSpMk id="93" creationId="{7AE81C34-BF92-9E33-6103-3FE7E6278ACF}"/>
+          </ac:cxnSpMkLst>
+        </pc:cxnChg>
+        <pc:cxnChg chg="mod">
+          <ac:chgData name="Hemma Philamore" userId="db50e2f3-17b2-4cc0-b719-fb6254d3e9df" providerId="ADAL" clId="{35C0B9A2-A60C-57EC-AD9B-630767BE11FE}" dt="2025-11-20T10:51:56.513" v="476"/>
+          <ac:cxnSpMkLst>
+            <pc:docMk/>
+            <pc:sldMk cId="2055881703" sldId="256"/>
+            <ac:cxnSpMk id="100" creationId="{505B6C6F-E9CB-A131-6619-D2FA562F0BF2}"/>
+          </ac:cxnSpMkLst>
+        </pc:cxnChg>
+        <pc:cxnChg chg="mod">
+          <ac:chgData name="Hemma Philamore" userId="db50e2f3-17b2-4cc0-b719-fb6254d3e9df" providerId="ADAL" clId="{35C0B9A2-A60C-57EC-AD9B-630767BE11FE}" dt="2025-11-20T10:51:56.513" v="476"/>
+          <ac:cxnSpMkLst>
+            <pc:docMk/>
+            <pc:sldMk cId="2055881703" sldId="256"/>
+            <ac:cxnSpMk id="101" creationId="{7E7D0B9F-4B8F-692B-F78F-19D3331EE335}"/>
+          </ac:cxnSpMkLst>
+        </pc:cxnChg>
+        <pc:cxnChg chg="del mod topLvl">
+          <ac:chgData name="Hemma Philamore" userId="db50e2f3-17b2-4cc0-b719-fb6254d3e9df" providerId="ADAL" clId="{35C0B9A2-A60C-57EC-AD9B-630767BE11FE}" dt="2025-11-20T10:54:44.407" v="515" actId="478"/>
+          <ac:cxnSpMkLst>
+            <pc:docMk/>
+            <pc:sldMk cId="2055881703" sldId="256"/>
+            <ac:cxnSpMk id="103" creationId="{29A6C44A-32A7-3A11-55C4-091C14FAB6B6}"/>
+          </ac:cxnSpMkLst>
+        </pc:cxnChg>
+        <pc:cxnChg chg="del mod topLvl">
+          <ac:chgData name="Hemma Philamore" userId="db50e2f3-17b2-4cc0-b719-fb6254d3e9df" providerId="ADAL" clId="{35C0B9A2-A60C-57EC-AD9B-630767BE11FE}" dt="2025-11-20T10:54:45.094" v="516" actId="478"/>
+          <ac:cxnSpMkLst>
+            <pc:docMk/>
+            <pc:sldMk cId="2055881703" sldId="256"/>
+            <ac:cxnSpMk id="104" creationId="{52BBA10A-21FA-CFD4-7A2F-71E09310B0E2}"/>
           </ac:cxnSpMkLst>
         </pc:cxnChg>
         <pc:cxnChg chg="add mod">
@@ -942,6 +1392,30 @@
             <pc:docMk/>
             <pc:sldMk cId="2055881703" sldId="256"/>
             <ac:cxnSpMk id="136" creationId="{A69A49EA-3D86-56C9-C3E0-048AD3BB55B9}"/>
+          </ac:cxnSpMkLst>
+        </pc:cxnChg>
+        <pc:cxnChg chg="add del mod">
+          <ac:chgData name="Hemma Philamore" userId="db50e2f3-17b2-4cc0-b719-fb6254d3e9df" providerId="ADAL" clId="{35C0B9A2-A60C-57EC-AD9B-630767BE11FE}" dt="2025-11-20T11:01:22.910" v="635" actId="478"/>
+          <ac:cxnSpMkLst>
+            <pc:docMk/>
+            <pc:sldMk cId="2055881703" sldId="256"/>
+            <ac:cxnSpMk id="151" creationId="{9E1AA743-DCB2-7424-BD80-E4070790B738}"/>
+          </ac:cxnSpMkLst>
+        </pc:cxnChg>
+        <pc:cxnChg chg="add del mod">
+          <ac:chgData name="Hemma Philamore" userId="db50e2f3-17b2-4cc0-b719-fb6254d3e9df" providerId="ADAL" clId="{35C0B9A2-A60C-57EC-AD9B-630767BE11FE}" dt="2025-11-20T11:01:23.598" v="636" actId="478"/>
+          <ac:cxnSpMkLst>
+            <pc:docMk/>
+            <pc:sldMk cId="2055881703" sldId="256"/>
+            <ac:cxnSpMk id="153" creationId="{7E729C39-DFD5-EB77-2D02-0088F6AC8E6E}"/>
+          </ac:cxnSpMkLst>
+        </pc:cxnChg>
+        <pc:cxnChg chg="add del mod">
+          <ac:chgData name="Hemma Philamore" userId="db50e2f3-17b2-4cc0-b719-fb6254d3e9df" providerId="ADAL" clId="{35C0B9A2-A60C-57EC-AD9B-630767BE11FE}" dt="2025-11-20T11:01:24.326" v="637" actId="478"/>
+          <ac:cxnSpMkLst>
+            <pc:docMk/>
+            <pc:sldMk cId="2055881703" sldId="256"/>
+            <ac:cxnSpMk id="155" creationId="{0AE5C6F3-F126-BCA9-524A-9D65C98338D7}"/>
           </ac:cxnSpMkLst>
         </pc:cxnChg>
         <pc:cxnChg chg="mod">
@@ -1186,7 +1660,7 @@
           <a:p>
             <a:fld id="{24C539BA-54A7-0D48-93B9-3DB7468E8C1A}" type="datetimeFigureOut">
               <a:rPr lang="en-US" smtClean="0"/>
-              <a:t>11/25/25</a:t>
+              <a:t>11/20/25</a:t>
             </a:fld>
             <a:endParaRPr lang="en-US"/>
           </a:p>
@@ -1386,7 +1860,7 @@
           <a:p>
             <a:fld id="{24C539BA-54A7-0D48-93B9-3DB7468E8C1A}" type="datetimeFigureOut">
               <a:rPr lang="en-US" smtClean="0"/>
-              <a:t>11/25/25</a:t>
+              <a:t>11/20/25</a:t>
             </a:fld>
             <a:endParaRPr lang="en-US"/>
           </a:p>
@@ -1596,7 +2070,7 @@
           <a:p>
             <a:fld id="{24C539BA-54A7-0D48-93B9-3DB7468E8C1A}" type="datetimeFigureOut">
               <a:rPr lang="en-US" smtClean="0"/>
-              <a:t>11/25/25</a:t>
+              <a:t>11/20/25</a:t>
             </a:fld>
             <a:endParaRPr lang="en-US"/>
           </a:p>
@@ -1796,7 +2270,7 @@
           <a:p>
             <a:fld id="{24C539BA-54A7-0D48-93B9-3DB7468E8C1A}" type="datetimeFigureOut">
               <a:rPr lang="en-US" smtClean="0"/>
-              <a:t>11/25/25</a:t>
+              <a:t>11/20/25</a:t>
             </a:fld>
             <a:endParaRPr lang="en-US"/>
           </a:p>
@@ -2072,7 +2546,7 @@
           <a:p>
             <a:fld id="{24C539BA-54A7-0D48-93B9-3DB7468E8C1A}" type="datetimeFigureOut">
               <a:rPr lang="en-US" smtClean="0"/>
-              <a:t>11/25/25</a:t>
+              <a:t>11/20/25</a:t>
             </a:fld>
             <a:endParaRPr lang="en-US"/>
           </a:p>
@@ -2340,7 +2814,7 @@
           <a:p>
             <a:fld id="{24C539BA-54A7-0D48-93B9-3DB7468E8C1A}" type="datetimeFigureOut">
               <a:rPr lang="en-US" smtClean="0"/>
-              <a:t>11/25/25</a:t>
+              <a:t>11/20/25</a:t>
             </a:fld>
             <a:endParaRPr lang="en-US"/>
           </a:p>
@@ -2755,7 +3229,7 @@
           <a:p>
             <a:fld id="{24C539BA-54A7-0D48-93B9-3DB7468E8C1A}" type="datetimeFigureOut">
               <a:rPr lang="en-US" smtClean="0"/>
-              <a:t>11/25/25</a:t>
+              <a:t>11/20/25</a:t>
             </a:fld>
             <a:endParaRPr lang="en-US"/>
           </a:p>
@@ -2897,7 +3371,7 @@
           <a:p>
             <a:fld id="{24C539BA-54A7-0D48-93B9-3DB7468E8C1A}" type="datetimeFigureOut">
               <a:rPr lang="en-US" smtClean="0"/>
-              <a:t>11/25/25</a:t>
+              <a:t>11/20/25</a:t>
             </a:fld>
             <a:endParaRPr lang="en-US"/>
           </a:p>
@@ -3010,7 +3484,7 @@
           <a:p>
             <a:fld id="{24C539BA-54A7-0D48-93B9-3DB7468E8C1A}" type="datetimeFigureOut">
               <a:rPr lang="en-US" smtClean="0"/>
-              <a:t>11/25/25</a:t>
+              <a:t>11/20/25</a:t>
             </a:fld>
             <a:endParaRPr lang="en-US"/>
           </a:p>
@@ -3323,7 +3797,7 @@
           <a:p>
             <a:fld id="{24C539BA-54A7-0D48-93B9-3DB7468E8C1A}" type="datetimeFigureOut">
               <a:rPr lang="en-US" smtClean="0"/>
-              <a:t>11/25/25</a:t>
+              <a:t>11/20/25</a:t>
             </a:fld>
             <a:endParaRPr lang="en-US"/>
           </a:p>
@@ -3612,7 +4086,7 @@
           <a:p>
             <a:fld id="{24C539BA-54A7-0D48-93B9-3DB7468E8C1A}" type="datetimeFigureOut">
               <a:rPr lang="en-US" smtClean="0"/>
-              <a:t>11/25/25</a:t>
+              <a:t>11/20/25</a:t>
             </a:fld>
             <a:endParaRPr lang="en-US"/>
           </a:p>
@@ -3855,7 +4329,7 @@
           <a:p>
             <a:fld id="{24C539BA-54A7-0D48-93B9-3DB7468E8C1A}" type="datetimeFigureOut">
               <a:rPr lang="en-US" smtClean="0"/>
-              <a:t>11/25/25</a:t>
+              <a:t>11/20/25</a:t>
             </a:fld>
             <a:endParaRPr lang="en-US"/>
           </a:p>
@@ -4658,8 +5132,8 @@
           </a:p>
         </p:txBody>
       </p:sp>
-      <mc:AlternateContent xmlns:mc="http://schemas.openxmlformats.org/markup-compatibility/2006" xmlns:a14="http://schemas.microsoft.com/office/drawing/2010/main">
-        <mc:Choice Requires="a14">
+      <mc:AlternateContent xmlns:mc="http://schemas.openxmlformats.org/markup-compatibility/2006">
+        <mc:Choice xmlns:a14="http://schemas.microsoft.com/office/drawing/2010/main" Requires="a14">
           <p:sp>
             <p:nvSpPr>
               <p:cNvPr id="37" name="TextBox 36">
@@ -4738,7 +5212,7 @@
             </p:txBody>
           </p:sp>
         </mc:Choice>
-        <mc:Fallback xmlns="">
+        <mc:Fallback>
           <p:sp>
             <p:nvSpPr>
               <p:cNvPr id="37" name="TextBox 36">
@@ -4783,8 +5257,8 @@
           </p:sp>
         </mc:Fallback>
       </mc:AlternateContent>
-      <mc:AlternateContent xmlns:mc="http://schemas.openxmlformats.org/markup-compatibility/2006" xmlns:a14="http://schemas.microsoft.com/office/drawing/2010/main">
-        <mc:Choice Requires="a14">
+      <mc:AlternateContent xmlns:mc="http://schemas.openxmlformats.org/markup-compatibility/2006">
+        <mc:Choice xmlns:a14="http://schemas.microsoft.com/office/drawing/2010/main" Requires="a14">
           <p:sp>
             <p:nvSpPr>
               <p:cNvPr id="38" name="TextBox 37">
@@ -4864,7 +5338,7 @@
             </p:txBody>
           </p:sp>
         </mc:Choice>
-        <mc:Fallback xmlns="">
+        <mc:Fallback>
           <p:sp>
             <p:nvSpPr>
               <p:cNvPr id="38" name="TextBox 37">
@@ -4909,8 +5383,8 @@
           </p:sp>
         </mc:Fallback>
       </mc:AlternateContent>
-      <mc:AlternateContent xmlns:mc="http://schemas.openxmlformats.org/markup-compatibility/2006" xmlns:a14="http://schemas.microsoft.com/office/drawing/2010/main">
-        <mc:Choice Requires="a14">
+      <mc:AlternateContent xmlns:mc="http://schemas.openxmlformats.org/markup-compatibility/2006">
+        <mc:Choice xmlns:a14="http://schemas.microsoft.com/office/drawing/2010/main" Requires="a14">
           <p:sp>
             <p:nvSpPr>
               <p:cNvPr id="39" name="TextBox 38">
@@ -4963,7 +5437,7 @@
             </p:txBody>
           </p:sp>
         </mc:Choice>
-        <mc:Fallback xmlns="">
+        <mc:Fallback>
           <p:sp>
             <p:nvSpPr>
               <p:cNvPr id="39" name="TextBox 38">
@@ -5069,8 +5543,8 @@
             </p:nvSpPr>
             <p:spPr>
               <a:xfrm rot="1709088">
-                <a:off x="7804184" y="1397399"/>
-                <a:ext cx="713402" cy="276999"/>
+                <a:off x="7902943" y="1373958"/>
+                <a:ext cx="535275" cy="138499"/>
               </a:xfrm>
               <a:prstGeom prst="rect">
                 <a:avLst/>
@@ -5082,12 +5556,6 @@
                 <a:spAutoFit/>
               </a:bodyPr>
               <a:lstStyle/>
-              <a:p>
-                <a:r>
-                  <a:rPr lang="en-GB" sz="900" dirty="0"/>
-                  <a:t>Sensor range</a:t>
-                </a:r>
-              </a:p>
               <a:p>
                 <a14:m>
                   <m:oMath xmlns:m="http://schemas.openxmlformats.org/officeDocument/2006/math">
@@ -5130,8 +5598,8 @@
             </p:nvSpPr>
             <p:spPr>
               <a:xfrm rot="1709088">
-                <a:off x="7804184" y="1397399"/>
-                <a:ext cx="713402" cy="276999"/>
+                <a:off x="7902943" y="1373958"/>
+                <a:ext cx="535275" cy="138499"/>
               </a:xfrm>
               <a:prstGeom prst="rect">
                 <a:avLst/>
@@ -5139,7 +5607,7 @@
               <a:blipFill>
                 <a:blip r:embed="rId6"/>
                 <a:stretch>
-                  <a:fillRect l="-4918" t="-10638" r="-3279"/>
+                  <a:fillRect l="-6977" t="-3226" b="-6452"/>
                 </a:stretch>
               </a:blipFill>
             </p:spPr>
@@ -5301,8 +5769,8 @@
           </a:p>
         </p:txBody>
       </p:sp>
-      <mc:AlternateContent xmlns:mc="http://schemas.openxmlformats.org/markup-compatibility/2006" xmlns:a14="http://schemas.microsoft.com/office/drawing/2010/main">
-        <mc:Choice Requires="a14">
+      <mc:AlternateContent xmlns:mc="http://schemas.openxmlformats.org/markup-compatibility/2006">
+        <mc:Choice xmlns:a14="http://schemas.microsoft.com/office/drawing/2010/main" Requires="a14">
           <p:sp>
             <p:nvSpPr>
               <p:cNvPr id="146" name="TextBox 145">
@@ -5331,7 +5799,6 @@
               </a:bodyPr>
               <a:lstStyle/>
               <a:p>
-                <a:pPr/>
                 <a14:m>
                   <m:oMathPara xmlns:m="http://schemas.openxmlformats.org/officeDocument/2006/math">
                     <m:oMathParaPr>
@@ -5371,7 +5838,7 @@
             </p:txBody>
           </p:sp>
         </mc:Choice>
-        <mc:Fallback xmlns="">
+        <mc:Fallback>
           <p:sp>
             <p:nvSpPr>
               <p:cNvPr id="146" name="TextBox 145">
@@ -5416,8 +5883,8 @@
           </p:sp>
         </mc:Fallback>
       </mc:AlternateContent>
-      <mc:AlternateContent xmlns:mc="http://schemas.openxmlformats.org/markup-compatibility/2006" xmlns:a14="http://schemas.microsoft.com/office/drawing/2010/main">
-        <mc:Choice Requires="a14">
+      <mc:AlternateContent xmlns:mc="http://schemas.openxmlformats.org/markup-compatibility/2006">
+        <mc:Choice xmlns:a14="http://schemas.microsoft.com/office/drawing/2010/main" Requires="a14">
           <p:sp>
             <p:nvSpPr>
               <p:cNvPr id="147" name="TextBox 146">
@@ -5446,7 +5913,6 @@
               </a:bodyPr>
               <a:lstStyle/>
               <a:p>
-                <a:pPr/>
                 <a14:m>
                   <m:oMathPara xmlns:m="http://schemas.openxmlformats.org/officeDocument/2006/math">
                     <m:oMathParaPr>
@@ -5486,7 +5952,7 @@
             </p:txBody>
           </p:sp>
         </mc:Choice>
-        <mc:Fallback xmlns="">
+        <mc:Fallback>
           <p:sp>
             <p:nvSpPr>
               <p:cNvPr id="147" name="TextBox 146">
@@ -5531,8 +5997,8 @@
           </p:sp>
         </mc:Fallback>
       </mc:AlternateContent>
-      <mc:AlternateContent xmlns:mc="http://schemas.openxmlformats.org/markup-compatibility/2006" xmlns:a14="http://schemas.microsoft.com/office/drawing/2010/main">
-        <mc:Choice Requires="a14">
+      <mc:AlternateContent xmlns:mc="http://schemas.openxmlformats.org/markup-compatibility/2006">
+        <mc:Choice xmlns:a14="http://schemas.microsoft.com/office/drawing/2010/main" Requires="a14">
           <p:sp>
             <p:nvSpPr>
               <p:cNvPr id="148" name="TextBox 147">
@@ -5561,7 +6027,6 @@
               </a:bodyPr>
               <a:lstStyle/>
               <a:p>
-                <a:pPr/>
                 <a14:m>
                   <m:oMathPara xmlns:m="http://schemas.openxmlformats.org/officeDocument/2006/math">
                     <m:oMathParaPr>
@@ -5601,7 +6066,7 @@
             </p:txBody>
           </p:sp>
         </mc:Choice>
-        <mc:Fallback xmlns="">
+        <mc:Fallback>
           <p:sp>
             <p:nvSpPr>
               <p:cNvPr id="148" name="TextBox 147">
@@ -5646,8 +6111,8 @@
           </p:sp>
         </mc:Fallback>
       </mc:AlternateContent>
-      <mc:AlternateContent xmlns:mc="http://schemas.openxmlformats.org/markup-compatibility/2006" xmlns:a14="http://schemas.microsoft.com/office/drawing/2010/main">
-        <mc:Choice Requires="a14">
+      <mc:AlternateContent xmlns:mc="http://schemas.openxmlformats.org/markup-compatibility/2006">
+        <mc:Choice xmlns:a14="http://schemas.microsoft.com/office/drawing/2010/main" Requires="a14">
           <p:sp>
             <p:nvSpPr>
               <p:cNvPr id="149" name="TextBox 148">
@@ -5676,7 +6141,6 @@
               </a:bodyPr>
               <a:lstStyle/>
               <a:p>
-                <a:pPr/>
                 <a14:m>
                   <m:oMathPara xmlns:m="http://schemas.openxmlformats.org/officeDocument/2006/math">
                     <m:oMathParaPr>
@@ -5716,7 +6180,7 @@
             </p:txBody>
           </p:sp>
         </mc:Choice>
-        <mc:Fallback xmlns="">
+        <mc:Fallback>
           <p:sp>
             <p:nvSpPr>
               <p:cNvPr id="149" name="TextBox 148">
@@ -6111,8 +6575,8 @@
           </p:style>
         </p:cxnSp>
       </p:grpSp>
-      <mc:AlternateContent xmlns:mc="http://schemas.openxmlformats.org/markup-compatibility/2006" xmlns:a14="http://schemas.microsoft.com/office/drawing/2010/main">
-        <mc:Choice Requires="a14">
+      <mc:AlternateContent xmlns:mc="http://schemas.openxmlformats.org/markup-compatibility/2006">
+        <mc:Choice xmlns:a14="http://schemas.microsoft.com/office/drawing/2010/main" Requires="a14">
           <p:sp>
             <p:nvSpPr>
               <p:cNvPr id="165" name="TextBox 164">
@@ -6141,7 +6605,6 @@
               </a:bodyPr>
               <a:lstStyle/>
               <a:p>
-                <a:pPr/>
                 <a14:m>
                   <m:oMathPara xmlns:m="http://schemas.openxmlformats.org/officeDocument/2006/math">
                     <m:oMathParaPr>
@@ -6181,7 +6644,7 @@
             </p:txBody>
           </p:sp>
         </mc:Choice>
-        <mc:Fallback xmlns="">
+        <mc:Fallback>
           <p:sp>
             <p:nvSpPr>
               <p:cNvPr id="165" name="TextBox 164">
@@ -6226,8 +6689,8 @@
           </p:sp>
         </mc:Fallback>
       </mc:AlternateContent>
-      <mc:AlternateContent xmlns:mc="http://schemas.openxmlformats.org/markup-compatibility/2006" xmlns:a14="http://schemas.microsoft.com/office/drawing/2010/main">
-        <mc:Choice Requires="a14">
+      <mc:AlternateContent xmlns:mc="http://schemas.openxmlformats.org/markup-compatibility/2006">
+        <mc:Choice xmlns:a14="http://schemas.microsoft.com/office/drawing/2010/main" Requires="a14">
           <p:sp>
             <p:nvSpPr>
               <p:cNvPr id="166" name="TextBox 165">
@@ -6256,7 +6719,6 @@
               </a:bodyPr>
               <a:lstStyle/>
               <a:p>
-                <a:pPr/>
                 <a14:m>
                   <m:oMathPara xmlns:m="http://schemas.openxmlformats.org/officeDocument/2006/math">
                     <m:oMathParaPr>
@@ -6296,7 +6758,7 @@
             </p:txBody>
           </p:sp>
         </mc:Choice>
-        <mc:Fallback xmlns="">
+        <mc:Fallback>
           <p:sp>
             <p:nvSpPr>
               <p:cNvPr id="166" name="TextBox 165">
@@ -6341,8 +6803,8 @@
           </p:sp>
         </mc:Fallback>
       </mc:AlternateContent>
-      <mc:AlternateContent xmlns:mc="http://schemas.openxmlformats.org/markup-compatibility/2006" xmlns:a14="http://schemas.microsoft.com/office/drawing/2010/main">
-        <mc:Choice Requires="a14">
+      <mc:AlternateContent xmlns:mc="http://schemas.openxmlformats.org/markup-compatibility/2006">
+        <mc:Choice xmlns:a14="http://schemas.microsoft.com/office/drawing/2010/main" Requires="a14">
           <p:sp>
             <p:nvSpPr>
               <p:cNvPr id="167" name="TextBox 166">
@@ -6371,7 +6833,6 @@
               </a:bodyPr>
               <a:lstStyle/>
               <a:p>
-                <a:pPr/>
                 <a14:m>
                   <m:oMathPara xmlns:m="http://schemas.openxmlformats.org/officeDocument/2006/math">
                     <m:oMathParaPr>
@@ -6411,7 +6872,7 @@
             </p:txBody>
           </p:sp>
         </mc:Choice>
-        <mc:Fallback xmlns="">
+        <mc:Fallback>
           <p:sp>
             <p:nvSpPr>
               <p:cNvPr id="167" name="TextBox 166">
@@ -6456,8 +6917,8 @@
           </p:sp>
         </mc:Fallback>
       </mc:AlternateContent>
-      <mc:AlternateContent xmlns:mc="http://schemas.openxmlformats.org/markup-compatibility/2006" xmlns:a14="http://schemas.microsoft.com/office/drawing/2010/main">
-        <mc:Choice Requires="a14">
+      <mc:AlternateContent xmlns:mc="http://schemas.openxmlformats.org/markup-compatibility/2006">
+        <mc:Choice xmlns:a14="http://schemas.microsoft.com/office/drawing/2010/main" Requires="a14">
           <p:sp>
             <p:nvSpPr>
               <p:cNvPr id="168" name="TextBox 167">
@@ -6486,7 +6947,6 @@
               </a:bodyPr>
               <a:lstStyle/>
               <a:p>
-                <a:pPr/>
                 <a14:m>
                   <m:oMathPara xmlns:m="http://schemas.openxmlformats.org/officeDocument/2006/math">
                     <m:oMathParaPr>
@@ -6526,7 +6986,7 @@
             </p:txBody>
           </p:sp>
         </mc:Choice>
-        <mc:Fallback xmlns="">
+        <mc:Fallback>
           <p:sp>
             <p:nvSpPr>
               <p:cNvPr id="168" name="TextBox 167">
@@ -6921,8 +7381,8 @@
           </p:style>
         </p:cxnSp>
       </p:grpSp>
-      <mc:AlternateContent xmlns:mc="http://schemas.openxmlformats.org/markup-compatibility/2006" xmlns:a14="http://schemas.microsoft.com/office/drawing/2010/main">
-        <mc:Choice Requires="a14">
+      <mc:AlternateContent xmlns:mc="http://schemas.openxmlformats.org/markup-compatibility/2006">
+        <mc:Choice xmlns:a14="http://schemas.microsoft.com/office/drawing/2010/main" Requires="a14">
           <p:sp>
             <p:nvSpPr>
               <p:cNvPr id="178" name="TextBox 177">
@@ -6951,7 +7411,6 @@
               </a:bodyPr>
               <a:lstStyle/>
               <a:p>
-                <a:pPr/>
                 <a14:m>
                   <m:oMathPara xmlns:m="http://schemas.openxmlformats.org/officeDocument/2006/math">
                     <m:oMathParaPr>
@@ -6991,7 +7450,7 @@
             </p:txBody>
           </p:sp>
         </mc:Choice>
-        <mc:Fallback xmlns="">
+        <mc:Fallback>
           <p:sp>
             <p:nvSpPr>
               <p:cNvPr id="178" name="TextBox 177">
@@ -7036,8 +7495,8 @@
           </p:sp>
         </mc:Fallback>
       </mc:AlternateContent>
-      <mc:AlternateContent xmlns:mc="http://schemas.openxmlformats.org/markup-compatibility/2006" xmlns:a14="http://schemas.microsoft.com/office/drawing/2010/main">
-        <mc:Choice Requires="a14">
+      <mc:AlternateContent xmlns:mc="http://schemas.openxmlformats.org/markup-compatibility/2006">
+        <mc:Choice xmlns:a14="http://schemas.microsoft.com/office/drawing/2010/main" Requires="a14">
           <p:sp>
             <p:nvSpPr>
               <p:cNvPr id="179" name="TextBox 178">
@@ -7066,7 +7525,6 @@
               </a:bodyPr>
               <a:lstStyle/>
               <a:p>
-                <a:pPr/>
                 <a14:m>
                   <m:oMathPara xmlns:m="http://schemas.openxmlformats.org/officeDocument/2006/math">
                     <m:oMathParaPr>
@@ -7106,7 +7564,7 @@
             </p:txBody>
           </p:sp>
         </mc:Choice>
-        <mc:Fallback xmlns="">
+        <mc:Fallback>
           <p:sp>
             <p:nvSpPr>
               <p:cNvPr id="179" name="TextBox 178">
@@ -7151,8 +7609,8 @@
           </p:sp>
         </mc:Fallback>
       </mc:AlternateContent>
-      <mc:AlternateContent xmlns:mc="http://schemas.openxmlformats.org/markup-compatibility/2006" xmlns:a14="http://schemas.microsoft.com/office/drawing/2010/main">
-        <mc:Choice Requires="a14">
+      <mc:AlternateContent xmlns:mc="http://schemas.openxmlformats.org/markup-compatibility/2006">
+        <mc:Choice xmlns:a14="http://schemas.microsoft.com/office/drawing/2010/main" Requires="a14">
           <p:sp>
             <p:nvSpPr>
               <p:cNvPr id="180" name="TextBox 179">
@@ -7181,7 +7639,6 @@
               </a:bodyPr>
               <a:lstStyle/>
               <a:p>
-                <a:pPr/>
                 <a14:m>
                   <m:oMathPara xmlns:m="http://schemas.openxmlformats.org/officeDocument/2006/math">
                     <m:oMathParaPr>
@@ -7221,7 +7678,7 @@
             </p:txBody>
           </p:sp>
         </mc:Choice>
-        <mc:Fallback xmlns="">
+        <mc:Fallback>
           <p:sp>
             <p:nvSpPr>
               <p:cNvPr id="180" name="TextBox 179">
@@ -7266,8 +7723,8 @@
           </p:sp>
         </mc:Fallback>
       </mc:AlternateContent>
-      <mc:AlternateContent xmlns:mc="http://schemas.openxmlformats.org/markup-compatibility/2006" xmlns:a14="http://schemas.microsoft.com/office/drawing/2010/main">
-        <mc:Choice Requires="a14">
+      <mc:AlternateContent xmlns:mc="http://schemas.openxmlformats.org/markup-compatibility/2006">
+        <mc:Choice xmlns:a14="http://schemas.microsoft.com/office/drawing/2010/main" Requires="a14">
           <p:sp>
             <p:nvSpPr>
               <p:cNvPr id="181" name="TextBox 180">
@@ -7296,7 +7753,6 @@
               </a:bodyPr>
               <a:lstStyle/>
               <a:p>
-                <a:pPr/>
                 <a14:m>
                   <m:oMathPara xmlns:m="http://schemas.openxmlformats.org/officeDocument/2006/math">
                     <m:oMathParaPr>
@@ -7336,7 +7792,7 @@
             </p:txBody>
           </p:sp>
         </mc:Choice>
-        <mc:Fallback xmlns="">
+        <mc:Fallback>
           <p:sp>
             <p:nvSpPr>
               <p:cNvPr id="181" name="TextBox 180">
@@ -9041,8 +9497,8 @@
           </a:fontRef>
         </p:style>
       </p:cxnSp>
-      <mc:AlternateContent xmlns:mc="http://schemas.openxmlformats.org/markup-compatibility/2006" xmlns:a14="http://schemas.microsoft.com/office/drawing/2010/main">
-        <mc:Choice Requires="a14">
+      <mc:AlternateContent xmlns:mc="http://schemas.openxmlformats.org/markup-compatibility/2006">
+        <mc:Choice xmlns:a14="http://schemas.microsoft.com/office/drawing/2010/main" Requires="a14">
           <p:sp>
             <p:nvSpPr>
               <p:cNvPr id="197" name="TextBox 196">
@@ -9071,7 +9527,6 @@
               </a:bodyPr>
               <a:lstStyle/>
               <a:p>
-                <a:pPr/>
                 <a14:m>
                   <m:oMathPara xmlns:m="http://schemas.openxmlformats.org/officeDocument/2006/math">
                     <m:oMathParaPr>
@@ -9111,7 +9566,7 @@
             </p:txBody>
           </p:sp>
         </mc:Choice>
-        <mc:Fallback xmlns="">
+        <mc:Fallback>
           <p:sp>
             <p:nvSpPr>
               <p:cNvPr id="197" name="TextBox 196">
@@ -9156,8 +9611,8 @@
           </p:sp>
         </mc:Fallback>
       </mc:AlternateContent>
-      <mc:AlternateContent xmlns:mc="http://schemas.openxmlformats.org/markup-compatibility/2006" xmlns:a14="http://schemas.microsoft.com/office/drawing/2010/main">
-        <mc:Choice Requires="a14">
+      <mc:AlternateContent xmlns:mc="http://schemas.openxmlformats.org/markup-compatibility/2006">
+        <mc:Choice xmlns:a14="http://schemas.microsoft.com/office/drawing/2010/main" Requires="a14">
           <p:sp>
             <p:nvSpPr>
               <p:cNvPr id="198" name="TextBox 197">
@@ -9186,7 +9641,6 @@
               </a:bodyPr>
               <a:lstStyle/>
               <a:p>
-                <a:pPr/>
                 <a14:m>
                   <m:oMathPara xmlns:m="http://schemas.openxmlformats.org/officeDocument/2006/math">
                     <m:oMathParaPr>
@@ -9226,7 +9680,7 @@
             </p:txBody>
           </p:sp>
         </mc:Choice>
-        <mc:Fallback xmlns="">
+        <mc:Fallback>
           <p:sp>
             <p:nvSpPr>
               <p:cNvPr id="198" name="TextBox 197">
@@ -9271,8 +9725,8 @@
           </p:sp>
         </mc:Fallback>
       </mc:AlternateContent>
-      <mc:AlternateContent xmlns:mc="http://schemas.openxmlformats.org/markup-compatibility/2006" xmlns:a14="http://schemas.microsoft.com/office/drawing/2010/main">
-        <mc:Choice Requires="a14">
+      <mc:AlternateContent xmlns:mc="http://schemas.openxmlformats.org/markup-compatibility/2006">
+        <mc:Choice xmlns:a14="http://schemas.microsoft.com/office/drawing/2010/main" Requires="a14">
           <p:sp>
             <p:nvSpPr>
               <p:cNvPr id="199" name="TextBox 198">
@@ -9301,7 +9755,6 @@
               </a:bodyPr>
               <a:lstStyle/>
               <a:p>
-                <a:pPr/>
                 <a14:m>
                   <m:oMathPara xmlns:m="http://schemas.openxmlformats.org/officeDocument/2006/math">
                     <m:oMathParaPr>
@@ -9341,7 +9794,7 @@
             </p:txBody>
           </p:sp>
         </mc:Choice>
-        <mc:Fallback xmlns="">
+        <mc:Fallback>
           <p:sp>
             <p:nvSpPr>
               <p:cNvPr id="199" name="TextBox 198">
@@ -9449,8 +9902,8 @@
             </a:fontRef>
           </p:style>
         </p:cxnSp>
-        <mc:AlternateContent xmlns:mc="http://schemas.openxmlformats.org/markup-compatibility/2006" xmlns:a14="http://schemas.microsoft.com/office/drawing/2010/main">
-          <mc:Choice Requires="a14">
+        <mc:AlternateContent xmlns:mc="http://schemas.openxmlformats.org/markup-compatibility/2006">
+          <mc:Choice xmlns:a14="http://schemas.microsoft.com/office/drawing/2010/main" Requires="a14">
             <p:sp>
               <p:nvSpPr>
                 <p:cNvPr id="200" name="TextBox 199">
@@ -9479,7 +9932,6 @@
                 </a:bodyPr>
                 <a:lstStyle/>
                 <a:p>
-                  <a:pPr/>
                   <a14:m>
                     <m:oMathPara xmlns:m="http://schemas.openxmlformats.org/officeDocument/2006/math">
                       <m:oMathParaPr>
@@ -9519,7 +9971,7 @@
               </p:txBody>
             </p:sp>
           </mc:Choice>
-          <mc:Fallback xmlns="">
+          <mc:Fallback>
             <p:sp>
               <p:nvSpPr>
                 <p:cNvPr id="200" name="TextBox 199">
@@ -10213,8 +10665,8 @@
             </p:txBody>
           </p:sp>
         </p:grpSp>
-        <mc:AlternateContent xmlns:mc="http://schemas.openxmlformats.org/markup-compatibility/2006" xmlns:a14="http://schemas.microsoft.com/office/drawing/2010/main">
-          <mc:Choice Requires="a14">
+        <mc:AlternateContent xmlns:mc="http://schemas.openxmlformats.org/markup-compatibility/2006">
+          <mc:Choice xmlns:a14="http://schemas.microsoft.com/office/drawing/2010/main" Requires="a14">
             <p:sp>
               <p:nvSpPr>
                 <p:cNvPr id="6" name="TextBox 5">
@@ -10270,7 +10722,7 @@
               </p:txBody>
             </p:sp>
           </mc:Choice>
-          <mc:Fallback xmlns="">
+          <mc:Fallback>
             <p:sp>
               <p:nvSpPr>
                 <p:cNvPr id="6" name="TextBox 5">
@@ -10316,8 +10768,8 @@
           </mc:Fallback>
         </mc:AlternateContent>
       </p:grpSp>
-      <mc:AlternateContent xmlns:mc="http://schemas.openxmlformats.org/markup-compatibility/2006" xmlns:a14="http://schemas.microsoft.com/office/drawing/2010/main">
-        <mc:Choice Requires="a14">
+      <mc:AlternateContent xmlns:mc="http://schemas.openxmlformats.org/markup-compatibility/2006">
+        <mc:Choice xmlns:a14="http://schemas.microsoft.com/office/drawing/2010/main" Requires="a14">
           <p:sp>
             <p:nvSpPr>
               <p:cNvPr id="12" name="Rectangle 11">
@@ -10385,7 +10837,7 @@
             </p:txBody>
           </p:sp>
         </mc:Choice>
-        <mc:Fallback xmlns="">
+        <mc:Fallback>
           <p:sp>
             <p:nvSpPr>
               <p:cNvPr id="12" name="Rectangle 11">

</xml_diff>

<commit_message>
HP added week 11 exercsies
</commit_message>
<xml_diff>
--- a/media/week_10/diagrams.pptx
+++ b/media/week_10/diagrams.pptx
@@ -117,8 +117,7 @@
 <file path=ppt/revisionInfo.xml><?xml version="1.0" encoding="utf-8"?>
 <p1510:revInfo xmlns:a="http://schemas.openxmlformats.org/drawingml/2006/main" xmlns:r="http://schemas.openxmlformats.org/officeDocument/2006/relationships" xmlns:p1510="http://schemas.microsoft.com/office/powerpoint/2015/10/main">
   <p1510:revLst>
-    <p1510:client id="{248D8C8A-D969-FF47-8750-E2D7FB7C4E9E}" v="164" dt="2025-11-21T11:36:54.126"/>
-    <p1510:client id="{DA2B79C2-931E-6F45-97CE-51EECBC9C8D0}" v="3" dt="2025-11-20T16:48:46.294"/>
+    <p1510:client id="{DA2B79C2-931E-6F45-97CE-51EECBC9C8D0}" v="43" dt="2025-11-25T22:44:02.682"/>
   </p1510:revLst>
 </p1510:revInfo>
 </file>
@@ -128,10 +127,25 @@
   <pc:docChgLst>
     <pc:chgData name="Hemma Philamore" userId="db50e2f3-17b2-4cc0-b719-fb6254d3e9df" providerId="ADAL" clId="{B5D85944-D90A-5912-90C6-4C26E424D3D6}"/>
     <pc:docChg chg="addSld modSld">
-      <pc:chgData name="Hemma Philamore" userId="db50e2f3-17b2-4cc0-b719-fb6254d3e9df" providerId="ADAL" clId="{B5D85944-D90A-5912-90C6-4C26E424D3D6}" dt="2025-11-20T16:48:46.294" v="6" actId="1076"/>
+      <pc:chgData name="Hemma Philamore" userId="db50e2f3-17b2-4cc0-b719-fb6254d3e9df" providerId="ADAL" clId="{B5D85944-D90A-5912-90C6-4C26E424D3D6}" dt="2025-11-25T22:44:09.476" v="48" actId="1076"/>
       <pc:docMkLst>
         <pc:docMk/>
       </pc:docMkLst>
+      <pc:sldChg chg="modSp mod">
+        <pc:chgData name="Hemma Philamore" userId="db50e2f3-17b2-4cc0-b719-fb6254d3e9df" providerId="ADAL" clId="{B5D85944-D90A-5912-90C6-4C26E424D3D6}" dt="2025-11-25T22:44:09.476" v="48" actId="1076"/>
+        <pc:sldMkLst>
+          <pc:docMk/>
+          <pc:sldMk cId="2055881703" sldId="256"/>
+        </pc:sldMkLst>
+        <pc:spChg chg="mod">
+          <ac:chgData name="Hemma Philamore" userId="db50e2f3-17b2-4cc0-b719-fb6254d3e9df" providerId="ADAL" clId="{B5D85944-D90A-5912-90C6-4C26E424D3D6}" dt="2025-11-25T22:44:09.476" v="48" actId="1076"/>
+          <ac:spMkLst>
+            <pc:docMk/>
+            <pc:sldMk cId="2055881703" sldId="256"/>
+            <ac:spMk id="54" creationId="{796BBBEF-DDD2-260A-6642-AAF99653D558}"/>
+          </ac:spMkLst>
+        </pc:spChg>
+      </pc:sldChg>
       <pc:sldChg chg="addSp modSp new mod">
         <pc:chgData name="Hemma Philamore" userId="db50e2f3-17b2-4cc0-b719-fb6254d3e9df" providerId="ADAL" clId="{B5D85944-D90A-5912-90C6-4C26E424D3D6}" dt="2025-11-20T16:48:46.294" v="6" actId="1076"/>
         <pc:sldMkLst>
@@ -234,60 +248,12 @@
           <pc:docMk/>
           <pc:sldMk cId="2055881703" sldId="256"/>
         </pc:sldMkLst>
-        <pc:spChg chg="del">
-          <ac:chgData name="Hemma Philamore" userId="db50e2f3-17b2-4cc0-b719-fb6254d3e9df" providerId="ADAL" clId="{35C0B9A2-A60C-57EC-AD9B-630767BE11FE}" dt="2025-11-20T10:26:04.869" v="0" actId="478"/>
-          <ac:spMkLst>
-            <pc:docMk/>
-            <pc:sldMk cId="2055881703" sldId="256"/>
-            <ac:spMk id="5" creationId="{F8629915-D6D6-B1D7-CEFA-E538E4097312}"/>
-          </ac:spMkLst>
-        </pc:spChg>
-        <pc:spChg chg="add del">
-          <ac:chgData name="Hemma Philamore" userId="db50e2f3-17b2-4cc0-b719-fb6254d3e9df" providerId="ADAL" clId="{35C0B9A2-A60C-57EC-AD9B-630767BE11FE}" dt="2025-11-20T10:27:04.363" v="2" actId="478"/>
-          <ac:spMkLst>
-            <pc:docMk/>
-            <pc:sldMk cId="2055881703" sldId="256"/>
-            <ac:spMk id="7" creationId="{BADCA2C8-5DF9-63F1-CC28-EDCE4F6AE01C}"/>
-          </ac:spMkLst>
-        </pc:spChg>
         <pc:spChg chg="add mod">
           <ac:chgData name="Hemma Philamore" userId="db50e2f3-17b2-4cc0-b719-fb6254d3e9df" providerId="ADAL" clId="{35C0B9A2-A60C-57EC-AD9B-630767BE11FE}" dt="2025-11-20T11:15:26.553" v="734" actId="1076"/>
           <ac:spMkLst>
             <pc:docMk/>
             <pc:sldMk cId="2055881703" sldId="256"/>
             <ac:spMk id="10" creationId="{60E0CE97-DD2D-18CC-926E-6ADE97B57EC4}"/>
-          </ac:spMkLst>
-        </pc:spChg>
-        <pc:spChg chg="add del mod">
-          <ac:chgData name="Hemma Philamore" userId="db50e2f3-17b2-4cc0-b719-fb6254d3e9df" providerId="ADAL" clId="{35C0B9A2-A60C-57EC-AD9B-630767BE11FE}" dt="2025-11-20T10:35:15.461" v="88" actId="478"/>
-          <ac:spMkLst>
-            <pc:docMk/>
-            <pc:sldMk cId="2055881703" sldId="256"/>
-            <ac:spMk id="19" creationId="{ED7B6730-1CF2-937D-1A37-E2C449C10159}"/>
-          </ac:spMkLst>
-        </pc:spChg>
-        <pc:spChg chg="add del mod">
-          <ac:chgData name="Hemma Philamore" userId="db50e2f3-17b2-4cc0-b719-fb6254d3e9df" providerId="ADAL" clId="{35C0B9A2-A60C-57EC-AD9B-630767BE11FE}" dt="2025-11-20T10:40:14.519" v="139" actId="478"/>
-          <ac:spMkLst>
-            <pc:docMk/>
-            <pc:sldMk cId="2055881703" sldId="256"/>
-            <ac:spMk id="32" creationId="{A56F32D9-CEE9-06EA-BF9E-5E0E6FC24560}"/>
-          </ac:spMkLst>
-        </pc:spChg>
-        <pc:spChg chg="add del mod">
-          <ac:chgData name="Hemma Philamore" userId="db50e2f3-17b2-4cc0-b719-fb6254d3e9df" providerId="ADAL" clId="{35C0B9A2-A60C-57EC-AD9B-630767BE11FE}" dt="2025-11-20T10:37:53.542" v="118" actId="478"/>
-          <ac:spMkLst>
-            <pc:docMk/>
-            <pc:sldMk cId="2055881703" sldId="256"/>
-            <ac:spMk id="33" creationId="{9F1F3278-4FE4-80F5-97B1-811A551642A7}"/>
-          </ac:spMkLst>
-        </pc:spChg>
-        <pc:spChg chg="add del mod">
-          <ac:chgData name="Hemma Philamore" userId="db50e2f3-17b2-4cc0-b719-fb6254d3e9df" providerId="ADAL" clId="{35C0B9A2-A60C-57EC-AD9B-630767BE11FE}" dt="2025-11-20T10:40:13.372" v="138" actId="478"/>
-          <ac:spMkLst>
-            <pc:docMk/>
-            <pc:sldMk cId="2055881703" sldId="256"/>
-            <ac:spMk id="34" creationId="{F26B2745-6F0A-4A60-F9F4-C8DA3214BA25}"/>
           </ac:spMkLst>
         </pc:spChg>
         <pc:spChg chg="add mod">
@@ -338,54 +304,6 @@
             <ac:spMk id="54" creationId="{796BBBEF-DDD2-260A-6642-AAF99653D558}"/>
           </ac:spMkLst>
         </pc:spChg>
-        <pc:spChg chg="add del mod">
-          <ac:chgData name="Hemma Philamore" userId="db50e2f3-17b2-4cc0-b719-fb6254d3e9df" providerId="ADAL" clId="{35C0B9A2-A60C-57EC-AD9B-630767BE11FE}" dt="2025-11-20T10:49:50.120" v="446" actId="478"/>
-          <ac:spMkLst>
-            <pc:docMk/>
-            <pc:sldMk cId="2055881703" sldId="256"/>
-            <ac:spMk id="59" creationId="{7B29DEB3-6BC0-295F-F79F-AF8FBADBFFAB}"/>
-          </ac:spMkLst>
-        </pc:spChg>
-        <pc:spChg chg="add del mod">
-          <ac:chgData name="Hemma Philamore" userId="db50e2f3-17b2-4cc0-b719-fb6254d3e9df" providerId="ADAL" clId="{35C0B9A2-A60C-57EC-AD9B-630767BE11FE}" dt="2025-11-20T10:49:49.416" v="445" actId="478"/>
-          <ac:spMkLst>
-            <pc:docMk/>
-            <pc:sldMk cId="2055881703" sldId="256"/>
-            <ac:spMk id="60" creationId="{214D6DF2-6F54-FF7B-999F-A819EE36B124}"/>
-          </ac:spMkLst>
-        </pc:spChg>
-        <pc:spChg chg="add del mod">
-          <ac:chgData name="Hemma Philamore" userId="db50e2f3-17b2-4cc0-b719-fb6254d3e9df" providerId="ADAL" clId="{35C0B9A2-A60C-57EC-AD9B-630767BE11FE}" dt="2025-11-20T10:49:51.719" v="447" actId="478"/>
-          <ac:spMkLst>
-            <pc:docMk/>
-            <pc:sldMk cId="2055881703" sldId="256"/>
-            <ac:spMk id="61" creationId="{A3F822CF-0641-5B18-CAC7-5F4A8EEE6F0A}"/>
-          </ac:spMkLst>
-        </pc:spChg>
-        <pc:spChg chg="add del mod">
-          <ac:chgData name="Hemma Philamore" userId="db50e2f3-17b2-4cc0-b719-fb6254d3e9df" providerId="ADAL" clId="{35C0B9A2-A60C-57EC-AD9B-630767BE11FE}" dt="2025-11-20T10:50:17.122" v="455" actId="478"/>
-          <ac:spMkLst>
-            <pc:docMk/>
-            <pc:sldMk cId="2055881703" sldId="256"/>
-            <ac:spMk id="62" creationId="{8CDB7EC2-7383-9640-E965-EF8F9C1A993B}"/>
-          </ac:spMkLst>
-        </pc:spChg>
-        <pc:spChg chg="add del mod">
-          <ac:chgData name="Hemma Philamore" userId="db50e2f3-17b2-4cc0-b719-fb6254d3e9df" providerId="ADAL" clId="{35C0B9A2-A60C-57EC-AD9B-630767BE11FE}" dt="2025-11-20T10:50:12.362" v="451" actId="478"/>
-          <ac:spMkLst>
-            <pc:docMk/>
-            <pc:sldMk cId="2055881703" sldId="256"/>
-            <ac:spMk id="63" creationId="{B20C2DD7-AF40-70F6-F089-44C867C98942}"/>
-          </ac:spMkLst>
-        </pc:spChg>
-        <pc:spChg chg="add del mod">
-          <ac:chgData name="Hemma Philamore" userId="db50e2f3-17b2-4cc0-b719-fb6254d3e9df" providerId="ADAL" clId="{35C0B9A2-A60C-57EC-AD9B-630767BE11FE}" dt="2025-11-20T10:50:14.346" v="453" actId="478"/>
-          <ac:spMkLst>
-            <pc:docMk/>
-            <pc:sldMk cId="2055881703" sldId="256"/>
-            <ac:spMk id="65" creationId="{D3994704-9A75-6DF3-4121-992953C1AB1E}"/>
-          </ac:spMkLst>
-        </pc:spChg>
         <pc:spChg chg="add mod topLvl">
           <ac:chgData name="Hemma Philamore" userId="db50e2f3-17b2-4cc0-b719-fb6254d3e9df" providerId="ADAL" clId="{35C0B9A2-A60C-57EC-AD9B-630767BE11FE}" dt="2025-11-20T10:55:22.304" v="528" actId="164"/>
           <ac:spMkLst>
@@ -402,84 +320,12 @@
             <ac:spMk id="82" creationId="{755524AC-2D41-9852-186E-7B8DD8F65B97}"/>
           </ac:spMkLst>
         </pc:spChg>
-        <pc:spChg chg="add del mod topLvl">
-          <ac:chgData name="Hemma Philamore" userId="db50e2f3-17b2-4cc0-b719-fb6254d3e9df" providerId="ADAL" clId="{35C0B9A2-A60C-57EC-AD9B-630767BE11FE}" dt="2025-11-20T10:53:19.551" v="492" actId="478"/>
-          <ac:spMkLst>
-            <pc:docMk/>
-            <pc:sldMk cId="2055881703" sldId="256"/>
-            <ac:spMk id="83" creationId="{1546B056-62D2-64AD-258E-AD4237EF2920}"/>
-          </ac:spMkLst>
-        </pc:spChg>
         <pc:spChg chg="add mod topLvl">
           <ac:chgData name="Hemma Philamore" userId="db50e2f3-17b2-4cc0-b719-fb6254d3e9df" providerId="ADAL" clId="{35C0B9A2-A60C-57EC-AD9B-630767BE11FE}" dt="2025-11-20T10:55:22.304" v="528" actId="164"/>
           <ac:spMkLst>
             <pc:docMk/>
             <pc:sldMk cId="2055881703" sldId="256"/>
             <ac:spMk id="84" creationId="{5B6DD94F-1C69-5F0D-6BE3-AABE90845ED3}"/>
-          </ac:spMkLst>
-        </pc:spChg>
-        <pc:spChg chg="mod">
-          <ac:chgData name="Hemma Philamore" userId="db50e2f3-17b2-4cc0-b719-fb6254d3e9df" providerId="ADAL" clId="{35C0B9A2-A60C-57EC-AD9B-630767BE11FE}" dt="2025-11-20T10:51:52.878" v="474"/>
-          <ac:spMkLst>
-            <pc:docMk/>
-            <pc:sldMk cId="2055881703" sldId="256"/>
-            <ac:spMk id="88" creationId="{8CFEF838-639E-477E-0312-FA50C6E4C494}"/>
-          </ac:spMkLst>
-        </pc:spChg>
-        <pc:spChg chg="mod">
-          <ac:chgData name="Hemma Philamore" userId="db50e2f3-17b2-4cc0-b719-fb6254d3e9df" providerId="ADAL" clId="{35C0B9A2-A60C-57EC-AD9B-630767BE11FE}" dt="2025-11-20T10:51:52.878" v="474"/>
-          <ac:spMkLst>
-            <pc:docMk/>
-            <pc:sldMk cId="2055881703" sldId="256"/>
-            <ac:spMk id="89" creationId="{AE78285C-C1B2-3583-AA2F-481754D8D46C}"/>
-          </ac:spMkLst>
-        </pc:spChg>
-        <pc:spChg chg="mod">
-          <ac:chgData name="Hemma Philamore" userId="db50e2f3-17b2-4cc0-b719-fb6254d3e9df" providerId="ADAL" clId="{35C0B9A2-A60C-57EC-AD9B-630767BE11FE}" dt="2025-11-20T10:51:52.878" v="474"/>
-          <ac:spMkLst>
-            <pc:docMk/>
-            <pc:sldMk cId="2055881703" sldId="256"/>
-            <ac:spMk id="90" creationId="{3D93C3D0-3F4F-25A3-BA81-6380BA22FCEA}"/>
-          </ac:spMkLst>
-        </pc:spChg>
-        <pc:spChg chg="mod">
-          <ac:chgData name="Hemma Philamore" userId="db50e2f3-17b2-4cc0-b719-fb6254d3e9df" providerId="ADAL" clId="{35C0B9A2-A60C-57EC-AD9B-630767BE11FE}" dt="2025-11-20T10:51:52.878" v="474"/>
-          <ac:spMkLst>
-            <pc:docMk/>
-            <pc:sldMk cId="2055881703" sldId="256"/>
-            <ac:spMk id="91" creationId="{B3DF2B72-1C1C-03A4-C3F8-F2428E39D3C3}"/>
-          </ac:spMkLst>
-        </pc:spChg>
-        <pc:spChg chg="mod">
-          <ac:chgData name="Hemma Philamore" userId="db50e2f3-17b2-4cc0-b719-fb6254d3e9df" providerId="ADAL" clId="{35C0B9A2-A60C-57EC-AD9B-630767BE11FE}" dt="2025-11-20T10:51:56.513" v="476"/>
-          <ac:spMkLst>
-            <pc:docMk/>
-            <pc:sldMk cId="2055881703" sldId="256"/>
-            <ac:spMk id="96" creationId="{1F80B664-7C59-47F3-B801-603E04B68F82}"/>
-          </ac:spMkLst>
-        </pc:spChg>
-        <pc:spChg chg="mod">
-          <ac:chgData name="Hemma Philamore" userId="db50e2f3-17b2-4cc0-b719-fb6254d3e9df" providerId="ADAL" clId="{35C0B9A2-A60C-57EC-AD9B-630767BE11FE}" dt="2025-11-20T10:51:56.513" v="476"/>
-          <ac:spMkLst>
-            <pc:docMk/>
-            <pc:sldMk cId="2055881703" sldId="256"/>
-            <ac:spMk id="97" creationId="{0C9355C3-A9D3-DE89-09CA-96B3E29F699C}"/>
-          </ac:spMkLst>
-        </pc:spChg>
-        <pc:spChg chg="mod">
-          <ac:chgData name="Hemma Philamore" userId="db50e2f3-17b2-4cc0-b719-fb6254d3e9df" providerId="ADAL" clId="{35C0B9A2-A60C-57EC-AD9B-630767BE11FE}" dt="2025-11-20T10:51:56.513" v="476"/>
-          <ac:spMkLst>
-            <pc:docMk/>
-            <pc:sldMk cId="2055881703" sldId="256"/>
-            <ac:spMk id="98" creationId="{C6C4BA6A-3B7A-B9F3-FF9D-838453F9554C}"/>
-          </ac:spMkLst>
-        </pc:spChg>
-        <pc:spChg chg="mod">
-          <ac:chgData name="Hemma Philamore" userId="db50e2f3-17b2-4cc0-b719-fb6254d3e9df" providerId="ADAL" clId="{35C0B9A2-A60C-57EC-AD9B-630767BE11FE}" dt="2025-11-20T10:51:56.513" v="476"/>
-          <ac:spMkLst>
-            <pc:docMk/>
-            <pc:sldMk cId="2055881703" sldId="256"/>
-            <ac:spMk id="99" creationId="{CF2DFED7-8EE0-3461-BD32-DB45CDBC762C}"/>
           </ac:spMkLst>
         </pc:spChg>
         <pc:spChg chg="add mod">
@@ -496,14 +342,6 @@
             <pc:docMk/>
             <pc:sldMk cId="2055881703" sldId="256"/>
             <ac:spMk id="106" creationId="{5A82E9F3-14D7-1A03-66CB-2293CA26106B}"/>
-          </ac:spMkLst>
-        </pc:spChg>
-        <pc:spChg chg="add del mod">
-          <ac:chgData name="Hemma Philamore" userId="db50e2f3-17b2-4cc0-b719-fb6254d3e9df" providerId="ADAL" clId="{35C0B9A2-A60C-57EC-AD9B-630767BE11FE}" dt="2025-11-20T10:54:46.247" v="517" actId="478"/>
-          <ac:spMkLst>
-            <pc:docMk/>
-            <pc:sldMk cId="2055881703" sldId="256"/>
-            <ac:spMk id="107" creationId="{3FA29D11-8964-5D5A-9D38-712F9DD33802}"/>
           </ac:spMkLst>
         </pc:spChg>
         <pc:spChg chg="add mod">
@@ -640,14 +478,6 @@
             <pc:docMk/>
             <pc:sldMk cId="2055881703" sldId="256"/>
             <ac:spMk id="149" creationId="{18B7952A-65FE-3155-F900-858FFFE37391}"/>
-          </ac:spMkLst>
-        </pc:spChg>
-        <pc:spChg chg="add del mod">
-          <ac:chgData name="Hemma Philamore" userId="db50e2f3-17b2-4cc0-b719-fb6254d3e9df" providerId="ADAL" clId="{35C0B9A2-A60C-57EC-AD9B-630767BE11FE}" dt="2025-11-20T11:02:18.962" v="649" actId="478"/>
-          <ac:spMkLst>
-            <pc:docMk/>
-            <pc:sldMk cId="2055881703" sldId="256"/>
-            <ac:spMk id="157" creationId="{97C76C4D-8030-ED8D-EB39-B85D69263710}"/>
           </ac:spMkLst>
         </pc:spChg>
         <pc:spChg chg="add mod">
@@ -938,86 +768,6 @@
             <ac:grpSpMk id="68" creationId="{EEA1CA30-B8FB-FE68-CEE3-E7126C2431BD}"/>
           </ac:grpSpMkLst>
         </pc:grpChg>
-        <pc:grpChg chg="add del mod">
-          <ac:chgData name="Hemma Philamore" userId="db50e2f3-17b2-4cc0-b719-fb6254d3e9df" providerId="ADAL" clId="{35C0B9A2-A60C-57EC-AD9B-630767BE11FE}" dt="2025-11-20T10:58:21.410" v="587" actId="478"/>
-          <ac:grpSpMkLst>
-            <pc:docMk/>
-            <pc:sldMk cId="2055881703" sldId="256"/>
-            <ac:grpSpMk id="69" creationId="{286E84BA-A5E6-613E-BD0D-03237C6EF9A7}"/>
-          </ac:grpSpMkLst>
-        </pc:grpChg>
-        <pc:grpChg chg="add del mod">
-          <ac:chgData name="Hemma Philamore" userId="db50e2f3-17b2-4cc0-b719-fb6254d3e9df" providerId="ADAL" clId="{35C0B9A2-A60C-57EC-AD9B-630767BE11FE}" dt="2025-11-20T10:58:20.746" v="586" actId="478"/>
-          <ac:grpSpMkLst>
-            <pc:docMk/>
-            <pc:sldMk cId="2055881703" sldId="256"/>
-            <ac:grpSpMk id="72" creationId="{4A481B30-4E74-8CC6-C04A-E79707CC7FD8}"/>
-          </ac:grpSpMkLst>
-        </pc:grpChg>
-        <pc:grpChg chg="add del mod">
-          <ac:chgData name="Hemma Philamore" userId="db50e2f3-17b2-4cc0-b719-fb6254d3e9df" providerId="ADAL" clId="{35C0B9A2-A60C-57EC-AD9B-630767BE11FE}" dt="2025-11-20T10:58:20.085" v="585" actId="478"/>
-          <ac:grpSpMkLst>
-            <pc:docMk/>
-            <pc:sldMk cId="2055881703" sldId="256"/>
-            <ac:grpSpMk id="75" creationId="{FBD83005-F293-05C5-FE6F-0CDCE92F8155}"/>
-          </ac:grpSpMkLst>
-        </pc:grpChg>
-        <pc:grpChg chg="add del mod topLvl">
-          <ac:chgData name="Hemma Philamore" userId="db50e2f3-17b2-4cc0-b719-fb6254d3e9df" providerId="ADAL" clId="{35C0B9A2-A60C-57EC-AD9B-630767BE11FE}" dt="2025-11-20T10:53:30.730" v="494" actId="165"/>
-          <ac:grpSpMkLst>
-            <pc:docMk/>
-            <pc:sldMk cId="2055881703" sldId="256"/>
-            <ac:grpSpMk id="78" creationId="{FAC83208-ED5B-FAE7-F87D-8B3181C445D7}"/>
-          </ac:grpSpMkLst>
-        </pc:grpChg>
-        <pc:grpChg chg="add del mod">
-          <ac:chgData name="Hemma Philamore" userId="db50e2f3-17b2-4cc0-b719-fb6254d3e9df" providerId="ADAL" clId="{35C0B9A2-A60C-57EC-AD9B-630767BE11FE}" dt="2025-11-20T10:52:07.209" v="478" actId="165"/>
-          <ac:grpSpMkLst>
-            <pc:docMk/>
-            <pc:sldMk cId="2055881703" sldId="256"/>
-            <ac:grpSpMk id="85" creationId="{5E46178F-8ED9-52FF-3BF2-01C9CE60A2C0}"/>
-          </ac:grpSpMkLst>
-        </pc:grpChg>
-        <pc:grpChg chg="add del mod">
-          <ac:chgData name="Hemma Philamore" userId="db50e2f3-17b2-4cc0-b719-fb6254d3e9df" providerId="ADAL" clId="{35C0B9A2-A60C-57EC-AD9B-630767BE11FE}" dt="2025-11-20T10:53:00.763" v="488" actId="478"/>
-          <ac:grpSpMkLst>
-            <pc:docMk/>
-            <pc:sldMk cId="2055881703" sldId="256"/>
-            <ac:grpSpMk id="86" creationId="{1A19B633-8089-8BAF-8DFD-E88F06FC9CE1}"/>
-          </ac:grpSpMkLst>
-        </pc:grpChg>
-        <pc:grpChg chg="mod">
-          <ac:chgData name="Hemma Philamore" userId="db50e2f3-17b2-4cc0-b719-fb6254d3e9df" providerId="ADAL" clId="{35C0B9A2-A60C-57EC-AD9B-630767BE11FE}" dt="2025-11-20T10:51:52.878" v="474"/>
-          <ac:grpSpMkLst>
-            <pc:docMk/>
-            <pc:sldMk cId="2055881703" sldId="256"/>
-            <ac:grpSpMk id="87" creationId="{F5F74216-9E26-B9FB-0994-658FC4B22973}"/>
-          </ac:grpSpMkLst>
-        </pc:grpChg>
-        <pc:grpChg chg="add del mod">
-          <ac:chgData name="Hemma Philamore" userId="db50e2f3-17b2-4cc0-b719-fb6254d3e9df" providerId="ADAL" clId="{35C0B9A2-A60C-57EC-AD9B-630767BE11FE}" dt="2025-11-20T10:53:01.997" v="489" actId="478"/>
-          <ac:grpSpMkLst>
-            <pc:docMk/>
-            <pc:sldMk cId="2055881703" sldId="256"/>
-            <ac:grpSpMk id="94" creationId="{690FEAAF-B471-2F8A-D99C-3165CD93A3B9}"/>
-          </ac:grpSpMkLst>
-        </pc:grpChg>
-        <pc:grpChg chg="mod">
-          <ac:chgData name="Hemma Philamore" userId="db50e2f3-17b2-4cc0-b719-fb6254d3e9df" providerId="ADAL" clId="{35C0B9A2-A60C-57EC-AD9B-630767BE11FE}" dt="2025-11-20T10:51:56.513" v="476"/>
-          <ac:grpSpMkLst>
-            <pc:docMk/>
-            <pc:sldMk cId="2055881703" sldId="256"/>
-            <ac:grpSpMk id="95" creationId="{57C0CEF4-2358-BAF0-0D7E-72FC7B81BB2C}"/>
-          </ac:grpSpMkLst>
-        </pc:grpChg>
-        <pc:grpChg chg="add del mod">
-          <ac:chgData name="Hemma Philamore" userId="db50e2f3-17b2-4cc0-b719-fb6254d3e9df" providerId="ADAL" clId="{35C0B9A2-A60C-57EC-AD9B-630767BE11FE}" dt="2025-11-20T10:54:44.407" v="515" actId="478"/>
-          <ac:grpSpMkLst>
-            <pc:docMk/>
-            <pc:sldMk cId="2055881703" sldId="256"/>
-            <ac:grpSpMk id="102" creationId="{ECAD2C37-9BF9-7EF4-C860-77E79437D0D2}"/>
-          </ac:grpSpMkLst>
-        </pc:grpChg>
         <pc:grpChg chg="add mod">
           <ac:chgData name="Hemma Philamore" userId="db50e2f3-17b2-4cc0-b719-fb6254d3e9df" providerId="ADAL" clId="{35C0B9A2-A60C-57EC-AD9B-630767BE11FE}" dt="2025-11-20T10:55:33.903" v="532" actId="1076"/>
           <ac:grpSpMkLst>
@@ -1058,14 +808,6 @@
             <ac:grpSpMk id="191" creationId="{D0DB04B9-3774-E353-ED89-26BC7CB0789D}"/>
           </ac:grpSpMkLst>
         </pc:grpChg>
-        <pc:grpChg chg="add del mod">
-          <ac:chgData name="Hemma Philamore" userId="db50e2f3-17b2-4cc0-b719-fb6254d3e9df" providerId="ADAL" clId="{35C0B9A2-A60C-57EC-AD9B-630767BE11FE}" dt="2025-11-20T11:16:40.250" v="769" actId="165"/>
-          <ac:grpSpMkLst>
-            <pc:docMk/>
-            <pc:sldMk cId="2055881703" sldId="256"/>
-            <ac:grpSpMk id="194" creationId="{08414F98-E93D-6B1D-227C-BB56A9372591}"/>
-          </ac:grpSpMkLst>
-        </pc:grpChg>
         <pc:grpChg chg="add mod">
           <ac:chgData name="Hemma Philamore" userId="db50e2f3-17b2-4cc0-b719-fb6254d3e9df" providerId="ADAL" clId="{35C0B9A2-A60C-57EC-AD9B-630767BE11FE}" dt="2025-11-20T11:17:02.099" v="777" actId="1076"/>
           <ac:grpSpMkLst>
@@ -1090,54 +832,6 @@
             <ac:picMk id="11" creationId="{7108C697-452B-18F4-0A68-07969A8A41FE}"/>
           </ac:picMkLst>
         </pc:picChg>
-        <pc:picChg chg="add del mod">
-          <ac:chgData name="Hemma Philamore" userId="db50e2f3-17b2-4cc0-b719-fb6254d3e9df" providerId="ADAL" clId="{35C0B9A2-A60C-57EC-AD9B-630767BE11FE}" dt="2025-11-20T10:50:09.866" v="450" actId="478"/>
-          <ac:picMkLst>
-            <pc:docMk/>
-            <pc:sldMk cId="2055881703" sldId="256"/>
-            <ac:picMk id="55" creationId="{413CCF69-B9B8-C3FA-200C-D95B7756D02B}"/>
-          </ac:picMkLst>
-        </pc:picChg>
-        <pc:cxnChg chg="add del mod">
-          <ac:chgData name="Hemma Philamore" userId="db50e2f3-17b2-4cc0-b719-fb6254d3e9df" providerId="ADAL" clId="{35C0B9A2-A60C-57EC-AD9B-630767BE11FE}" dt="2025-11-20T10:32:26.080" v="42" actId="478"/>
-          <ac:cxnSpMkLst>
-            <pc:docMk/>
-            <pc:sldMk cId="2055881703" sldId="256"/>
-            <ac:cxnSpMk id="13" creationId="{D7B36D1E-88A7-1052-C3DA-CA876832D45F}"/>
-          </ac:cxnSpMkLst>
-        </pc:cxnChg>
-        <pc:cxnChg chg="add del mod">
-          <ac:chgData name="Hemma Philamore" userId="db50e2f3-17b2-4cc0-b719-fb6254d3e9df" providerId="ADAL" clId="{35C0B9A2-A60C-57EC-AD9B-630767BE11FE}" dt="2025-11-20T10:32:27.756" v="44" actId="478"/>
-          <ac:cxnSpMkLst>
-            <pc:docMk/>
-            <pc:sldMk cId="2055881703" sldId="256"/>
-            <ac:cxnSpMk id="14" creationId="{7F2EB04A-A2A2-2C56-4E1B-209E62310FC2}"/>
-          </ac:cxnSpMkLst>
-        </pc:cxnChg>
-        <pc:cxnChg chg="add del mod">
-          <ac:chgData name="Hemma Philamore" userId="db50e2f3-17b2-4cc0-b719-fb6254d3e9df" providerId="ADAL" clId="{35C0B9A2-A60C-57EC-AD9B-630767BE11FE}" dt="2025-11-20T10:32:27.292" v="43" actId="478"/>
-          <ac:cxnSpMkLst>
-            <pc:docMk/>
-            <pc:sldMk cId="2055881703" sldId="256"/>
-            <ac:cxnSpMk id="16" creationId="{54D5B968-0515-EF49-B44A-A4257084ECC6}"/>
-          </ac:cxnSpMkLst>
-        </pc:cxnChg>
-        <pc:cxnChg chg="add del mod">
-          <ac:chgData name="Hemma Philamore" userId="db50e2f3-17b2-4cc0-b719-fb6254d3e9df" providerId="ADAL" clId="{35C0B9A2-A60C-57EC-AD9B-630767BE11FE}" dt="2025-11-20T10:34:13.541" v="71" actId="11529"/>
-          <ac:cxnSpMkLst>
-            <pc:docMk/>
-            <pc:sldMk cId="2055881703" sldId="256"/>
-            <ac:cxnSpMk id="21" creationId="{89A109B6-264C-60DE-D49A-BDEA50CEBE4F}"/>
-          </ac:cxnSpMkLst>
-        </pc:cxnChg>
-        <pc:cxnChg chg="add del mod">
-          <ac:chgData name="Hemma Philamore" userId="db50e2f3-17b2-4cc0-b719-fb6254d3e9df" providerId="ADAL" clId="{35C0B9A2-A60C-57EC-AD9B-630767BE11FE}" dt="2025-11-20T10:34:13.157" v="70" actId="11529"/>
-          <ac:cxnSpMkLst>
-            <pc:docMk/>
-            <pc:sldMk cId="2055881703" sldId="256"/>
-            <ac:cxnSpMk id="23" creationId="{999AB47E-2DFE-086B-77A8-029749C5052C}"/>
-          </ac:cxnSpMkLst>
-        </pc:cxnChg>
         <pc:cxnChg chg="add mod">
           <ac:chgData name="Hemma Philamore" userId="db50e2f3-17b2-4cc0-b719-fb6254d3e9df" providerId="ADAL" clId="{35C0B9A2-A60C-57EC-AD9B-630767BE11FE}" dt="2025-11-20T11:15:26.553" v="734" actId="1076"/>
           <ac:cxnSpMkLst>
@@ -1162,22 +856,6 @@
             <ac:cxnSpMk id="29" creationId="{CB206A3C-028A-6A69-9951-0FB7A3B526DB}"/>
           </ac:cxnSpMkLst>
         </pc:cxnChg>
-        <pc:cxnChg chg="add del mod">
-          <ac:chgData name="Hemma Philamore" userId="db50e2f3-17b2-4cc0-b719-fb6254d3e9df" providerId="ADAL" clId="{35C0B9A2-A60C-57EC-AD9B-630767BE11FE}" dt="2025-11-20T10:46:57.730" v="380" actId="478"/>
-          <ac:cxnSpMkLst>
-            <pc:docMk/>
-            <pc:sldMk cId="2055881703" sldId="256"/>
-            <ac:cxnSpMk id="41" creationId="{EB801AB0-4215-78D6-37C9-F159A67B1AFC}"/>
-          </ac:cxnSpMkLst>
-        </pc:cxnChg>
-        <pc:cxnChg chg="add del mod">
-          <ac:chgData name="Hemma Philamore" userId="db50e2f3-17b2-4cc0-b719-fb6254d3e9df" providerId="ADAL" clId="{35C0B9A2-A60C-57EC-AD9B-630767BE11FE}" dt="2025-11-20T10:46:59.472" v="381" actId="478"/>
-          <ac:cxnSpMkLst>
-            <pc:docMk/>
-            <pc:sldMk cId="2055881703" sldId="256"/>
-            <ac:cxnSpMk id="44" creationId="{577EF17E-8A13-6DC9-6FC5-BF9E766B2D66}"/>
-          </ac:cxnSpMkLst>
-        </pc:cxnChg>
         <pc:cxnChg chg="add mod">
           <ac:chgData name="Hemma Philamore" userId="db50e2f3-17b2-4cc0-b719-fb6254d3e9df" providerId="ADAL" clId="{35C0B9A2-A60C-57EC-AD9B-630767BE11FE}" dt="2025-11-20T10:48:13.639" v="406" actId="692"/>
           <ac:cxnSpMkLst>
@@ -1194,30 +872,6 @@
             <ac:cxnSpMk id="56" creationId="{366D8118-2718-AAA8-38A7-83275575D318}"/>
           </ac:cxnSpMkLst>
         </pc:cxnChg>
-        <pc:cxnChg chg="add del mod">
-          <ac:chgData name="Hemma Philamore" userId="db50e2f3-17b2-4cc0-b719-fb6254d3e9df" providerId="ADAL" clId="{35C0B9A2-A60C-57EC-AD9B-630767BE11FE}" dt="2025-11-20T10:49:48.348" v="444" actId="478"/>
-          <ac:cxnSpMkLst>
-            <pc:docMk/>
-            <pc:sldMk cId="2055881703" sldId="256"/>
-            <ac:cxnSpMk id="57" creationId="{D30B195A-439B-956F-54BF-9C2087DF5A26}"/>
-          </ac:cxnSpMkLst>
-        </pc:cxnChg>
-        <pc:cxnChg chg="add del mod">
-          <ac:chgData name="Hemma Philamore" userId="db50e2f3-17b2-4cc0-b719-fb6254d3e9df" providerId="ADAL" clId="{35C0B9A2-A60C-57EC-AD9B-630767BE11FE}" dt="2025-11-20T10:49:47.319" v="443" actId="478"/>
-          <ac:cxnSpMkLst>
-            <pc:docMk/>
-            <pc:sldMk cId="2055881703" sldId="256"/>
-            <ac:cxnSpMk id="58" creationId="{24627312-FBF2-A73B-ED3C-7FA68DB17433}"/>
-          </ac:cxnSpMkLst>
-        </pc:cxnChg>
-        <pc:cxnChg chg="del">
-          <ac:chgData name="Hemma Philamore" userId="db50e2f3-17b2-4cc0-b719-fb6254d3e9df" providerId="ADAL" clId="{35C0B9A2-A60C-57EC-AD9B-630767BE11FE}" dt="2025-11-20T10:50:15.481" v="454" actId="478"/>
-          <ac:cxnSpMkLst>
-            <pc:docMk/>
-            <pc:sldMk cId="2055881703" sldId="256"/>
-            <ac:cxnSpMk id="64" creationId="{4ABBD524-FE8B-1AEA-F423-625A6B82B344}"/>
-          </ac:cxnSpMkLst>
-        </pc:cxnChg>
         <pc:cxnChg chg="add mod">
           <ac:chgData name="Hemma Philamore" userId="db50e2f3-17b2-4cc0-b719-fb6254d3e9df" providerId="ADAL" clId="{35C0B9A2-A60C-57EC-AD9B-630767BE11FE}" dt="2025-11-20T10:50:40.617" v="456" actId="164"/>
           <ac:cxnSpMkLst>
@@ -1226,116 +880,12 @@
             <ac:cxnSpMk id="67" creationId="{00C822D5-2BC3-CD28-1168-BB36C2CAABCA}"/>
           </ac:cxnSpMkLst>
         </pc:cxnChg>
-        <pc:cxnChg chg="mod">
-          <ac:chgData name="Hemma Philamore" userId="db50e2f3-17b2-4cc0-b719-fb6254d3e9df" providerId="ADAL" clId="{35C0B9A2-A60C-57EC-AD9B-630767BE11FE}" dt="2025-11-20T10:50:57.959" v="457"/>
-          <ac:cxnSpMkLst>
-            <pc:docMk/>
-            <pc:sldMk cId="2055881703" sldId="256"/>
-            <ac:cxnSpMk id="70" creationId="{8E2CB805-3F6F-787A-5236-85EC132578A8}"/>
-          </ac:cxnSpMkLst>
-        </pc:cxnChg>
-        <pc:cxnChg chg="mod">
-          <ac:chgData name="Hemma Philamore" userId="db50e2f3-17b2-4cc0-b719-fb6254d3e9df" providerId="ADAL" clId="{35C0B9A2-A60C-57EC-AD9B-630767BE11FE}" dt="2025-11-20T10:50:57.959" v="457"/>
-          <ac:cxnSpMkLst>
-            <pc:docMk/>
-            <pc:sldMk cId="2055881703" sldId="256"/>
-            <ac:cxnSpMk id="71" creationId="{9E5B849C-7677-3560-137B-67C54A363687}"/>
-          </ac:cxnSpMkLst>
-        </pc:cxnChg>
-        <pc:cxnChg chg="mod">
-          <ac:chgData name="Hemma Philamore" userId="db50e2f3-17b2-4cc0-b719-fb6254d3e9df" providerId="ADAL" clId="{35C0B9A2-A60C-57EC-AD9B-630767BE11FE}" dt="2025-11-20T10:50:58.365" v="458"/>
-          <ac:cxnSpMkLst>
-            <pc:docMk/>
-            <pc:sldMk cId="2055881703" sldId="256"/>
-            <ac:cxnSpMk id="73" creationId="{5E23EF09-1DAA-5DB8-703B-8A045FDC8AFF}"/>
-          </ac:cxnSpMkLst>
-        </pc:cxnChg>
-        <pc:cxnChg chg="mod">
-          <ac:chgData name="Hemma Philamore" userId="db50e2f3-17b2-4cc0-b719-fb6254d3e9df" providerId="ADAL" clId="{35C0B9A2-A60C-57EC-AD9B-630767BE11FE}" dt="2025-11-20T10:50:58.365" v="458"/>
-          <ac:cxnSpMkLst>
-            <pc:docMk/>
-            <pc:sldMk cId="2055881703" sldId="256"/>
-            <ac:cxnSpMk id="74" creationId="{3CA48C36-D65A-7482-49C0-C8E7EB0F80B9}"/>
-          </ac:cxnSpMkLst>
-        </pc:cxnChg>
-        <pc:cxnChg chg="mod">
-          <ac:chgData name="Hemma Philamore" userId="db50e2f3-17b2-4cc0-b719-fb6254d3e9df" providerId="ADAL" clId="{35C0B9A2-A60C-57EC-AD9B-630767BE11FE}" dt="2025-11-20T10:50:58.798" v="459"/>
-          <ac:cxnSpMkLst>
-            <pc:docMk/>
-            <pc:sldMk cId="2055881703" sldId="256"/>
-            <ac:cxnSpMk id="76" creationId="{5529DA44-F22C-6A98-E5A2-FA99B81CDA02}"/>
-          </ac:cxnSpMkLst>
-        </pc:cxnChg>
-        <pc:cxnChg chg="mod">
-          <ac:chgData name="Hemma Philamore" userId="db50e2f3-17b2-4cc0-b719-fb6254d3e9df" providerId="ADAL" clId="{35C0B9A2-A60C-57EC-AD9B-630767BE11FE}" dt="2025-11-20T10:50:58.798" v="459"/>
-          <ac:cxnSpMkLst>
-            <pc:docMk/>
-            <pc:sldMk cId="2055881703" sldId="256"/>
-            <ac:cxnSpMk id="77" creationId="{1114AD4F-40A6-7F1B-0FFA-B4571FD033A3}"/>
-          </ac:cxnSpMkLst>
-        </pc:cxnChg>
         <pc:cxnChg chg="mod topLvl">
           <ac:chgData name="Hemma Philamore" userId="db50e2f3-17b2-4cc0-b719-fb6254d3e9df" providerId="ADAL" clId="{35C0B9A2-A60C-57EC-AD9B-630767BE11FE}" dt="2025-11-20T10:55:22.304" v="528" actId="164"/>
           <ac:cxnSpMkLst>
             <pc:docMk/>
             <pc:sldMk cId="2055881703" sldId="256"/>
             <ac:cxnSpMk id="79" creationId="{B9B60649-FEB6-60E8-713C-4CF2679B967C}"/>
-          </ac:cxnSpMkLst>
-        </pc:cxnChg>
-        <pc:cxnChg chg="del mod topLvl">
-          <ac:chgData name="Hemma Philamore" userId="db50e2f3-17b2-4cc0-b719-fb6254d3e9df" providerId="ADAL" clId="{35C0B9A2-A60C-57EC-AD9B-630767BE11FE}" dt="2025-11-20T10:54:18.405" v="506" actId="478"/>
-          <ac:cxnSpMkLst>
-            <pc:docMk/>
-            <pc:sldMk cId="2055881703" sldId="256"/>
-            <ac:cxnSpMk id="80" creationId="{2E2F0708-331A-FE52-1F41-B2D4692FC0B4}"/>
-          </ac:cxnSpMkLst>
-        </pc:cxnChg>
-        <pc:cxnChg chg="mod">
-          <ac:chgData name="Hemma Philamore" userId="db50e2f3-17b2-4cc0-b719-fb6254d3e9df" providerId="ADAL" clId="{35C0B9A2-A60C-57EC-AD9B-630767BE11FE}" dt="2025-11-20T10:51:52.878" v="474"/>
-          <ac:cxnSpMkLst>
-            <pc:docMk/>
-            <pc:sldMk cId="2055881703" sldId="256"/>
-            <ac:cxnSpMk id="92" creationId="{08956005-0D8B-582C-F23A-35E7BFC4ED55}"/>
-          </ac:cxnSpMkLst>
-        </pc:cxnChg>
-        <pc:cxnChg chg="mod">
-          <ac:chgData name="Hemma Philamore" userId="db50e2f3-17b2-4cc0-b719-fb6254d3e9df" providerId="ADAL" clId="{35C0B9A2-A60C-57EC-AD9B-630767BE11FE}" dt="2025-11-20T10:51:52.878" v="474"/>
-          <ac:cxnSpMkLst>
-            <pc:docMk/>
-            <pc:sldMk cId="2055881703" sldId="256"/>
-            <ac:cxnSpMk id="93" creationId="{7AE81C34-BF92-9E33-6103-3FE7E6278ACF}"/>
-          </ac:cxnSpMkLst>
-        </pc:cxnChg>
-        <pc:cxnChg chg="mod">
-          <ac:chgData name="Hemma Philamore" userId="db50e2f3-17b2-4cc0-b719-fb6254d3e9df" providerId="ADAL" clId="{35C0B9A2-A60C-57EC-AD9B-630767BE11FE}" dt="2025-11-20T10:51:56.513" v="476"/>
-          <ac:cxnSpMkLst>
-            <pc:docMk/>
-            <pc:sldMk cId="2055881703" sldId="256"/>
-            <ac:cxnSpMk id="100" creationId="{505B6C6F-E9CB-A131-6619-D2FA562F0BF2}"/>
-          </ac:cxnSpMkLst>
-        </pc:cxnChg>
-        <pc:cxnChg chg="mod">
-          <ac:chgData name="Hemma Philamore" userId="db50e2f3-17b2-4cc0-b719-fb6254d3e9df" providerId="ADAL" clId="{35C0B9A2-A60C-57EC-AD9B-630767BE11FE}" dt="2025-11-20T10:51:56.513" v="476"/>
-          <ac:cxnSpMkLst>
-            <pc:docMk/>
-            <pc:sldMk cId="2055881703" sldId="256"/>
-            <ac:cxnSpMk id="101" creationId="{7E7D0B9F-4B8F-692B-F78F-19D3331EE335}"/>
-          </ac:cxnSpMkLst>
-        </pc:cxnChg>
-        <pc:cxnChg chg="del mod topLvl">
-          <ac:chgData name="Hemma Philamore" userId="db50e2f3-17b2-4cc0-b719-fb6254d3e9df" providerId="ADAL" clId="{35C0B9A2-A60C-57EC-AD9B-630767BE11FE}" dt="2025-11-20T10:54:44.407" v="515" actId="478"/>
-          <ac:cxnSpMkLst>
-            <pc:docMk/>
-            <pc:sldMk cId="2055881703" sldId="256"/>
-            <ac:cxnSpMk id="103" creationId="{29A6C44A-32A7-3A11-55C4-091C14FAB6B6}"/>
-          </ac:cxnSpMkLst>
-        </pc:cxnChg>
-        <pc:cxnChg chg="del mod topLvl">
-          <ac:chgData name="Hemma Philamore" userId="db50e2f3-17b2-4cc0-b719-fb6254d3e9df" providerId="ADAL" clId="{35C0B9A2-A60C-57EC-AD9B-630767BE11FE}" dt="2025-11-20T10:54:45.094" v="516" actId="478"/>
-          <ac:cxnSpMkLst>
-            <pc:docMk/>
-            <pc:sldMk cId="2055881703" sldId="256"/>
-            <ac:cxnSpMk id="104" creationId="{52BBA10A-21FA-CFD4-7A2F-71E09310B0E2}"/>
           </ac:cxnSpMkLst>
         </pc:cxnChg>
         <pc:cxnChg chg="add mod">
@@ -1392,30 +942,6 @@
             <pc:docMk/>
             <pc:sldMk cId="2055881703" sldId="256"/>
             <ac:cxnSpMk id="136" creationId="{A69A49EA-3D86-56C9-C3E0-048AD3BB55B9}"/>
-          </ac:cxnSpMkLst>
-        </pc:cxnChg>
-        <pc:cxnChg chg="add del mod">
-          <ac:chgData name="Hemma Philamore" userId="db50e2f3-17b2-4cc0-b719-fb6254d3e9df" providerId="ADAL" clId="{35C0B9A2-A60C-57EC-AD9B-630767BE11FE}" dt="2025-11-20T11:01:22.910" v="635" actId="478"/>
-          <ac:cxnSpMkLst>
-            <pc:docMk/>
-            <pc:sldMk cId="2055881703" sldId="256"/>
-            <ac:cxnSpMk id="151" creationId="{9E1AA743-DCB2-7424-BD80-E4070790B738}"/>
-          </ac:cxnSpMkLst>
-        </pc:cxnChg>
-        <pc:cxnChg chg="add del mod">
-          <ac:chgData name="Hemma Philamore" userId="db50e2f3-17b2-4cc0-b719-fb6254d3e9df" providerId="ADAL" clId="{35C0B9A2-A60C-57EC-AD9B-630767BE11FE}" dt="2025-11-20T11:01:23.598" v="636" actId="478"/>
-          <ac:cxnSpMkLst>
-            <pc:docMk/>
-            <pc:sldMk cId="2055881703" sldId="256"/>
-            <ac:cxnSpMk id="153" creationId="{7E729C39-DFD5-EB77-2D02-0088F6AC8E6E}"/>
-          </ac:cxnSpMkLst>
-        </pc:cxnChg>
-        <pc:cxnChg chg="add del mod">
-          <ac:chgData name="Hemma Philamore" userId="db50e2f3-17b2-4cc0-b719-fb6254d3e9df" providerId="ADAL" clId="{35C0B9A2-A60C-57EC-AD9B-630767BE11FE}" dt="2025-11-20T11:01:24.326" v="637" actId="478"/>
-          <ac:cxnSpMkLst>
-            <pc:docMk/>
-            <pc:sldMk cId="2055881703" sldId="256"/>
-            <ac:cxnSpMk id="155" creationId="{0AE5C6F3-F126-BCA9-524A-9D65C98338D7}"/>
           </ac:cxnSpMkLst>
         </pc:cxnChg>
         <pc:cxnChg chg="mod">
@@ -1660,7 +1186,7 @@
           <a:p>
             <a:fld id="{24C539BA-54A7-0D48-93B9-3DB7468E8C1A}" type="datetimeFigureOut">
               <a:rPr lang="en-US" smtClean="0"/>
-              <a:t>11/20/25</a:t>
+              <a:t>11/25/25</a:t>
             </a:fld>
             <a:endParaRPr lang="en-US"/>
           </a:p>
@@ -1860,7 +1386,7 @@
           <a:p>
             <a:fld id="{24C539BA-54A7-0D48-93B9-3DB7468E8C1A}" type="datetimeFigureOut">
               <a:rPr lang="en-US" smtClean="0"/>
-              <a:t>11/20/25</a:t>
+              <a:t>11/25/25</a:t>
             </a:fld>
             <a:endParaRPr lang="en-US"/>
           </a:p>
@@ -2070,7 +1596,7 @@
           <a:p>
             <a:fld id="{24C539BA-54A7-0D48-93B9-3DB7468E8C1A}" type="datetimeFigureOut">
               <a:rPr lang="en-US" smtClean="0"/>
-              <a:t>11/20/25</a:t>
+              <a:t>11/25/25</a:t>
             </a:fld>
             <a:endParaRPr lang="en-US"/>
           </a:p>
@@ -2270,7 +1796,7 @@
           <a:p>
             <a:fld id="{24C539BA-54A7-0D48-93B9-3DB7468E8C1A}" type="datetimeFigureOut">
               <a:rPr lang="en-US" smtClean="0"/>
-              <a:t>11/20/25</a:t>
+              <a:t>11/25/25</a:t>
             </a:fld>
             <a:endParaRPr lang="en-US"/>
           </a:p>
@@ -2546,7 +2072,7 @@
           <a:p>
             <a:fld id="{24C539BA-54A7-0D48-93B9-3DB7468E8C1A}" type="datetimeFigureOut">
               <a:rPr lang="en-US" smtClean="0"/>
-              <a:t>11/20/25</a:t>
+              <a:t>11/25/25</a:t>
             </a:fld>
             <a:endParaRPr lang="en-US"/>
           </a:p>
@@ -2814,7 +2340,7 @@
           <a:p>
             <a:fld id="{24C539BA-54A7-0D48-93B9-3DB7468E8C1A}" type="datetimeFigureOut">
               <a:rPr lang="en-US" smtClean="0"/>
-              <a:t>11/20/25</a:t>
+              <a:t>11/25/25</a:t>
             </a:fld>
             <a:endParaRPr lang="en-US"/>
           </a:p>
@@ -3229,7 +2755,7 @@
           <a:p>
             <a:fld id="{24C539BA-54A7-0D48-93B9-3DB7468E8C1A}" type="datetimeFigureOut">
               <a:rPr lang="en-US" smtClean="0"/>
-              <a:t>11/20/25</a:t>
+              <a:t>11/25/25</a:t>
             </a:fld>
             <a:endParaRPr lang="en-US"/>
           </a:p>
@@ -3371,7 +2897,7 @@
           <a:p>
             <a:fld id="{24C539BA-54A7-0D48-93B9-3DB7468E8C1A}" type="datetimeFigureOut">
               <a:rPr lang="en-US" smtClean="0"/>
-              <a:t>11/20/25</a:t>
+              <a:t>11/25/25</a:t>
             </a:fld>
             <a:endParaRPr lang="en-US"/>
           </a:p>
@@ -3484,7 +3010,7 @@
           <a:p>
             <a:fld id="{24C539BA-54A7-0D48-93B9-3DB7468E8C1A}" type="datetimeFigureOut">
               <a:rPr lang="en-US" smtClean="0"/>
-              <a:t>11/20/25</a:t>
+              <a:t>11/25/25</a:t>
             </a:fld>
             <a:endParaRPr lang="en-US"/>
           </a:p>
@@ -3797,7 +3323,7 @@
           <a:p>
             <a:fld id="{24C539BA-54A7-0D48-93B9-3DB7468E8C1A}" type="datetimeFigureOut">
               <a:rPr lang="en-US" smtClean="0"/>
-              <a:t>11/20/25</a:t>
+              <a:t>11/25/25</a:t>
             </a:fld>
             <a:endParaRPr lang="en-US"/>
           </a:p>
@@ -4086,7 +3612,7 @@
           <a:p>
             <a:fld id="{24C539BA-54A7-0D48-93B9-3DB7468E8C1A}" type="datetimeFigureOut">
               <a:rPr lang="en-US" smtClean="0"/>
-              <a:t>11/20/25</a:t>
+              <a:t>11/25/25</a:t>
             </a:fld>
             <a:endParaRPr lang="en-US"/>
           </a:p>
@@ -4329,7 +3855,7 @@
           <a:p>
             <a:fld id="{24C539BA-54A7-0D48-93B9-3DB7468E8C1A}" type="datetimeFigureOut">
               <a:rPr lang="en-US" smtClean="0"/>
-              <a:t>11/20/25</a:t>
+              <a:t>11/25/25</a:t>
             </a:fld>
             <a:endParaRPr lang="en-US"/>
           </a:p>
@@ -5132,8 +4658,8 @@
           </a:p>
         </p:txBody>
       </p:sp>
-      <mc:AlternateContent xmlns:mc="http://schemas.openxmlformats.org/markup-compatibility/2006">
-        <mc:Choice xmlns:a14="http://schemas.microsoft.com/office/drawing/2010/main" Requires="a14">
+      <mc:AlternateContent xmlns:mc="http://schemas.openxmlformats.org/markup-compatibility/2006" xmlns:a14="http://schemas.microsoft.com/office/drawing/2010/main">
+        <mc:Choice Requires="a14">
           <p:sp>
             <p:nvSpPr>
               <p:cNvPr id="37" name="TextBox 36">
@@ -5212,7 +4738,7 @@
             </p:txBody>
           </p:sp>
         </mc:Choice>
-        <mc:Fallback>
+        <mc:Fallback xmlns="">
           <p:sp>
             <p:nvSpPr>
               <p:cNvPr id="37" name="TextBox 36">
@@ -5257,8 +4783,8 @@
           </p:sp>
         </mc:Fallback>
       </mc:AlternateContent>
-      <mc:AlternateContent xmlns:mc="http://schemas.openxmlformats.org/markup-compatibility/2006">
-        <mc:Choice xmlns:a14="http://schemas.microsoft.com/office/drawing/2010/main" Requires="a14">
+      <mc:AlternateContent xmlns:mc="http://schemas.openxmlformats.org/markup-compatibility/2006" xmlns:a14="http://schemas.microsoft.com/office/drawing/2010/main">
+        <mc:Choice Requires="a14">
           <p:sp>
             <p:nvSpPr>
               <p:cNvPr id="38" name="TextBox 37">
@@ -5338,7 +4864,7 @@
             </p:txBody>
           </p:sp>
         </mc:Choice>
-        <mc:Fallback>
+        <mc:Fallback xmlns="">
           <p:sp>
             <p:nvSpPr>
               <p:cNvPr id="38" name="TextBox 37">
@@ -5383,8 +4909,8 @@
           </p:sp>
         </mc:Fallback>
       </mc:AlternateContent>
-      <mc:AlternateContent xmlns:mc="http://schemas.openxmlformats.org/markup-compatibility/2006">
-        <mc:Choice xmlns:a14="http://schemas.microsoft.com/office/drawing/2010/main" Requires="a14">
+      <mc:AlternateContent xmlns:mc="http://schemas.openxmlformats.org/markup-compatibility/2006" xmlns:a14="http://schemas.microsoft.com/office/drawing/2010/main">
+        <mc:Choice Requires="a14">
           <p:sp>
             <p:nvSpPr>
               <p:cNvPr id="39" name="TextBox 38">
@@ -5437,7 +4963,7 @@
             </p:txBody>
           </p:sp>
         </mc:Choice>
-        <mc:Fallback>
+        <mc:Fallback xmlns="">
           <p:sp>
             <p:nvSpPr>
               <p:cNvPr id="39" name="TextBox 38">
@@ -5543,8 +5069,8 @@
             </p:nvSpPr>
             <p:spPr>
               <a:xfrm rot="1709088">
-                <a:off x="7902943" y="1373958"/>
-                <a:ext cx="535275" cy="138499"/>
+                <a:off x="7804184" y="1397399"/>
+                <a:ext cx="713402" cy="276999"/>
               </a:xfrm>
               <a:prstGeom prst="rect">
                 <a:avLst/>
@@ -5556,6 +5082,12 @@
                 <a:spAutoFit/>
               </a:bodyPr>
               <a:lstStyle/>
+              <a:p>
+                <a:r>
+                  <a:rPr lang="en-GB" sz="900" dirty="0"/>
+                  <a:t>Sensor range</a:t>
+                </a:r>
+              </a:p>
               <a:p>
                 <a14:m>
                   <m:oMath xmlns:m="http://schemas.openxmlformats.org/officeDocument/2006/math">
@@ -5598,8 +5130,8 @@
             </p:nvSpPr>
             <p:spPr>
               <a:xfrm rot="1709088">
-                <a:off x="7902943" y="1373958"/>
-                <a:ext cx="535275" cy="138499"/>
+                <a:off x="7804184" y="1397399"/>
+                <a:ext cx="713402" cy="276999"/>
               </a:xfrm>
               <a:prstGeom prst="rect">
                 <a:avLst/>
@@ -5607,7 +5139,7 @@
               <a:blipFill>
                 <a:blip r:embed="rId6"/>
                 <a:stretch>
-                  <a:fillRect l="-6977" t="-3226" b="-6452"/>
+                  <a:fillRect l="-4918" t="-10638" r="-3279"/>
                 </a:stretch>
               </a:blipFill>
             </p:spPr>
@@ -5769,8 +5301,8 @@
           </a:p>
         </p:txBody>
       </p:sp>
-      <mc:AlternateContent xmlns:mc="http://schemas.openxmlformats.org/markup-compatibility/2006">
-        <mc:Choice xmlns:a14="http://schemas.microsoft.com/office/drawing/2010/main" Requires="a14">
+      <mc:AlternateContent xmlns:mc="http://schemas.openxmlformats.org/markup-compatibility/2006" xmlns:a14="http://schemas.microsoft.com/office/drawing/2010/main">
+        <mc:Choice Requires="a14">
           <p:sp>
             <p:nvSpPr>
               <p:cNvPr id="146" name="TextBox 145">
@@ -5799,6 +5331,7 @@
               </a:bodyPr>
               <a:lstStyle/>
               <a:p>
+                <a:pPr/>
                 <a14:m>
                   <m:oMathPara xmlns:m="http://schemas.openxmlformats.org/officeDocument/2006/math">
                     <m:oMathParaPr>
@@ -5838,7 +5371,7 @@
             </p:txBody>
           </p:sp>
         </mc:Choice>
-        <mc:Fallback>
+        <mc:Fallback xmlns="">
           <p:sp>
             <p:nvSpPr>
               <p:cNvPr id="146" name="TextBox 145">
@@ -5883,8 +5416,8 @@
           </p:sp>
         </mc:Fallback>
       </mc:AlternateContent>
-      <mc:AlternateContent xmlns:mc="http://schemas.openxmlformats.org/markup-compatibility/2006">
-        <mc:Choice xmlns:a14="http://schemas.microsoft.com/office/drawing/2010/main" Requires="a14">
+      <mc:AlternateContent xmlns:mc="http://schemas.openxmlformats.org/markup-compatibility/2006" xmlns:a14="http://schemas.microsoft.com/office/drawing/2010/main">
+        <mc:Choice Requires="a14">
           <p:sp>
             <p:nvSpPr>
               <p:cNvPr id="147" name="TextBox 146">
@@ -5913,6 +5446,7 @@
               </a:bodyPr>
               <a:lstStyle/>
               <a:p>
+                <a:pPr/>
                 <a14:m>
                   <m:oMathPara xmlns:m="http://schemas.openxmlformats.org/officeDocument/2006/math">
                     <m:oMathParaPr>
@@ -5952,7 +5486,7 @@
             </p:txBody>
           </p:sp>
         </mc:Choice>
-        <mc:Fallback>
+        <mc:Fallback xmlns="">
           <p:sp>
             <p:nvSpPr>
               <p:cNvPr id="147" name="TextBox 146">
@@ -5997,8 +5531,8 @@
           </p:sp>
         </mc:Fallback>
       </mc:AlternateContent>
-      <mc:AlternateContent xmlns:mc="http://schemas.openxmlformats.org/markup-compatibility/2006">
-        <mc:Choice xmlns:a14="http://schemas.microsoft.com/office/drawing/2010/main" Requires="a14">
+      <mc:AlternateContent xmlns:mc="http://schemas.openxmlformats.org/markup-compatibility/2006" xmlns:a14="http://schemas.microsoft.com/office/drawing/2010/main">
+        <mc:Choice Requires="a14">
           <p:sp>
             <p:nvSpPr>
               <p:cNvPr id="148" name="TextBox 147">
@@ -6027,6 +5561,7 @@
               </a:bodyPr>
               <a:lstStyle/>
               <a:p>
+                <a:pPr/>
                 <a14:m>
                   <m:oMathPara xmlns:m="http://schemas.openxmlformats.org/officeDocument/2006/math">
                     <m:oMathParaPr>
@@ -6066,7 +5601,7 @@
             </p:txBody>
           </p:sp>
         </mc:Choice>
-        <mc:Fallback>
+        <mc:Fallback xmlns="">
           <p:sp>
             <p:nvSpPr>
               <p:cNvPr id="148" name="TextBox 147">
@@ -6111,8 +5646,8 @@
           </p:sp>
         </mc:Fallback>
       </mc:AlternateContent>
-      <mc:AlternateContent xmlns:mc="http://schemas.openxmlformats.org/markup-compatibility/2006">
-        <mc:Choice xmlns:a14="http://schemas.microsoft.com/office/drawing/2010/main" Requires="a14">
+      <mc:AlternateContent xmlns:mc="http://schemas.openxmlformats.org/markup-compatibility/2006" xmlns:a14="http://schemas.microsoft.com/office/drawing/2010/main">
+        <mc:Choice Requires="a14">
           <p:sp>
             <p:nvSpPr>
               <p:cNvPr id="149" name="TextBox 148">
@@ -6141,6 +5676,7 @@
               </a:bodyPr>
               <a:lstStyle/>
               <a:p>
+                <a:pPr/>
                 <a14:m>
                   <m:oMathPara xmlns:m="http://schemas.openxmlformats.org/officeDocument/2006/math">
                     <m:oMathParaPr>
@@ -6180,7 +5716,7 @@
             </p:txBody>
           </p:sp>
         </mc:Choice>
-        <mc:Fallback>
+        <mc:Fallback xmlns="">
           <p:sp>
             <p:nvSpPr>
               <p:cNvPr id="149" name="TextBox 148">
@@ -6575,8 +6111,8 @@
           </p:style>
         </p:cxnSp>
       </p:grpSp>
-      <mc:AlternateContent xmlns:mc="http://schemas.openxmlformats.org/markup-compatibility/2006">
-        <mc:Choice xmlns:a14="http://schemas.microsoft.com/office/drawing/2010/main" Requires="a14">
+      <mc:AlternateContent xmlns:mc="http://schemas.openxmlformats.org/markup-compatibility/2006" xmlns:a14="http://schemas.microsoft.com/office/drawing/2010/main">
+        <mc:Choice Requires="a14">
           <p:sp>
             <p:nvSpPr>
               <p:cNvPr id="165" name="TextBox 164">
@@ -6605,6 +6141,7 @@
               </a:bodyPr>
               <a:lstStyle/>
               <a:p>
+                <a:pPr/>
                 <a14:m>
                   <m:oMathPara xmlns:m="http://schemas.openxmlformats.org/officeDocument/2006/math">
                     <m:oMathParaPr>
@@ -6644,7 +6181,7 @@
             </p:txBody>
           </p:sp>
         </mc:Choice>
-        <mc:Fallback>
+        <mc:Fallback xmlns="">
           <p:sp>
             <p:nvSpPr>
               <p:cNvPr id="165" name="TextBox 164">
@@ -6689,8 +6226,8 @@
           </p:sp>
         </mc:Fallback>
       </mc:AlternateContent>
-      <mc:AlternateContent xmlns:mc="http://schemas.openxmlformats.org/markup-compatibility/2006">
-        <mc:Choice xmlns:a14="http://schemas.microsoft.com/office/drawing/2010/main" Requires="a14">
+      <mc:AlternateContent xmlns:mc="http://schemas.openxmlformats.org/markup-compatibility/2006" xmlns:a14="http://schemas.microsoft.com/office/drawing/2010/main">
+        <mc:Choice Requires="a14">
           <p:sp>
             <p:nvSpPr>
               <p:cNvPr id="166" name="TextBox 165">
@@ -6719,6 +6256,7 @@
               </a:bodyPr>
               <a:lstStyle/>
               <a:p>
+                <a:pPr/>
                 <a14:m>
                   <m:oMathPara xmlns:m="http://schemas.openxmlformats.org/officeDocument/2006/math">
                     <m:oMathParaPr>
@@ -6758,7 +6296,7 @@
             </p:txBody>
           </p:sp>
         </mc:Choice>
-        <mc:Fallback>
+        <mc:Fallback xmlns="">
           <p:sp>
             <p:nvSpPr>
               <p:cNvPr id="166" name="TextBox 165">
@@ -6803,8 +6341,8 @@
           </p:sp>
         </mc:Fallback>
       </mc:AlternateContent>
-      <mc:AlternateContent xmlns:mc="http://schemas.openxmlformats.org/markup-compatibility/2006">
-        <mc:Choice xmlns:a14="http://schemas.microsoft.com/office/drawing/2010/main" Requires="a14">
+      <mc:AlternateContent xmlns:mc="http://schemas.openxmlformats.org/markup-compatibility/2006" xmlns:a14="http://schemas.microsoft.com/office/drawing/2010/main">
+        <mc:Choice Requires="a14">
           <p:sp>
             <p:nvSpPr>
               <p:cNvPr id="167" name="TextBox 166">
@@ -6833,6 +6371,7 @@
               </a:bodyPr>
               <a:lstStyle/>
               <a:p>
+                <a:pPr/>
                 <a14:m>
                   <m:oMathPara xmlns:m="http://schemas.openxmlformats.org/officeDocument/2006/math">
                     <m:oMathParaPr>
@@ -6872,7 +6411,7 @@
             </p:txBody>
           </p:sp>
         </mc:Choice>
-        <mc:Fallback>
+        <mc:Fallback xmlns="">
           <p:sp>
             <p:nvSpPr>
               <p:cNvPr id="167" name="TextBox 166">
@@ -6917,8 +6456,8 @@
           </p:sp>
         </mc:Fallback>
       </mc:AlternateContent>
-      <mc:AlternateContent xmlns:mc="http://schemas.openxmlformats.org/markup-compatibility/2006">
-        <mc:Choice xmlns:a14="http://schemas.microsoft.com/office/drawing/2010/main" Requires="a14">
+      <mc:AlternateContent xmlns:mc="http://schemas.openxmlformats.org/markup-compatibility/2006" xmlns:a14="http://schemas.microsoft.com/office/drawing/2010/main">
+        <mc:Choice Requires="a14">
           <p:sp>
             <p:nvSpPr>
               <p:cNvPr id="168" name="TextBox 167">
@@ -6947,6 +6486,7 @@
               </a:bodyPr>
               <a:lstStyle/>
               <a:p>
+                <a:pPr/>
                 <a14:m>
                   <m:oMathPara xmlns:m="http://schemas.openxmlformats.org/officeDocument/2006/math">
                     <m:oMathParaPr>
@@ -6986,7 +6526,7 @@
             </p:txBody>
           </p:sp>
         </mc:Choice>
-        <mc:Fallback>
+        <mc:Fallback xmlns="">
           <p:sp>
             <p:nvSpPr>
               <p:cNvPr id="168" name="TextBox 167">
@@ -7381,8 +6921,8 @@
           </p:style>
         </p:cxnSp>
       </p:grpSp>
-      <mc:AlternateContent xmlns:mc="http://schemas.openxmlformats.org/markup-compatibility/2006">
-        <mc:Choice xmlns:a14="http://schemas.microsoft.com/office/drawing/2010/main" Requires="a14">
+      <mc:AlternateContent xmlns:mc="http://schemas.openxmlformats.org/markup-compatibility/2006" xmlns:a14="http://schemas.microsoft.com/office/drawing/2010/main">
+        <mc:Choice Requires="a14">
           <p:sp>
             <p:nvSpPr>
               <p:cNvPr id="178" name="TextBox 177">
@@ -7411,6 +6951,7 @@
               </a:bodyPr>
               <a:lstStyle/>
               <a:p>
+                <a:pPr/>
                 <a14:m>
                   <m:oMathPara xmlns:m="http://schemas.openxmlformats.org/officeDocument/2006/math">
                     <m:oMathParaPr>
@@ -7450,7 +6991,7 @@
             </p:txBody>
           </p:sp>
         </mc:Choice>
-        <mc:Fallback>
+        <mc:Fallback xmlns="">
           <p:sp>
             <p:nvSpPr>
               <p:cNvPr id="178" name="TextBox 177">
@@ -7495,8 +7036,8 @@
           </p:sp>
         </mc:Fallback>
       </mc:AlternateContent>
-      <mc:AlternateContent xmlns:mc="http://schemas.openxmlformats.org/markup-compatibility/2006">
-        <mc:Choice xmlns:a14="http://schemas.microsoft.com/office/drawing/2010/main" Requires="a14">
+      <mc:AlternateContent xmlns:mc="http://schemas.openxmlformats.org/markup-compatibility/2006" xmlns:a14="http://schemas.microsoft.com/office/drawing/2010/main">
+        <mc:Choice Requires="a14">
           <p:sp>
             <p:nvSpPr>
               <p:cNvPr id="179" name="TextBox 178">
@@ -7525,6 +7066,7 @@
               </a:bodyPr>
               <a:lstStyle/>
               <a:p>
+                <a:pPr/>
                 <a14:m>
                   <m:oMathPara xmlns:m="http://schemas.openxmlformats.org/officeDocument/2006/math">
                     <m:oMathParaPr>
@@ -7564,7 +7106,7 @@
             </p:txBody>
           </p:sp>
         </mc:Choice>
-        <mc:Fallback>
+        <mc:Fallback xmlns="">
           <p:sp>
             <p:nvSpPr>
               <p:cNvPr id="179" name="TextBox 178">
@@ -7609,8 +7151,8 @@
           </p:sp>
         </mc:Fallback>
       </mc:AlternateContent>
-      <mc:AlternateContent xmlns:mc="http://schemas.openxmlformats.org/markup-compatibility/2006">
-        <mc:Choice xmlns:a14="http://schemas.microsoft.com/office/drawing/2010/main" Requires="a14">
+      <mc:AlternateContent xmlns:mc="http://schemas.openxmlformats.org/markup-compatibility/2006" xmlns:a14="http://schemas.microsoft.com/office/drawing/2010/main">
+        <mc:Choice Requires="a14">
           <p:sp>
             <p:nvSpPr>
               <p:cNvPr id="180" name="TextBox 179">
@@ -7639,6 +7181,7 @@
               </a:bodyPr>
               <a:lstStyle/>
               <a:p>
+                <a:pPr/>
                 <a14:m>
                   <m:oMathPara xmlns:m="http://schemas.openxmlformats.org/officeDocument/2006/math">
                     <m:oMathParaPr>
@@ -7678,7 +7221,7 @@
             </p:txBody>
           </p:sp>
         </mc:Choice>
-        <mc:Fallback>
+        <mc:Fallback xmlns="">
           <p:sp>
             <p:nvSpPr>
               <p:cNvPr id="180" name="TextBox 179">
@@ -7723,8 +7266,8 @@
           </p:sp>
         </mc:Fallback>
       </mc:AlternateContent>
-      <mc:AlternateContent xmlns:mc="http://schemas.openxmlformats.org/markup-compatibility/2006">
-        <mc:Choice xmlns:a14="http://schemas.microsoft.com/office/drawing/2010/main" Requires="a14">
+      <mc:AlternateContent xmlns:mc="http://schemas.openxmlformats.org/markup-compatibility/2006" xmlns:a14="http://schemas.microsoft.com/office/drawing/2010/main">
+        <mc:Choice Requires="a14">
           <p:sp>
             <p:nvSpPr>
               <p:cNvPr id="181" name="TextBox 180">
@@ -7753,6 +7296,7 @@
               </a:bodyPr>
               <a:lstStyle/>
               <a:p>
+                <a:pPr/>
                 <a14:m>
                   <m:oMathPara xmlns:m="http://schemas.openxmlformats.org/officeDocument/2006/math">
                     <m:oMathParaPr>
@@ -7792,7 +7336,7 @@
             </p:txBody>
           </p:sp>
         </mc:Choice>
-        <mc:Fallback>
+        <mc:Fallback xmlns="">
           <p:sp>
             <p:nvSpPr>
               <p:cNvPr id="181" name="TextBox 180">
@@ -9497,8 +9041,8 @@
           </a:fontRef>
         </p:style>
       </p:cxnSp>
-      <mc:AlternateContent xmlns:mc="http://schemas.openxmlformats.org/markup-compatibility/2006">
-        <mc:Choice xmlns:a14="http://schemas.microsoft.com/office/drawing/2010/main" Requires="a14">
+      <mc:AlternateContent xmlns:mc="http://schemas.openxmlformats.org/markup-compatibility/2006" xmlns:a14="http://schemas.microsoft.com/office/drawing/2010/main">
+        <mc:Choice Requires="a14">
           <p:sp>
             <p:nvSpPr>
               <p:cNvPr id="197" name="TextBox 196">
@@ -9527,6 +9071,7 @@
               </a:bodyPr>
               <a:lstStyle/>
               <a:p>
+                <a:pPr/>
                 <a14:m>
                   <m:oMathPara xmlns:m="http://schemas.openxmlformats.org/officeDocument/2006/math">
                     <m:oMathParaPr>
@@ -9566,7 +9111,7 @@
             </p:txBody>
           </p:sp>
         </mc:Choice>
-        <mc:Fallback>
+        <mc:Fallback xmlns="">
           <p:sp>
             <p:nvSpPr>
               <p:cNvPr id="197" name="TextBox 196">
@@ -9611,8 +9156,8 @@
           </p:sp>
         </mc:Fallback>
       </mc:AlternateContent>
-      <mc:AlternateContent xmlns:mc="http://schemas.openxmlformats.org/markup-compatibility/2006">
-        <mc:Choice xmlns:a14="http://schemas.microsoft.com/office/drawing/2010/main" Requires="a14">
+      <mc:AlternateContent xmlns:mc="http://schemas.openxmlformats.org/markup-compatibility/2006" xmlns:a14="http://schemas.microsoft.com/office/drawing/2010/main">
+        <mc:Choice Requires="a14">
           <p:sp>
             <p:nvSpPr>
               <p:cNvPr id="198" name="TextBox 197">
@@ -9641,6 +9186,7 @@
               </a:bodyPr>
               <a:lstStyle/>
               <a:p>
+                <a:pPr/>
                 <a14:m>
                   <m:oMathPara xmlns:m="http://schemas.openxmlformats.org/officeDocument/2006/math">
                     <m:oMathParaPr>
@@ -9680,7 +9226,7 @@
             </p:txBody>
           </p:sp>
         </mc:Choice>
-        <mc:Fallback>
+        <mc:Fallback xmlns="">
           <p:sp>
             <p:nvSpPr>
               <p:cNvPr id="198" name="TextBox 197">
@@ -9725,8 +9271,8 @@
           </p:sp>
         </mc:Fallback>
       </mc:AlternateContent>
-      <mc:AlternateContent xmlns:mc="http://schemas.openxmlformats.org/markup-compatibility/2006">
-        <mc:Choice xmlns:a14="http://schemas.microsoft.com/office/drawing/2010/main" Requires="a14">
+      <mc:AlternateContent xmlns:mc="http://schemas.openxmlformats.org/markup-compatibility/2006" xmlns:a14="http://schemas.microsoft.com/office/drawing/2010/main">
+        <mc:Choice Requires="a14">
           <p:sp>
             <p:nvSpPr>
               <p:cNvPr id="199" name="TextBox 198">
@@ -9755,6 +9301,7 @@
               </a:bodyPr>
               <a:lstStyle/>
               <a:p>
+                <a:pPr/>
                 <a14:m>
                   <m:oMathPara xmlns:m="http://schemas.openxmlformats.org/officeDocument/2006/math">
                     <m:oMathParaPr>
@@ -9794,7 +9341,7 @@
             </p:txBody>
           </p:sp>
         </mc:Choice>
-        <mc:Fallback>
+        <mc:Fallback xmlns="">
           <p:sp>
             <p:nvSpPr>
               <p:cNvPr id="199" name="TextBox 198">
@@ -9902,8 +9449,8 @@
             </a:fontRef>
           </p:style>
         </p:cxnSp>
-        <mc:AlternateContent xmlns:mc="http://schemas.openxmlformats.org/markup-compatibility/2006">
-          <mc:Choice xmlns:a14="http://schemas.microsoft.com/office/drawing/2010/main" Requires="a14">
+        <mc:AlternateContent xmlns:mc="http://schemas.openxmlformats.org/markup-compatibility/2006" xmlns:a14="http://schemas.microsoft.com/office/drawing/2010/main">
+          <mc:Choice Requires="a14">
             <p:sp>
               <p:nvSpPr>
                 <p:cNvPr id="200" name="TextBox 199">
@@ -9932,6 +9479,7 @@
                 </a:bodyPr>
                 <a:lstStyle/>
                 <a:p>
+                  <a:pPr/>
                   <a14:m>
                     <m:oMathPara xmlns:m="http://schemas.openxmlformats.org/officeDocument/2006/math">
                       <m:oMathParaPr>
@@ -9971,7 +9519,7 @@
               </p:txBody>
             </p:sp>
           </mc:Choice>
-          <mc:Fallback>
+          <mc:Fallback xmlns="">
             <p:sp>
               <p:nvSpPr>
                 <p:cNvPr id="200" name="TextBox 199">
@@ -10665,8 +10213,8 @@
             </p:txBody>
           </p:sp>
         </p:grpSp>
-        <mc:AlternateContent xmlns:mc="http://schemas.openxmlformats.org/markup-compatibility/2006">
-          <mc:Choice xmlns:a14="http://schemas.microsoft.com/office/drawing/2010/main" Requires="a14">
+        <mc:AlternateContent xmlns:mc="http://schemas.openxmlformats.org/markup-compatibility/2006" xmlns:a14="http://schemas.microsoft.com/office/drawing/2010/main">
+          <mc:Choice Requires="a14">
             <p:sp>
               <p:nvSpPr>
                 <p:cNvPr id="6" name="TextBox 5">
@@ -10722,7 +10270,7 @@
               </p:txBody>
             </p:sp>
           </mc:Choice>
-          <mc:Fallback>
+          <mc:Fallback xmlns="">
             <p:sp>
               <p:nvSpPr>
                 <p:cNvPr id="6" name="TextBox 5">
@@ -10768,8 +10316,8 @@
           </mc:Fallback>
         </mc:AlternateContent>
       </p:grpSp>
-      <mc:AlternateContent xmlns:mc="http://schemas.openxmlformats.org/markup-compatibility/2006">
-        <mc:Choice xmlns:a14="http://schemas.microsoft.com/office/drawing/2010/main" Requires="a14">
+      <mc:AlternateContent xmlns:mc="http://schemas.openxmlformats.org/markup-compatibility/2006" xmlns:a14="http://schemas.microsoft.com/office/drawing/2010/main">
+        <mc:Choice Requires="a14">
           <p:sp>
             <p:nvSpPr>
               <p:cNvPr id="12" name="Rectangle 11">
@@ -10837,7 +10385,7 @@
             </p:txBody>
           </p:sp>
         </mc:Choice>
-        <mc:Fallback>
+        <mc:Fallback xmlns="">
           <p:sp>
             <p:nvSpPr>
               <p:cNvPr id="12" name="Rectangle 11">

</xml_diff>